<commit_message>
change midterm presentation to current status
</commit_message>
<xml_diff>
--- a/Midterm Presentation/präsi.pptx
+++ b/Midterm Presentation/präsi.pptx
@@ -126,7 +126,7 @@
   </p:defaultTextStyle>
   <p:extLst>
     <p:ext uri="{EFAFB233-063F-42B5-8137-9DF3F51BA10A}">
-      <p15:sldGuideLst xmlns:p15="http://schemas.microsoft.com/office/powerpoint/2012/main" xmlns="">
+      <p15:sldGuideLst xmlns="" xmlns:p15="http://schemas.microsoft.com/office/powerpoint/2012/main">
         <p15:guide id="3" orient="horz" pos="3929">
           <p15:clr>
             <a:srgbClr val="A4A3A4"/>
@@ -2420,14 +2420,14 @@
       </dgm:t>
     </dgm:pt>
     <dgm:pt modelId="{352893A6-67AE-43B0-8A96-EDD99FCD0F59}">
-      <dgm:prSet phldrT="[Text]"/>
+      <dgm:prSet phldrT="[Text]" custT="1"/>
       <dgm:spPr/>
       <dgm:t>
         <a:bodyPr/>
         <a:lstStyle/>
         <a:p>
           <a:r>
-            <a:rPr lang="de-DE" dirty="0"/>
+            <a:rPr lang="de-DE" sz="2000" dirty="0"/>
             <a:t>April</a:t>
           </a:r>
         </a:p>
@@ -2641,42 +2641,26 @@
         <a:lstStyle/>
         <a:p>
           <a:r>
-            <a:rPr lang="de-DE" dirty="0" err="1"/>
+            <a:rPr lang="de-DE" sz="1600" dirty="0" err="1"/>
             <a:t>Implement</a:t>
           </a:r>
           <a:r>
-            <a:rPr lang="de-DE" dirty="0"/>
+            <a:rPr lang="de-DE" sz="1600" dirty="0"/>
             <a:t> </a:t>
           </a:r>
           <a:r>
-            <a:rPr lang="de-DE" dirty="0" err="1"/>
+            <a:rPr lang="de-DE" sz="1600" dirty="0" err="1"/>
             <a:t>Neural</a:t>
           </a:r>
           <a:r>
-            <a:rPr lang="de-DE" dirty="0"/>
+            <a:rPr lang="de-DE" sz="1600" dirty="0"/>
             <a:t> </a:t>
           </a:r>
           <a:r>
-            <a:rPr lang="de-DE" dirty="0" smtClean="0"/>
-            <a:t>Network (</a:t>
+            <a:rPr lang="de-DE" sz="1600" dirty="0" smtClean="0"/>
+            <a:t>Network </a:t>
           </a:r>
-          <a:r>
-            <a:rPr lang="de-DE" dirty="0" err="1" smtClean="0"/>
-            <a:t>partially</a:t>
-          </a:r>
-          <a:r>
-            <a:rPr lang="de-DE" dirty="0" smtClean="0"/>
-            <a:t> </a:t>
-          </a:r>
-          <a:r>
-            <a:rPr lang="de-DE" dirty="0" err="1" smtClean="0"/>
-            <a:t>ready</a:t>
-          </a:r>
-          <a:r>
-            <a:rPr lang="de-DE" dirty="0" smtClean="0"/>
-            <a:t>)</a:t>
-          </a:r>
-          <a:endParaRPr lang="de-DE" dirty="0"/>
+          <a:endParaRPr lang="de-DE" sz="1600" dirty="0"/>
         </a:p>
       </dgm:t>
     </dgm:pt>
@@ -2859,39 +2843,6 @@
         </a:p>
       </dgm:t>
     </dgm:pt>
-    <dgm:pt modelId="{C9AAD769-2426-4F4A-954C-9FEE94C85D49}">
-      <dgm:prSet phldrT="[Text]"/>
-      <dgm:spPr/>
-      <dgm:t>
-        <a:bodyPr/>
-        <a:lstStyle/>
-        <a:p>
-          <a:endParaRPr lang="de-DE" dirty="0"/>
-        </a:p>
-      </dgm:t>
-    </dgm:pt>
-    <dgm:pt modelId="{281A7CD0-0FCF-E74D-83EB-246B4B8D8552}" type="parTrans" cxnId="{775E559B-1401-2247-A1DA-426C5EA7A975}">
-      <dgm:prSet/>
-      <dgm:spPr/>
-      <dgm:t>
-        <a:bodyPr/>
-        <a:lstStyle/>
-        <a:p>
-          <a:endParaRPr lang="de-DE"/>
-        </a:p>
-      </dgm:t>
-    </dgm:pt>
-    <dgm:pt modelId="{0944332C-F320-E54E-BD21-966B316E10FE}" type="sibTrans" cxnId="{775E559B-1401-2247-A1DA-426C5EA7A975}">
-      <dgm:prSet/>
-      <dgm:spPr/>
-      <dgm:t>
-        <a:bodyPr/>
-        <a:lstStyle/>
-        <a:p>
-          <a:endParaRPr lang="de-DE"/>
-        </a:p>
-      </dgm:t>
-    </dgm:pt>
     <dgm:pt modelId="{6AF44157-AFF4-7B47-B3FE-A1E6C7B4646C}">
       <dgm:prSet phldrT="[Text]"/>
       <dgm:spPr/>
@@ -2900,30 +2851,46 @@
         <a:lstStyle/>
         <a:p>
           <a:r>
-            <a:rPr lang="de-DE" dirty="0" smtClean="0"/>
+            <a:rPr lang="de-DE" sz="1600" dirty="0" smtClean="0"/>
             <a:t>Train </a:t>
           </a:r>
           <a:r>
-            <a:rPr lang="de-DE" dirty="0" err="1" smtClean="0"/>
+            <a:rPr lang="de-DE" sz="1600" dirty="0" err="1" smtClean="0"/>
             <a:t>Neural</a:t>
           </a:r>
           <a:r>
-            <a:rPr lang="de-DE" dirty="0" smtClean="0"/>
+            <a:rPr lang="de-DE" sz="1600" dirty="0" smtClean="0"/>
             <a:t> Network </a:t>
           </a:r>
           <a:r>
-            <a:rPr lang="de-DE" dirty="0" smtClean="0">
+            <a:rPr lang="de-DE" sz="1600" dirty="0" smtClean="0"/>
+            <a:t>on </a:t>
+          </a:r>
+          <a:r>
+            <a:rPr lang="de-DE" sz="1600" dirty="0" err="1" smtClean="0">
               <a:solidFill>
-                <a:srgbClr val="FF0000"/>
+                <a:schemeClr val="bg1"/>
               </a:solidFill>
             </a:rPr>
-            <a:t>on Cluster </a:t>
+            <a:t>small</a:t>
           </a:r>
           <a:r>
-            <a:rPr lang="de-DE" dirty="0" smtClean="0"/>
-            <a:t>(Time Intensive)</a:t>
+            <a:rPr lang="de-DE" sz="1600" dirty="0" smtClean="0">
+              <a:solidFill>
+                <a:schemeClr val="bg1"/>
+              </a:solidFill>
+            </a:rPr>
+            <a:t> </a:t>
           </a:r>
-          <a:endParaRPr lang="de-DE" dirty="0"/>
+          <a:r>
+            <a:rPr lang="de-DE" sz="1600" dirty="0" err="1" smtClean="0">
+              <a:solidFill>
+                <a:schemeClr val="bg1"/>
+              </a:solidFill>
+            </a:rPr>
+            <a:t>data</a:t>
+          </a:r>
+          <a:endParaRPr lang="de-DE" sz="1600" dirty="0"/>
         </a:p>
       </dgm:t>
     </dgm:pt>
@@ -2939,6 +2906,184 @@
       </dgm:t>
     </dgm:pt>
     <dgm:pt modelId="{CA9A171F-F26E-DD44-BE02-161AAB15B54F}" type="sibTrans" cxnId="{4EA73FA9-2E26-0840-A9E7-A01B790D6127}">
+      <dgm:prSet/>
+      <dgm:spPr/>
+      <dgm:t>
+        <a:bodyPr/>
+        <a:lstStyle/>
+        <a:p>
+          <a:endParaRPr lang="de-DE"/>
+        </a:p>
+      </dgm:t>
+    </dgm:pt>
+    <dgm:pt modelId="{4748FD5E-D577-6A40-BA3D-2C9EA7AC5990}">
+      <dgm:prSet phldrT="[Text]"/>
+      <dgm:spPr/>
+      <dgm:t>
+        <a:bodyPr/>
+        <a:lstStyle/>
+        <a:p>
+          <a:endParaRPr lang="de-DE" sz="1600" dirty="0"/>
+        </a:p>
+      </dgm:t>
+    </dgm:pt>
+    <dgm:pt modelId="{B4177186-2CB1-D043-9FF3-608D0D6CACA9}" type="parTrans" cxnId="{DEB10D23-3F67-354B-97FF-CFED25BE75FC}">
+      <dgm:prSet/>
+      <dgm:spPr/>
+      <dgm:t>
+        <a:bodyPr/>
+        <a:lstStyle/>
+        <a:p>
+          <a:endParaRPr lang="de-DE"/>
+        </a:p>
+      </dgm:t>
+    </dgm:pt>
+    <dgm:pt modelId="{03246947-F46D-D544-97D7-CDDF70EE6271}" type="sibTrans" cxnId="{DEB10D23-3F67-354B-97FF-CFED25BE75FC}">
+      <dgm:prSet/>
+      <dgm:spPr/>
+      <dgm:t>
+        <a:bodyPr/>
+        <a:lstStyle/>
+        <a:p>
+          <a:endParaRPr lang="de-DE"/>
+        </a:p>
+      </dgm:t>
+    </dgm:pt>
+    <dgm:pt modelId="{452B22A3-2167-D248-9460-9ECE428FA151}">
+      <dgm:prSet phldrT="[Text]"/>
+      <dgm:spPr/>
+      <dgm:t>
+        <a:bodyPr/>
+        <a:lstStyle/>
+        <a:p>
+          <a:r>
+            <a:rPr lang="de-DE" sz="1600" dirty="0" smtClean="0">
+              <a:solidFill>
+                <a:schemeClr val="bg1"/>
+              </a:solidFill>
+            </a:rPr>
+            <a:t>Begin </a:t>
+          </a:r>
+          <a:r>
+            <a:rPr lang="de-DE" sz="1600" dirty="0" err="1" smtClean="0">
+              <a:solidFill>
+                <a:schemeClr val="bg1"/>
+              </a:solidFill>
+            </a:rPr>
+            <a:t>training</a:t>
+          </a:r>
+          <a:r>
+            <a:rPr lang="de-DE" sz="1600" dirty="0" smtClean="0">
+              <a:solidFill>
+                <a:schemeClr val="bg1"/>
+              </a:solidFill>
+            </a:rPr>
+            <a:t> on </a:t>
+          </a:r>
+          <a:r>
+            <a:rPr lang="de-DE" sz="1600" dirty="0" err="1" smtClean="0">
+              <a:solidFill>
+                <a:schemeClr val="bg1"/>
+              </a:solidFill>
+            </a:rPr>
+            <a:t>big</a:t>
+          </a:r>
+          <a:r>
+            <a:rPr lang="de-DE" sz="1600" dirty="0" smtClean="0">
+              <a:solidFill>
+                <a:schemeClr val="bg1"/>
+              </a:solidFill>
+            </a:rPr>
+            <a:t> </a:t>
+          </a:r>
+          <a:r>
+            <a:rPr lang="de-DE" sz="1600" dirty="0" err="1" smtClean="0">
+              <a:solidFill>
+                <a:schemeClr val="bg1"/>
+              </a:solidFill>
+            </a:rPr>
+            <a:t>data</a:t>
+          </a:r>
+          <a:r>
+            <a:rPr lang="de-DE" sz="1600" dirty="0" smtClean="0">
+              <a:solidFill>
+                <a:schemeClr val="bg1"/>
+              </a:solidFill>
+            </a:rPr>
+            <a:t> </a:t>
+          </a:r>
+          <a:r>
+            <a:rPr lang="de-DE" sz="1600" dirty="0" err="1" smtClean="0">
+              <a:solidFill>
+                <a:schemeClr val="bg1"/>
+              </a:solidFill>
+            </a:rPr>
+            <a:t>set</a:t>
+          </a:r>
+          <a:r>
+            <a:rPr lang="de-DE" sz="1600" dirty="0" smtClean="0">
+              <a:solidFill>
+                <a:schemeClr val="bg1"/>
+              </a:solidFill>
+            </a:rPr>
+            <a:t> </a:t>
+          </a:r>
+          <a:r>
+            <a:rPr lang="de-DE" sz="1600" dirty="0" err="1" smtClean="0">
+              <a:solidFill>
+                <a:schemeClr val="bg1"/>
+              </a:solidFill>
+            </a:rPr>
+            <a:t>and</a:t>
+          </a:r>
+          <a:r>
+            <a:rPr lang="de-DE" sz="1600" dirty="0" smtClean="0">
+              <a:solidFill>
+                <a:schemeClr val="bg1"/>
+              </a:solidFill>
+            </a:rPr>
+            <a:t> on </a:t>
+          </a:r>
+          <a:r>
+            <a:rPr lang="de-DE" sz="1600" dirty="0" err="1" smtClean="0">
+              <a:solidFill>
+                <a:schemeClr val="bg1"/>
+              </a:solidFill>
+            </a:rPr>
+            <a:t>gpu</a:t>
+          </a:r>
+          <a:r>
+            <a:rPr lang="de-DE" sz="1600" dirty="0" smtClean="0">
+              <a:solidFill>
+                <a:schemeClr val="bg1"/>
+              </a:solidFill>
+            </a:rPr>
+            <a:t> / </a:t>
+          </a:r>
+          <a:r>
+            <a:rPr lang="de-DE" sz="1600" dirty="0" err="1" smtClean="0">
+              <a:solidFill>
+                <a:schemeClr val="bg1"/>
+              </a:solidFill>
+            </a:rPr>
+            <a:t>cluster</a:t>
+          </a:r>
+          <a:endParaRPr lang="de-DE" sz="1600" dirty="0"/>
+        </a:p>
+      </dgm:t>
+    </dgm:pt>
+    <dgm:pt modelId="{CAE09CCB-9E58-6648-A189-A83D9F08788B}" type="parTrans" cxnId="{AD4D3242-874B-1D4E-BC6E-4740838A57A4}">
+      <dgm:prSet/>
+      <dgm:spPr/>
+      <dgm:t>
+        <a:bodyPr/>
+        <a:lstStyle/>
+        <a:p>
+          <a:endParaRPr lang="de-DE"/>
+        </a:p>
+      </dgm:t>
+    </dgm:pt>
+    <dgm:pt modelId="{3FA4A9F9-84FC-4F47-A838-617751E2F199}" type="sibTrans" cxnId="{AD4D3242-874B-1D4E-BC6E-4740838A57A4}">
       <dgm:prSet/>
       <dgm:spPr/>
       <dgm:t>
@@ -2988,7 +3133,7 @@
       </dgm:t>
     </dgm:pt>
     <dgm:pt modelId="{9B065EF6-1C62-4261-A7F1-CA82309D444B}" type="pres">
-      <dgm:prSet presAssocID="{C11232B9-768D-43CF-B374-CF90DDC07D78}" presName="ThreeNodes_2" presStyleLbl="node1" presStyleIdx="1" presStyleCnt="3">
+      <dgm:prSet presAssocID="{C11232B9-768D-43CF-B374-CF90DDC07D78}" presName="ThreeNodes_2" presStyleLbl="node1" presStyleIdx="1" presStyleCnt="3" custLinFactNeighborY="4986">
         <dgm:presLayoutVars>
           <dgm:bulletEnabled val="1"/>
         </dgm:presLayoutVars>
@@ -3094,6 +3239,7 @@
     </dgm:pt>
   </dgm:ptLst>
   <dgm:cxnLst>
+    <dgm:cxn modelId="{4AF6BD31-D9AF-2A42-893E-B5B877760649}" type="presOf" srcId="{4748FD5E-D577-6A40-BA3D-2C9EA7AC5990}" destId="{9B065EF6-1C62-4261-A7F1-CA82309D444B}" srcOrd="0" destOrd="4" presId="urn:microsoft.com/office/officeart/2005/8/layout/vProcess5"/>
     <dgm:cxn modelId="{21CCA44F-110A-4D44-8012-0BD12DD17E9C}" type="presOf" srcId="{804B9195-3EAE-463F-9989-9798EA6EF4D6}" destId="{C6C115D5-B882-4DFA-BE16-253C5EEC64BE}" srcOrd="0" destOrd="2" presId="urn:microsoft.com/office/officeart/2005/8/layout/vProcess5"/>
     <dgm:cxn modelId="{A630659D-B872-463B-831B-0AFF620D493B}" srcId="{1EA39C8A-3169-411F-9ACA-B12CF5D7D20D}" destId="{27AEB557-8B51-4CE4-A353-8BF713879B1C}" srcOrd="0" destOrd="0" parTransId="{0AF9EF71-095B-49EC-A0B7-A244833FE711}" sibTransId="{FE6B098C-4F7A-4193-8FC1-346EA9BEF243}"/>
     <dgm:cxn modelId="{39B64CC3-F1CD-B441-953C-B48C781325CB}" type="presOf" srcId="{8A17E1EC-9D05-4DB3-AAF7-2541803E0646}" destId="{C6C115D5-B882-4DFA-BE16-253C5EEC64BE}" srcOrd="0" destOrd="0" presId="urn:microsoft.com/office/officeart/2005/8/layout/vProcess5"/>
@@ -3102,12 +3248,13 @@
     <dgm:cxn modelId="{88DFD0BA-4B6C-B348-8B50-A18080438A35}" type="presOf" srcId="{352893A6-67AE-43B0-8A96-EDD99FCD0F59}" destId="{36514112-3800-4FE4-B897-0489229987AC}" srcOrd="1" destOrd="0" presId="urn:microsoft.com/office/officeart/2005/8/layout/vProcess5"/>
     <dgm:cxn modelId="{317AD161-16D2-F345-9C02-E2B1B1F029F0}" type="presOf" srcId="{A7245D95-7D9D-4EAB-9D3A-195C20678039}" destId="{9B065EF6-1C62-4261-A7F1-CA82309D444B}" srcOrd="0" destOrd="1" presId="urn:microsoft.com/office/officeart/2005/8/layout/vProcess5"/>
     <dgm:cxn modelId="{6B5D0B53-93CF-4658-8EC5-DD0D94D48AA9}" srcId="{C11232B9-768D-43CF-B374-CF90DDC07D78}" destId="{1EA39C8A-3169-411F-9ACA-B12CF5D7D20D}" srcOrd="2" destOrd="0" parTransId="{36CB6A45-9E2E-47CE-B03E-88192A7C8EC5}" sibTransId="{BE2ED3DD-AA8F-4D64-BC3E-55AECC641135}"/>
+    <dgm:cxn modelId="{DEB10D23-3F67-354B-97FF-CFED25BE75FC}" srcId="{352893A6-67AE-43B0-8A96-EDD99FCD0F59}" destId="{4748FD5E-D577-6A40-BA3D-2C9EA7AC5990}" srcOrd="3" destOrd="0" parTransId="{B4177186-2CB1-D043-9FF3-608D0D6CACA9}" sibTransId="{03246947-F46D-D544-97D7-CDDF70EE6271}"/>
     <dgm:cxn modelId="{5F999896-DF46-4E47-AFDA-651B62AC5C26}" srcId="{C11232B9-768D-43CF-B374-CF90DDC07D78}" destId="{8A17E1EC-9D05-4DB3-AAF7-2541803E0646}" srcOrd="0" destOrd="0" parTransId="{72909BA1-E99A-4F51-A306-A9DE70E8AA56}" sibTransId="{CB211635-4253-4036-A72A-AF693FA52F3D}"/>
-    <dgm:cxn modelId="{6720AAC7-B3C4-7C47-AB2A-F2180B270F25}" type="presOf" srcId="{C9AAD769-2426-4F4A-954C-9FEE94C85D49}" destId="{36514112-3800-4FE4-B897-0489229987AC}" srcOrd="1" destOrd="3" presId="urn:microsoft.com/office/officeart/2005/8/layout/vProcess5"/>
     <dgm:cxn modelId="{8BC9ABBE-00A6-4C74-9A7F-77A12C5C22CF}" srcId="{C11232B9-768D-43CF-B374-CF90DDC07D78}" destId="{352893A6-67AE-43B0-8A96-EDD99FCD0F59}" srcOrd="1" destOrd="0" parTransId="{DEF10055-C8D3-4D32-A007-472966207502}" sibTransId="{2059F9DB-501D-4158-8528-7303A5F4653A}"/>
-    <dgm:cxn modelId="{1B7B346E-2FDC-BA4B-86D1-5F975FCF0631}" type="presOf" srcId="{C9AAD769-2426-4F4A-954C-9FEE94C85D49}" destId="{9B065EF6-1C62-4261-A7F1-CA82309D444B}" srcOrd="0" destOrd="3" presId="urn:microsoft.com/office/officeart/2005/8/layout/vProcess5"/>
+    <dgm:cxn modelId="{5B9DF427-8068-084A-A800-141E9DA67350}" type="presOf" srcId="{452B22A3-2167-D248-9460-9ECE428FA151}" destId="{36514112-3800-4FE4-B897-0489229987AC}" srcOrd="1" destOrd="3" presId="urn:microsoft.com/office/officeart/2005/8/layout/vProcess5"/>
+    <dgm:cxn modelId="{4EA73FA9-2E26-0840-A9E7-A01B790D6127}" srcId="{352893A6-67AE-43B0-8A96-EDD99FCD0F59}" destId="{6AF44157-AFF4-7B47-B3FE-A1E6C7B4646C}" srcOrd="1" destOrd="0" parTransId="{610332BF-A9C9-4D47-AB46-8E8CAC25E871}" sibTransId="{CA9A171F-F26E-DD44-BE02-161AAB15B54F}"/>
     <dgm:cxn modelId="{3216200B-0466-7149-9DD8-7AF34A725BDE}" type="presOf" srcId="{5517B5B4-CDF7-8642-8245-98501EFB24F5}" destId="{1660B052-0EF1-4E56-9452-340D510374EE}" srcOrd="1" destOrd="3" presId="urn:microsoft.com/office/officeart/2005/8/layout/vProcess5"/>
-    <dgm:cxn modelId="{4EA73FA9-2E26-0840-A9E7-A01B790D6127}" srcId="{352893A6-67AE-43B0-8A96-EDD99FCD0F59}" destId="{6AF44157-AFF4-7B47-B3FE-A1E6C7B4646C}" srcOrd="1" destOrd="0" parTransId="{610332BF-A9C9-4D47-AB46-8E8CAC25E871}" sibTransId="{CA9A171F-F26E-DD44-BE02-161AAB15B54F}"/>
+    <dgm:cxn modelId="{385E01D8-0407-D64E-83CA-AB696A85997B}" type="presOf" srcId="{4748FD5E-D577-6A40-BA3D-2C9EA7AC5990}" destId="{36514112-3800-4FE4-B897-0489229987AC}" srcOrd="1" destOrd="4" presId="urn:microsoft.com/office/officeart/2005/8/layout/vProcess5"/>
     <dgm:cxn modelId="{FD615243-9306-5346-A52D-BDDBA473E4FC}" type="presOf" srcId="{9CB5E157-3969-467D-9EBE-15F70EACB363}" destId="{DB1247AC-8E43-4B42-8A02-9DFEA5D39F1D}" srcOrd="0" destOrd="2" presId="urn:microsoft.com/office/officeart/2005/8/layout/vProcess5"/>
     <dgm:cxn modelId="{8A538FB5-8C44-48E9-A549-C70C0905A2B9}" srcId="{352893A6-67AE-43B0-8A96-EDD99FCD0F59}" destId="{A7245D95-7D9D-4EAB-9D3A-195C20678039}" srcOrd="0" destOrd="0" parTransId="{C60EC40D-5C74-48D6-8323-C3BFB1E2F92A}" sibTransId="{7305A630-47C4-4AF6-A529-A9305F3983B6}"/>
     <dgm:cxn modelId="{8608BAD2-2E9C-734B-9B94-08462C513FC6}" type="presOf" srcId="{CB211635-4253-4036-A72A-AF693FA52F3D}" destId="{7FF2A79E-6BFA-4B97-933F-6469DC672710}" srcOrd="0" destOrd="0" presId="urn:microsoft.com/office/officeart/2005/8/layout/vProcess5"/>
@@ -3120,12 +3267,13 @@
     <dgm:cxn modelId="{067AFDAA-DD9E-7648-9CAB-112A89E4CE5C}" type="presOf" srcId="{352893A6-67AE-43B0-8A96-EDD99FCD0F59}" destId="{9B065EF6-1C62-4261-A7F1-CA82309D444B}" srcOrd="0" destOrd="0" presId="urn:microsoft.com/office/officeart/2005/8/layout/vProcess5"/>
     <dgm:cxn modelId="{AB5AC65B-498C-924D-814B-A3177B8B0312}" type="presOf" srcId="{5517B5B4-CDF7-8642-8245-98501EFB24F5}" destId="{C6C115D5-B882-4DFA-BE16-253C5EEC64BE}" srcOrd="0" destOrd="3" presId="urn:microsoft.com/office/officeart/2005/8/layout/vProcess5"/>
     <dgm:cxn modelId="{1AA769C9-BBFC-4942-8E12-D4DF5F0F57E7}" srcId="{8A17E1EC-9D05-4DB3-AAF7-2541803E0646}" destId="{5517B5B4-CDF7-8642-8245-98501EFB24F5}" srcOrd="2" destOrd="0" parTransId="{BFD94197-07B6-B74B-A904-BECFBA83AA05}" sibTransId="{C84AF7F6-49B2-D844-B39E-5ADD84504936}"/>
+    <dgm:cxn modelId="{70A82EE9-15BD-0C45-B015-00A5E8DCEC8E}" type="presOf" srcId="{6AF44157-AFF4-7B47-B3FE-A1E6C7B4646C}" destId="{9B065EF6-1C62-4261-A7F1-CA82309D444B}" srcOrd="0" destOrd="2" presId="urn:microsoft.com/office/officeart/2005/8/layout/vProcess5"/>
     <dgm:cxn modelId="{0E96945E-8A47-2847-AFD1-DC6634239680}" type="presOf" srcId="{1EA39C8A-3169-411F-9ACA-B12CF5D7D20D}" destId="{DB1247AC-8E43-4B42-8A02-9DFEA5D39F1D}" srcOrd="0" destOrd="0" presId="urn:microsoft.com/office/officeart/2005/8/layout/vProcess5"/>
-    <dgm:cxn modelId="{70A82EE9-15BD-0C45-B015-00A5E8DCEC8E}" type="presOf" srcId="{6AF44157-AFF4-7B47-B3FE-A1E6C7B4646C}" destId="{9B065EF6-1C62-4261-A7F1-CA82309D444B}" srcOrd="0" destOrd="2" presId="urn:microsoft.com/office/officeart/2005/8/layout/vProcess5"/>
     <dgm:cxn modelId="{106DA817-1677-C14F-B0EC-817E834CE9B3}" type="presOf" srcId="{8A17E1EC-9D05-4DB3-AAF7-2541803E0646}" destId="{1660B052-0EF1-4E56-9452-340D510374EE}" srcOrd="1" destOrd="0" presId="urn:microsoft.com/office/officeart/2005/8/layout/vProcess5"/>
+    <dgm:cxn modelId="{AD4D3242-874B-1D4E-BC6E-4740838A57A4}" srcId="{352893A6-67AE-43B0-8A96-EDD99FCD0F59}" destId="{452B22A3-2167-D248-9460-9ECE428FA151}" srcOrd="2" destOrd="0" parTransId="{CAE09CCB-9E58-6648-A189-A83D9F08788B}" sibTransId="{3FA4A9F9-84FC-4F47-A838-617751E2F199}"/>
     <dgm:cxn modelId="{36408A1E-4C37-BC4D-9474-82A427E3EC0B}" type="presOf" srcId="{BA2D85C7-A0C4-4719-96B3-A6AF57E189A5}" destId="{C6C115D5-B882-4DFA-BE16-253C5EEC64BE}" srcOrd="0" destOrd="1" presId="urn:microsoft.com/office/officeart/2005/8/layout/vProcess5"/>
-    <dgm:cxn modelId="{775E559B-1401-2247-A1DA-426C5EA7A975}" srcId="{352893A6-67AE-43B0-8A96-EDD99FCD0F59}" destId="{C9AAD769-2426-4F4A-954C-9FEE94C85D49}" srcOrd="2" destOrd="0" parTransId="{281A7CD0-0FCF-E74D-83EB-246B4B8D8552}" sibTransId="{0944332C-F320-E54E-BD21-966B316E10FE}"/>
     <dgm:cxn modelId="{FF5445E5-47FE-1D42-BBF8-07EFCEB11F14}" type="presOf" srcId="{C11232B9-768D-43CF-B374-CF90DDC07D78}" destId="{087C88FB-6DE3-41D3-BE0E-F064EDD58B94}" srcOrd="0" destOrd="0" presId="urn:microsoft.com/office/officeart/2005/8/layout/vProcess5"/>
+    <dgm:cxn modelId="{AA0916A5-C0ED-B046-BCDA-62DC34DDF601}" type="presOf" srcId="{452B22A3-2167-D248-9460-9ECE428FA151}" destId="{9B065EF6-1C62-4261-A7F1-CA82309D444B}" srcOrd="0" destOrd="3" presId="urn:microsoft.com/office/officeart/2005/8/layout/vProcess5"/>
     <dgm:cxn modelId="{F3750C0E-E93C-2A44-9A0F-0174979BD0B3}" type="presOf" srcId="{BA2D85C7-A0C4-4719-96B3-A6AF57E189A5}" destId="{1660B052-0EF1-4E56-9452-340D510374EE}" srcOrd="1" destOrd="1" presId="urn:microsoft.com/office/officeart/2005/8/layout/vProcess5"/>
     <dgm:cxn modelId="{39A083E7-B4B0-443B-A2CD-7E91833B8AEA}" srcId="{8A17E1EC-9D05-4DB3-AAF7-2541803E0646}" destId="{804B9195-3EAE-463F-9989-9798EA6EF4D6}" srcOrd="1" destOrd="0" parTransId="{48764211-DC8E-4A61-8193-DB5FBA9908AC}" sibTransId="{A597EE5E-1DCF-458F-9CA0-F58F50AB9CE7}"/>
     <dgm:cxn modelId="{C74F78EE-BB22-E849-B825-F86B527CEA30}" type="presOf" srcId="{A7245D95-7D9D-4EAB-9D3A-195C20678039}" destId="{36514112-3800-4FE4-B897-0489229987AC}" srcOrd="1" destOrd="1" presId="urn:microsoft.com/office/officeart/2005/8/layout/vProcess5"/>
@@ -3836,12 +3984,12 @@
         </a:fontRef>
       </dsp:style>
       <dsp:txBody>
-        <a:bodyPr spcFirstLastPara="0" vert="horz" wrap="square" lIns="72390" tIns="72390" rIns="72390" bIns="72390" numCol="1" spcCol="1270" anchor="ctr" anchorCtr="0">
+        <a:bodyPr spcFirstLastPara="0" vert="horz" wrap="square" lIns="76200" tIns="76200" rIns="76200" bIns="76200" numCol="1" spcCol="1270" anchor="ctr" anchorCtr="0">
           <a:noAutofit/>
         </a:bodyPr>
         <a:lstStyle/>
         <a:p>
-          <a:pPr lvl="0" algn="l" defTabSz="844550">
+          <a:pPr lvl="0" algn="l" defTabSz="889000">
             <a:lnSpc>
               <a:spcPct val="90000"/>
             </a:lnSpc>
@@ -3853,12 +4001,12 @@
             </a:spcAft>
           </a:pPr>
           <a:r>
-            <a:rPr lang="de-DE" sz="1900" kern="1200" dirty="0"/>
+            <a:rPr lang="de-DE" sz="2000" kern="1200" dirty="0"/>
             <a:t>March</a:t>
           </a:r>
         </a:p>
         <a:p>
-          <a:pPr marL="114300" lvl="1" indent="-114300" algn="l" defTabSz="666750">
+          <a:pPr marL="171450" lvl="1" indent="-171450" algn="l" defTabSz="711200">
             <a:lnSpc>
               <a:spcPct val="90000"/>
             </a:lnSpc>
@@ -3871,40 +4019,40 @@
             <a:buChar char="••"/>
           </a:pPr>
           <a:r>
-            <a:rPr lang="de-DE" sz="1500" kern="1200" dirty="0" err="1"/>
+            <a:rPr lang="de-DE" sz="1600" kern="1200" dirty="0" err="1"/>
             <a:t>Understand</a:t>
           </a:r>
           <a:r>
-            <a:rPr lang="de-DE" sz="1500" kern="1200" dirty="0"/>
+            <a:rPr lang="de-DE" sz="1600" kern="1200" dirty="0"/>
             <a:t> 2D </a:t>
           </a:r>
           <a:r>
-            <a:rPr lang="de-DE" sz="1500" kern="1200" dirty="0" err="1"/>
+            <a:rPr lang="de-DE" sz="1600" kern="1200" dirty="0" err="1"/>
             <a:t>Object</a:t>
           </a:r>
           <a:r>
-            <a:rPr lang="de-DE" sz="1500" kern="1200" dirty="0"/>
+            <a:rPr lang="de-DE" sz="1600" kern="1200" dirty="0"/>
             <a:t> Recognition </a:t>
           </a:r>
           <a:r>
-            <a:rPr lang="de-DE" sz="1500" kern="1200" dirty="0" err="1"/>
+            <a:rPr lang="de-DE" sz="1600" kern="1200" dirty="0" err="1"/>
             <a:t>with</a:t>
           </a:r>
           <a:r>
-            <a:rPr lang="de-DE" sz="1500" kern="1200" dirty="0"/>
+            <a:rPr lang="de-DE" sz="1600" kern="1200" dirty="0"/>
             <a:t> </a:t>
           </a:r>
           <a:r>
-            <a:rPr lang="de-DE" sz="1500" kern="1200" dirty="0" err="1"/>
+            <a:rPr lang="de-DE" sz="1600" kern="1200" dirty="0" err="1"/>
             <a:t>Deep</a:t>
           </a:r>
           <a:r>
-            <a:rPr lang="de-DE" sz="1500" kern="1200" dirty="0"/>
+            <a:rPr lang="de-DE" sz="1600" kern="1200" dirty="0"/>
             <a:t> Networks</a:t>
           </a:r>
         </a:p>
         <a:p>
-          <a:pPr marL="114300" lvl="1" indent="-114300" algn="l" defTabSz="666750">
+          <a:pPr marL="171450" lvl="1" indent="-171450" algn="l" defTabSz="711200">
             <a:lnSpc>
               <a:spcPct val="90000"/>
             </a:lnSpc>
@@ -3917,53 +4065,53 @@
             <a:buChar char="••"/>
           </a:pPr>
           <a:r>
-            <a:rPr lang="de-DE" sz="1500" kern="1200" dirty="0" err="1" smtClean="0"/>
+            <a:rPr lang="de-DE" sz="1600" kern="1200" dirty="0" err="1" smtClean="0"/>
             <a:t>Get</a:t>
           </a:r>
           <a:r>
-            <a:rPr lang="de-DE" sz="1500" kern="1200" dirty="0" smtClean="0"/>
+            <a:rPr lang="de-DE" sz="1600" kern="1200" dirty="0" smtClean="0"/>
             <a:t> </a:t>
           </a:r>
           <a:r>
-            <a:rPr lang="de-DE" sz="1500" kern="1200" dirty="0" err="1" smtClean="0"/>
+            <a:rPr lang="de-DE" sz="1600" kern="1200" dirty="0" err="1" smtClean="0"/>
             <a:t>familiar</a:t>
           </a:r>
           <a:r>
-            <a:rPr lang="de-DE" sz="1500" kern="1200" dirty="0" smtClean="0"/>
+            <a:rPr lang="de-DE" sz="1600" kern="1200" dirty="0" smtClean="0"/>
             <a:t> </a:t>
           </a:r>
           <a:r>
-            <a:rPr lang="de-DE" sz="1500" kern="1200" dirty="0" err="1" smtClean="0"/>
+            <a:rPr lang="de-DE" sz="1600" kern="1200" dirty="0" err="1" smtClean="0"/>
             <a:t>with</a:t>
           </a:r>
           <a:r>
-            <a:rPr lang="de-DE" sz="1500" kern="1200" dirty="0" smtClean="0"/>
+            <a:rPr lang="de-DE" sz="1600" kern="1200" dirty="0" smtClean="0"/>
             <a:t> </a:t>
           </a:r>
           <a:r>
-            <a:rPr lang="de-DE" sz="1500" kern="1200" dirty="0" err="1" smtClean="0"/>
+            <a:rPr lang="de-DE" sz="1600" kern="1200" dirty="0" err="1" smtClean="0"/>
             <a:t>Machine</a:t>
           </a:r>
           <a:r>
-            <a:rPr lang="de-DE" sz="1500" kern="1200" dirty="0" smtClean="0"/>
+            <a:rPr lang="de-DE" sz="1600" kern="1200" dirty="0" smtClean="0"/>
             <a:t> Learning, </a:t>
           </a:r>
           <a:r>
-            <a:rPr lang="de-DE" sz="1500" kern="1200" dirty="0" err="1" smtClean="0"/>
+            <a:rPr lang="de-DE" sz="1600" kern="1200" dirty="0" err="1" smtClean="0"/>
             <a:t>Tensorflow</a:t>
           </a:r>
           <a:r>
-            <a:rPr lang="de-DE" sz="1500" kern="1200" dirty="0" smtClean="0"/>
+            <a:rPr lang="de-DE" sz="1600" kern="1200" dirty="0" smtClean="0"/>
             <a:t>, Papers‘ </a:t>
           </a:r>
           <a:r>
-            <a:rPr lang="de-DE" sz="1500" kern="1200" dirty="0" err="1" smtClean="0"/>
+            <a:rPr lang="de-DE" sz="1600" kern="1200" dirty="0" err="1" smtClean="0"/>
             <a:t>Approaches</a:t>
           </a:r>
-          <a:endParaRPr lang="de-DE" sz="1500" kern="1200" dirty="0"/>
+          <a:endParaRPr lang="de-DE" sz="1600" kern="1200" dirty="0"/>
         </a:p>
         <a:p>
-          <a:pPr marL="114300" lvl="1" indent="-114300" algn="l" defTabSz="666750">
+          <a:pPr marL="171450" lvl="1" indent="-171450" algn="l" defTabSz="711200">
             <a:lnSpc>
               <a:spcPct val="90000"/>
             </a:lnSpc>
@@ -3976,38 +4124,38 @@
             <a:buChar char="••"/>
           </a:pPr>
           <a:r>
-            <a:rPr lang="de-DE" sz="1500" kern="1200" dirty="0" smtClean="0"/>
+            <a:rPr lang="de-DE" sz="1600" kern="1200" dirty="0" smtClean="0"/>
             <a:t>Turn 2D </a:t>
           </a:r>
           <a:r>
-            <a:rPr lang="de-DE" sz="1500" kern="1200" dirty="0" err="1" smtClean="0"/>
+            <a:rPr lang="de-DE" sz="1600" kern="1200" dirty="0" err="1" smtClean="0"/>
             <a:t>into</a:t>
           </a:r>
           <a:r>
-            <a:rPr lang="de-DE" sz="1500" kern="1200" dirty="0" smtClean="0"/>
+            <a:rPr lang="de-DE" sz="1600" kern="1200" dirty="0" smtClean="0"/>
             <a:t> 3D, </a:t>
           </a:r>
           <a:r>
-            <a:rPr lang="de-DE" sz="1500" kern="1200" dirty="0" err="1" smtClean="0"/>
+            <a:rPr lang="de-DE" sz="1600" kern="1200" dirty="0" err="1" smtClean="0"/>
             <a:t>Achieve</a:t>
           </a:r>
           <a:r>
-            <a:rPr lang="de-DE" sz="1500" kern="1200" dirty="0" smtClean="0"/>
+            <a:rPr lang="de-DE" sz="1600" kern="1200" dirty="0" smtClean="0"/>
             <a:t> </a:t>
           </a:r>
           <a:r>
-            <a:rPr lang="de-DE" sz="1500" kern="1200" dirty="0" err="1" smtClean="0"/>
+            <a:rPr lang="de-DE" sz="1600" kern="1200" dirty="0" err="1" smtClean="0"/>
             <a:t>Rotational</a:t>
           </a:r>
           <a:r>
-            <a:rPr lang="de-DE" sz="1500" kern="1200" dirty="0" smtClean="0"/>
+            <a:rPr lang="de-DE" sz="1600" kern="1200" dirty="0" smtClean="0"/>
             <a:t> </a:t>
           </a:r>
           <a:r>
-            <a:rPr lang="de-DE" sz="1500" kern="1200" dirty="0" err="1" smtClean="0"/>
+            <a:rPr lang="de-DE" sz="1600" kern="1200" dirty="0" err="1" smtClean="0"/>
             <a:t>Invariance</a:t>
           </a:r>
-          <a:endParaRPr lang="de-DE" sz="1500" kern="1200" dirty="0"/>
+          <a:endParaRPr lang="de-DE" sz="1600" kern="1200" dirty="0"/>
         </a:p>
       </dsp:txBody>
       <dsp:txXfrm>
@@ -4022,7 +4170,7 @@
       </dsp:nvSpPr>
       <dsp:spPr>
         <a:xfrm>
-          <a:off x="627645" y="1664995"/>
+          <a:off x="627645" y="1732972"/>
           <a:ext cx="7113314" cy="1363368"/>
         </a:xfrm>
         <a:prstGeom prst="roundRect">
@@ -4066,12 +4214,12 @@
         </a:fontRef>
       </dsp:style>
       <dsp:txBody>
-        <a:bodyPr spcFirstLastPara="0" vert="horz" wrap="square" lIns="72390" tIns="72390" rIns="72390" bIns="72390" numCol="1" spcCol="1270" anchor="ctr" anchorCtr="0">
+        <a:bodyPr spcFirstLastPara="0" vert="horz" wrap="square" lIns="76200" tIns="76200" rIns="76200" bIns="76200" numCol="1" spcCol="1270" anchor="ctr" anchorCtr="0">
           <a:noAutofit/>
         </a:bodyPr>
         <a:lstStyle/>
         <a:p>
-          <a:pPr lvl="0" algn="l" defTabSz="844550">
+          <a:pPr lvl="0" algn="l" defTabSz="889000">
             <a:lnSpc>
               <a:spcPct val="90000"/>
             </a:lnSpc>
@@ -4083,12 +4231,12 @@
             </a:spcAft>
           </a:pPr>
           <a:r>
-            <a:rPr lang="de-DE" sz="1900" kern="1200" dirty="0"/>
+            <a:rPr lang="de-DE" sz="2000" kern="1200" dirty="0"/>
             <a:t>April</a:t>
           </a:r>
         </a:p>
         <a:p>
-          <a:pPr marL="114300" lvl="1" indent="-114300" algn="l" defTabSz="666750">
+          <a:pPr marL="171450" lvl="1" indent="-171450" algn="l" defTabSz="711200">
             <a:lnSpc>
               <a:spcPct val="90000"/>
             </a:lnSpc>
@@ -4101,45 +4249,29 @@
             <a:buChar char="••"/>
           </a:pPr>
           <a:r>
-            <a:rPr lang="de-DE" sz="1500" kern="1200" dirty="0" err="1"/>
+            <a:rPr lang="de-DE" sz="1600" kern="1200" dirty="0" err="1"/>
             <a:t>Implement</a:t>
           </a:r>
           <a:r>
-            <a:rPr lang="de-DE" sz="1500" kern="1200" dirty="0"/>
+            <a:rPr lang="de-DE" sz="1600" kern="1200" dirty="0"/>
             <a:t> </a:t>
           </a:r>
           <a:r>
-            <a:rPr lang="de-DE" sz="1500" kern="1200" dirty="0" err="1"/>
+            <a:rPr lang="de-DE" sz="1600" kern="1200" dirty="0" err="1"/>
             <a:t>Neural</a:t>
           </a:r>
           <a:r>
-            <a:rPr lang="de-DE" sz="1500" kern="1200" dirty="0"/>
+            <a:rPr lang="de-DE" sz="1600" kern="1200" dirty="0"/>
             <a:t> </a:t>
           </a:r>
           <a:r>
-            <a:rPr lang="de-DE" sz="1500" kern="1200" dirty="0" smtClean="0"/>
-            <a:t>Network (</a:t>
+            <a:rPr lang="de-DE" sz="1600" kern="1200" dirty="0" smtClean="0"/>
+            <a:t>Network </a:t>
           </a:r>
-          <a:r>
-            <a:rPr lang="de-DE" sz="1500" kern="1200" dirty="0" err="1" smtClean="0"/>
-            <a:t>partially</a:t>
-          </a:r>
-          <a:r>
-            <a:rPr lang="de-DE" sz="1500" kern="1200" dirty="0" smtClean="0"/>
-            <a:t> </a:t>
-          </a:r>
-          <a:r>
-            <a:rPr lang="de-DE" sz="1500" kern="1200" dirty="0" err="1" smtClean="0"/>
-            <a:t>ready</a:t>
-          </a:r>
-          <a:r>
-            <a:rPr lang="de-DE" sz="1500" kern="1200" dirty="0" smtClean="0"/>
-            <a:t>)</a:t>
-          </a:r>
-          <a:endParaRPr lang="de-DE" sz="1500" kern="1200" dirty="0"/>
+          <a:endParaRPr lang="de-DE" sz="1600" kern="1200" dirty="0"/>
         </a:p>
         <a:p>
-          <a:pPr marL="114300" lvl="1" indent="-114300" algn="l" defTabSz="666750">
+          <a:pPr marL="171450" lvl="1" indent="-171450" algn="l" defTabSz="711200">
             <a:lnSpc>
               <a:spcPct val="90000"/>
             </a:lnSpc>
@@ -4152,33 +4284,49 @@
             <a:buChar char="••"/>
           </a:pPr>
           <a:r>
-            <a:rPr lang="de-DE" sz="1500" kern="1200" dirty="0" smtClean="0"/>
+            <a:rPr lang="de-DE" sz="1600" kern="1200" dirty="0" smtClean="0"/>
             <a:t>Train </a:t>
           </a:r>
           <a:r>
-            <a:rPr lang="de-DE" sz="1500" kern="1200" dirty="0" err="1" smtClean="0"/>
+            <a:rPr lang="de-DE" sz="1600" kern="1200" dirty="0" err="1" smtClean="0"/>
             <a:t>Neural</a:t>
           </a:r>
           <a:r>
-            <a:rPr lang="de-DE" sz="1500" kern="1200" dirty="0" smtClean="0"/>
+            <a:rPr lang="de-DE" sz="1600" kern="1200" dirty="0" smtClean="0"/>
             <a:t> Network </a:t>
           </a:r>
           <a:r>
-            <a:rPr lang="de-DE" sz="1500" kern="1200" dirty="0" smtClean="0">
+            <a:rPr lang="de-DE" sz="1600" kern="1200" dirty="0" smtClean="0"/>
+            <a:t>on </a:t>
+          </a:r>
+          <a:r>
+            <a:rPr lang="de-DE" sz="1600" kern="1200" dirty="0" err="1" smtClean="0">
               <a:solidFill>
-                <a:srgbClr val="FF0000"/>
+                <a:schemeClr val="bg1"/>
               </a:solidFill>
             </a:rPr>
-            <a:t>on Cluster </a:t>
+            <a:t>small</a:t>
           </a:r>
           <a:r>
-            <a:rPr lang="de-DE" sz="1500" kern="1200" dirty="0" smtClean="0"/>
-            <a:t>(Time Intensive)</a:t>
+            <a:rPr lang="de-DE" sz="1600" kern="1200" dirty="0" smtClean="0">
+              <a:solidFill>
+                <a:schemeClr val="bg1"/>
+              </a:solidFill>
+            </a:rPr>
+            <a:t> </a:t>
           </a:r>
-          <a:endParaRPr lang="de-DE" sz="1500" kern="1200" dirty="0"/>
+          <a:r>
+            <a:rPr lang="de-DE" sz="1600" kern="1200" dirty="0" err="1" smtClean="0">
+              <a:solidFill>
+                <a:schemeClr val="bg1"/>
+              </a:solidFill>
+            </a:rPr>
+            <a:t>data</a:t>
+          </a:r>
+          <a:endParaRPr lang="de-DE" sz="1600" kern="1200" dirty="0"/>
         </a:p>
         <a:p>
-          <a:pPr marL="114300" lvl="1" indent="-114300" algn="l" defTabSz="666750">
+          <a:pPr marL="171450" lvl="1" indent="-171450" algn="l" defTabSz="711200">
             <a:lnSpc>
               <a:spcPct val="90000"/>
             </a:lnSpc>
@@ -4190,11 +4338,138 @@
             </a:spcAft>
             <a:buChar char="••"/>
           </a:pPr>
-          <a:endParaRPr lang="de-DE" sz="1500" kern="1200" dirty="0"/>
+          <a:r>
+            <a:rPr lang="de-DE" sz="1600" kern="1200" dirty="0" smtClean="0">
+              <a:solidFill>
+                <a:schemeClr val="bg1"/>
+              </a:solidFill>
+            </a:rPr>
+            <a:t>Begin </a:t>
+          </a:r>
+          <a:r>
+            <a:rPr lang="de-DE" sz="1600" kern="1200" dirty="0" err="1" smtClean="0">
+              <a:solidFill>
+                <a:schemeClr val="bg1"/>
+              </a:solidFill>
+            </a:rPr>
+            <a:t>training</a:t>
+          </a:r>
+          <a:r>
+            <a:rPr lang="de-DE" sz="1600" kern="1200" dirty="0" smtClean="0">
+              <a:solidFill>
+                <a:schemeClr val="bg1"/>
+              </a:solidFill>
+            </a:rPr>
+            <a:t> on </a:t>
+          </a:r>
+          <a:r>
+            <a:rPr lang="de-DE" sz="1600" kern="1200" dirty="0" err="1" smtClean="0">
+              <a:solidFill>
+                <a:schemeClr val="bg1"/>
+              </a:solidFill>
+            </a:rPr>
+            <a:t>big</a:t>
+          </a:r>
+          <a:r>
+            <a:rPr lang="de-DE" sz="1600" kern="1200" dirty="0" smtClean="0">
+              <a:solidFill>
+                <a:schemeClr val="bg1"/>
+              </a:solidFill>
+            </a:rPr>
+            <a:t> </a:t>
+          </a:r>
+          <a:r>
+            <a:rPr lang="de-DE" sz="1600" kern="1200" dirty="0" err="1" smtClean="0">
+              <a:solidFill>
+                <a:schemeClr val="bg1"/>
+              </a:solidFill>
+            </a:rPr>
+            <a:t>data</a:t>
+          </a:r>
+          <a:r>
+            <a:rPr lang="de-DE" sz="1600" kern="1200" dirty="0" smtClean="0">
+              <a:solidFill>
+                <a:schemeClr val="bg1"/>
+              </a:solidFill>
+            </a:rPr>
+            <a:t> </a:t>
+          </a:r>
+          <a:r>
+            <a:rPr lang="de-DE" sz="1600" kern="1200" dirty="0" err="1" smtClean="0">
+              <a:solidFill>
+                <a:schemeClr val="bg1"/>
+              </a:solidFill>
+            </a:rPr>
+            <a:t>set</a:t>
+          </a:r>
+          <a:r>
+            <a:rPr lang="de-DE" sz="1600" kern="1200" dirty="0" smtClean="0">
+              <a:solidFill>
+                <a:schemeClr val="bg1"/>
+              </a:solidFill>
+            </a:rPr>
+            <a:t> </a:t>
+          </a:r>
+          <a:r>
+            <a:rPr lang="de-DE" sz="1600" kern="1200" dirty="0" err="1" smtClean="0">
+              <a:solidFill>
+                <a:schemeClr val="bg1"/>
+              </a:solidFill>
+            </a:rPr>
+            <a:t>and</a:t>
+          </a:r>
+          <a:r>
+            <a:rPr lang="de-DE" sz="1600" kern="1200" dirty="0" smtClean="0">
+              <a:solidFill>
+                <a:schemeClr val="bg1"/>
+              </a:solidFill>
+            </a:rPr>
+            <a:t> on </a:t>
+          </a:r>
+          <a:r>
+            <a:rPr lang="de-DE" sz="1600" kern="1200" dirty="0" err="1" smtClean="0">
+              <a:solidFill>
+                <a:schemeClr val="bg1"/>
+              </a:solidFill>
+            </a:rPr>
+            <a:t>gpu</a:t>
+          </a:r>
+          <a:r>
+            <a:rPr lang="de-DE" sz="1600" kern="1200" dirty="0" smtClean="0">
+              <a:solidFill>
+                <a:schemeClr val="bg1"/>
+              </a:solidFill>
+            </a:rPr>
+            <a:t> / </a:t>
+          </a:r>
+          <a:r>
+            <a:rPr lang="de-DE" sz="1600" kern="1200" dirty="0" err="1" smtClean="0">
+              <a:solidFill>
+                <a:schemeClr val="bg1"/>
+              </a:solidFill>
+            </a:rPr>
+            <a:t>cluster</a:t>
+          </a:r>
+          <a:endParaRPr lang="de-DE" sz="1600" kern="1200" dirty="0"/>
+        </a:p>
+        <a:p>
+          <a:pPr marL="171450" lvl="1" indent="-171450" algn="l" defTabSz="711200">
+            <a:lnSpc>
+              <a:spcPct val="90000"/>
+            </a:lnSpc>
+            <a:spcBef>
+              <a:spcPct val="0"/>
+            </a:spcBef>
+            <a:spcAft>
+              <a:spcPct val="15000"/>
+            </a:spcAft>
+            <a:buChar char="••"/>
+          </a:pPr>
+          <a:endParaRPr lang="de-DE" sz="1600" kern="1200" dirty="0"/>
         </a:p>
       </dsp:txBody>
       <dsp:txXfrm>
-        <a:off x="667577" y="1704927"/>
+        <a:off x="667577" y="1772904"/>
         <a:ext cx="5519615" cy="1283504"/>
       </dsp:txXfrm>
     </dsp:sp>
@@ -4249,12 +4524,12 @@
         </a:fontRef>
       </dsp:style>
       <dsp:txBody>
-        <a:bodyPr spcFirstLastPara="0" vert="horz" wrap="square" lIns="72390" tIns="72390" rIns="72390" bIns="72390" numCol="1" spcCol="1270" anchor="ctr" anchorCtr="0">
+        <a:bodyPr spcFirstLastPara="0" vert="horz" wrap="square" lIns="76200" tIns="76200" rIns="76200" bIns="76200" numCol="1" spcCol="1270" anchor="ctr" anchorCtr="0">
           <a:noAutofit/>
         </a:bodyPr>
         <a:lstStyle/>
         <a:p>
-          <a:pPr lvl="0" algn="l" defTabSz="844550">
+          <a:pPr lvl="0" algn="l" defTabSz="889000">
             <a:lnSpc>
               <a:spcPct val="90000"/>
             </a:lnSpc>
@@ -4266,13 +4541,13 @@
             </a:spcAft>
           </a:pPr>
           <a:r>
-            <a:rPr lang="de-DE" sz="1900" kern="1200" dirty="0" smtClean="0"/>
+            <a:rPr lang="de-DE" sz="2000" kern="1200" dirty="0" smtClean="0"/>
             <a:t>May</a:t>
           </a:r>
-          <a:endParaRPr lang="de-DE" sz="1900" kern="1200" dirty="0"/>
+          <a:endParaRPr lang="de-DE" sz="2000" kern="1200" dirty="0"/>
         </a:p>
         <a:p>
-          <a:pPr marL="114300" lvl="1" indent="-114300" algn="l" defTabSz="666750">
+          <a:pPr marL="171450" lvl="1" indent="-171450" algn="l" defTabSz="711200">
             <a:lnSpc>
               <a:spcPct val="90000"/>
             </a:lnSpc>
@@ -4285,12 +4560,12 @@
             <a:buChar char="••"/>
           </a:pPr>
           <a:r>
-            <a:rPr lang="de-DE" sz="1500" kern="1200" dirty="0"/>
+            <a:rPr lang="de-DE" sz="1600" kern="1200" dirty="0"/>
             <a:t>Fine Tuning &amp; Evaluation</a:t>
           </a:r>
         </a:p>
         <a:p>
-          <a:pPr marL="114300" lvl="1" indent="-114300" algn="l" defTabSz="666750">
+          <a:pPr marL="171450" lvl="1" indent="-171450" algn="l" defTabSz="711200">
             <a:lnSpc>
               <a:spcPct val="90000"/>
             </a:lnSpc>
@@ -4303,27 +4578,27 @@
             <a:buChar char="••"/>
           </a:pPr>
           <a:r>
-            <a:rPr lang="de-DE" sz="1500" kern="1200" dirty="0" err="1"/>
+            <a:rPr lang="de-DE" sz="1600" kern="1200" dirty="0" err="1"/>
             <a:t>Build</a:t>
           </a:r>
           <a:r>
-            <a:rPr lang="de-DE" sz="1500" kern="1200" dirty="0"/>
+            <a:rPr lang="de-DE" sz="1600" kern="1200" dirty="0"/>
             <a:t> </a:t>
           </a:r>
           <a:r>
-            <a:rPr lang="de-DE" sz="1500" kern="1200" dirty="0" err="1"/>
+            <a:rPr lang="de-DE" sz="1600" kern="1200" dirty="0" err="1"/>
             <a:t>Application</a:t>
           </a:r>
           <a:r>
-            <a:rPr lang="de-DE" sz="1500" kern="1200" dirty="0"/>
+            <a:rPr lang="de-DE" sz="1600" kern="1200" dirty="0"/>
             <a:t> </a:t>
           </a:r>
           <a:r>
-            <a:rPr lang="de-DE" sz="1500" kern="1200" dirty="0" err="1"/>
+            <a:rPr lang="de-DE" sz="1600" kern="1200" dirty="0" err="1"/>
             <a:t>for</a:t>
           </a:r>
           <a:r>
-            <a:rPr lang="de-DE" sz="1500" kern="1200" dirty="0"/>
+            <a:rPr lang="de-DE" sz="1600" kern="1200" dirty="0"/>
             <a:t> Live Demo (Project Tango Data)</a:t>
           </a:r>
         </a:p>
@@ -9099,7 +9374,7 @@
               <a:rPr lang="de-DE" smtClean="0">
                 <a:latin typeface="Arial" panose="020B0604020202020204" pitchFamily="34" charset="0"/>
               </a:rPr>
-              <a:t>14/04/16</a:t>
+              <a:t>17/04/16</a:t>
             </a:fld>
             <a:endParaRPr lang="de-DE" dirty="0">
               <a:latin typeface="Arial" panose="020B0604020202020204" pitchFamily="34" charset="0"/>
@@ -9278,7 +9553,7 @@
             <a:fld id="{BCDB334D-D17F-49C4-91DD-37BB7E818209}" type="datetimeFigureOut">
               <a:rPr lang="de-CH" smtClean="0"/>
               <a:pPr/>
-              <a:t>14/04/16</a:t>
+              <a:t>17/04/16</a:t>
             </a:fld>
             <a:endParaRPr lang="de-CH" dirty="0"/>
           </a:p>
@@ -9596,6 +9871,91 @@
           <a:bodyPr/>
           <a:lstStyle/>
           <a:p>
+            <a:endParaRPr lang="de-DE" dirty="0"/>
+          </a:p>
+        </p:txBody>
+      </p:sp>
+      <p:sp>
+        <p:nvSpPr>
+          <p:cNvPr id="4" name="Foliennummernplatzhalter 3"/>
+          <p:cNvSpPr>
+            <a:spLocks noGrp="1"/>
+          </p:cNvSpPr>
+          <p:nvPr>
+            <p:ph type="sldNum" sz="quarter" idx="10"/>
+          </p:nvPr>
+        </p:nvSpPr>
+        <p:spPr/>
+        <p:txBody>
+          <a:bodyPr/>
+          <a:lstStyle/>
+          <a:p>
+            <a:fld id="{A51C0C35-A9A2-4EFD-9BAF-1E52E29E03D1}" type="slidenum">
+              <a:rPr lang="de-CH" smtClean="0"/>
+              <a:pPr/>
+              <a:t>1</a:t>
+            </a:fld>
+            <a:endParaRPr lang="de-CH" dirty="0"/>
+          </a:p>
+        </p:txBody>
+      </p:sp>
+    </p:spTree>
+    <p:extLst>
+      <p:ext uri="{BB962C8B-B14F-4D97-AF65-F5344CB8AC3E}">
+        <p14:creationId xmlns:p14="http://schemas.microsoft.com/office/powerpoint/2010/main" val="277471013"/>
+      </p:ext>
+    </p:extLst>
+  </p:cSld>
+  <p:clrMapOvr>
+    <a:masterClrMapping/>
+  </p:clrMapOvr>
+</p:notes>
+</file>
+
+<file path=ppt/notesSlides/notesSlide2.xml><?xml version="1.0" encoding="utf-8"?>
+<p:notes xmlns:a="http://schemas.openxmlformats.org/drawingml/2006/main" xmlns:r="http://schemas.openxmlformats.org/officeDocument/2006/relationships" xmlns:p="http://schemas.openxmlformats.org/presentationml/2006/main">
+  <p:cSld>
+    <p:spTree>
+      <p:nvGrpSpPr>
+        <p:cNvPr id="1" name=""/>
+        <p:cNvGrpSpPr/>
+        <p:nvPr/>
+      </p:nvGrpSpPr>
+      <p:grpSpPr>
+        <a:xfrm>
+          <a:off x="0" y="0"/>
+          <a:ext cx="0" cy="0"/>
+          <a:chOff x="0" y="0"/>
+          <a:chExt cx="0" cy="0"/>
+        </a:xfrm>
+      </p:grpSpPr>
+      <p:sp>
+        <p:nvSpPr>
+          <p:cNvPr id="2" name="Folienbildplatzhalter 1"/>
+          <p:cNvSpPr>
+            <a:spLocks noGrp="1" noRot="1" noChangeAspect="1"/>
+          </p:cNvSpPr>
+          <p:nvPr>
+            <p:ph type="sldImg"/>
+          </p:nvPr>
+        </p:nvSpPr>
+        <p:spPr/>
+      </p:sp>
+      <p:sp>
+        <p:nvSpPr>
+          <p:cNvPr id="3" name="Notizenplatzhalter 2"/>
+          <p:cNvSpPr>
+            <a:spLocks noGrp="1"/>
+          </p:cNvSpPr>
+          <p:nvPr>
+            <p:ph type="body" idx="1"/>
+          </p:nvPr>
+        </p:nvSpPr>
+        <p:spPr/>
+        <p:txBody>
+          <a:bodyPr/>
+          <a:lstStyle/>
+          <a:p>
             <a:r>
               <a:rPr lang="de-DE" dirty="0" smtClean="0"/>
               <a:t>Foto</a:t>
@@ -9956,7 +10316,7 @@
   </p:transition>
   <p:extLst mod="1">
     <p:ext uri="{DCECCB84-F9BA-43D5-87BE-67443E8EF086}">
-      <p15:sldGuideLst xmlns:p15="http://schemas.microsoft.com/office/powerpoint/2012/main" xmlns="">
+      <p15:sldGuideLst xmlns="" xmlns:p15="http://schemas.microsoft.com/office/powerpoint/2012/main">
         <p15:guide id="1" orient="horz" pos="2160" userDrawn="1">
           <p15:clr>
             <a:srgbClr val="FBAE40"/>
@@ -10264,7 +10624,7 @@
   </p:transition>
   <p:extLst mod="1">
     <p:ext uri="{DCECCB84-F9BA-43D5-87BE-67443E8EF086}">
-      <p15:sldGuideLst xmlns:p15="http://schemas.microsoft.com/office/powerpoint/2012/main" xmlns="">
+      <p15:sldGuideLst xmlns="" xmlns:p15="http://schemas.microsoft.com/office/powerpoint/2012/main">
         <p15:guide id="1" orient="horz" pos="2160" userDrawn="1">
           <p15:clr>
             <a:srgbClr val="FBAE40"/>
@@ -13307,7 +13667,7 @@
   </p:transition>
   <p:extLst mod="1">
     <p:ext uri="{DCECCB84-F9BA-43D5-87BE-67443E8EF086}">
-      <p15:sldGuideLst xmlns:p15="http://schemas.microsoft.com/office/powerpoint/2012/main" xmlns="">
+      <p15:sldGuideLst xmlns="" xmlns:p15="http://schemas.microsoft.com/office/powerpoint/2012/main">
         <p15:guide id="1" orient="horz" pos="2160" userDrawn="1">
           <p15:clr>
             <a:srgbClr val="FBAE40"/>
@@ -16653,7 +17013,7 @@
   </p:transition>
   <p:extLst mod="1">
     <p:ext uri="{DCECCB84-F9BA-43D5-87BE-67443E8EF086}">
-      <p15:sldGuideLst xmlns:p15="http://schemas.microsoft.com/office/powerpoint/2012/main" xmlns="">
+      <p15:sldGuideLst xmlns="" xmlns:p15="http://schemas.microsoft.com/office/powerpoint/2012/main">
         <p15:guide id="1" orient="horz" pos="2160" userDrawn="1">
           <p15:clr>
             <a:srgbClr val="FBAE40"/>
@@ -19995,7 +20355,7 @@
   </p:transition>
   <p:extLst mod="1">
     <p:ext uri="{DCECCB84-F9BA-43D5-87BE-67443E8EF086}">
-      <p15:sldGuideLst xmlns:p15="http://schemas.microsoft.com/office/powerpoint/2012/main" xmlns="">
+      <p15:sldGuideLst xmlns="" xmlns:p15="http://schemas.microsoft.com/office/powerpoint/2012/main">
         <p15:guide id="1" orient="horz" pos="2160" userDrawn="1">
           <p15:clr>
             <a:srgbClr val="FBAE40"/>
@@ -24079,7 +24439,7 @@
   </p:transition>
   <p:extLst mod="1">
     <p:ext uri="{DCECCB84-F9BA-43D5-87BE-67443E8EF086}">
-      <p15:sldGuideLst xmlns:p15="http://schemas.microsoft.com/office/powerpoint/2012/main" xmlns="">
+      <p15:sldGuideLst xmlns="" xmlns:p15="http://schemas.microsoft.com/office/powerpoint/2012/main">
         <p15:guide id="1" orient="horz" pos="2160" userDrawn="1">
           <p15:clr>
             <a:srgbClr val="FBAE40"/>
@@ -27354,7 +27714,7 @@
   </p:transition>
   <p:extLst mod="1">
     <p:ext uri="{DCECCB84-F9BA-43D5-87BE-67443E8EF086}">
-      <p15:sldGuideLst xmlns:p15="http://schemas.microsoft.com/office/powerpoint/2012/main" xmlns="">
+      <p15:sldGuideLst xmlns="" xmlns:p15="http://schemas.microsoft.com/office/powerpoint/2012/main">
         <p15:guide id="1" orient="horz" pos="2160" userDrawn="1">
           <p15:clr>
             <a:srgbClr val="FBAE40"/>
@@ -30798,7 +31158,7 @@
   </p:transition>
   <p:extLst mod="1">
     <p:ext uri="{DCECCB84-F9BA-43D5-87BE-67443E8EF086}">
-      <p15:sldGuideLst xmlns:p15="http://schemas.microsoft.com/office/powerpoint/2012/main" xmlns="">
+      <p15:sldGuideLst xmlns="" xmlns:p15="http://schemas.microsoft.com/office/powerpoint/2012/main">
         <p15:guide id="1" orient="horz" pos="2160" userDrawn="1">
           <p15:clr>
             <a:srgbClr val="FBAE40"/>
@@ -33964,7 +34324,7 @@
   </p:transition>
   <p:extLst mod="1">
     <p:ext uri="{DCECCB84-F9BA-43D5-87BE-67443E8EF086}">
-      <p15:sldGuideLst xmlns:p15="http://schemas.microsoft.com/office/powerpoint/2012/main" xmlns="">
+      <p15:sldGuideLst xmlns="" xmlns:p15="http://schemas.microsoft.com/office/powerpoint/2012/main">
         <p15:guide id="1" orient="horz" pos="2160" userDrawn="1">
           <p15:clr>
             <a:srgbClr val="FBAE40"/>
@@ -38444,7 +38804,7 @@
   </p:txStyles>
   <p:extLst mod="1">
     <p:ext uri="{27BBF7A9-308A-43DC-89C8-2F10F3537804}">
-      <p15:sldGuideLst xmlns:p15="http://schemas.microsoft.com/office/powerpoint/2012/main" xmlns="">
+      <p15:sldGuideLst xmlns="" xmlns:p15="http://schemas.microsoft.com/office/powerpoint/2012/main">
         <p15:guide id="1" pos="204">
           <p15:clr>
             <a:srgbClr val="F26B43"/>
@@ -39931,7 +40291,7 @@
   </p:txStyles>
   <p:extLst mod="1">
     <p:ext uri="{27BBF7A9-308A-43DC-89C8-2F10F3537804}">
-      <p15:sldGuideLst xmlns:p15="http://schemas.microsoft.com/office/powerpoint/2012/main" xmlns="">
+      <p15:sldGuideLst xmlns="" xmlns:p15="http://schemas.microsoft.com/office/powerpoint/2012/main">
         <p15:guide id="1" pos="204">
           <p15:clr>
             <a:srgbClr val="F26B43"/>
@@ -41418,7 +41778,7 @@
   </p:txStyles>
   <p:extLst mod="1">
     <p:ext uri="{27BBF7A9-308A-43DC-89C8-2F10F3537804}">
-      <p15:sldGuideLst xmlns:p15="http://schemas.microsoft.com/office/powerpoint/2012/main" xmlns="">
+      <p15:sldGuideLst xmlns="" xmlns:p15="http://schemas.microsoft.com/office/powerpoint/2012/main">
         <p15:guide id="1" pos="204">
           <p15:clr>
             <a:srgbClr val="F26B43"/>
@@ -42905,7 +43265,7 @@
   </p:txStyles>
   <p:extLst mod="1">
     <p:ext uri="{27BBF7A9-308A-43DC-89C8-2F10F3537804}">
-      <p15:sldGuideLst xmlns:p15="http://schemas.microsoft.com/office/powerpoint/2012/main" xmlns="">
+      <p15:sldGuideLst xmlns="" xmlns:p15="http://schemas.microsoft.com/office/powerpoint/2012/main">
         <p15:guide id="1" pos="204">
           <p15:clr>
             <a:srgbClr val="F26B43"/>
@@ -44392,7 +44752,7 @@
   </p:txStyles>
   <p:extLst mod="1">
     <p:ext uri="{27BBF7A9-308A-43DC-89C8-2F10F3537804}">
-      <p15:sldGuideLst xmlns:p15="http://schemas.microsoft.com/office/powerpoint/2012/main" xmlns="">
+      <p15:sldGuideLst xmlns="" xmlns:p15="http://schemas.microsoft.com/office/powerpoint/2012/main">
         <p15:guide id="1" pos="204">
           <p15:clr>
             <a:srgbClr val="F26B43"/>
@@ -45879,7 +46239,7 @@
   </p:txStyles>
   <p:extLst mod="1">
     <p:ext uri="{27BBF7A9-308A-43DC-89C8-2F10F3537804}">
-      <p15:sldGuideLst xmlns:p15="http://schemas.microsoft.com/office/powerpoint/2012/main" xmlns="">
+      <p15:sldGuideLst xmlns="" xmlns:p15="http://schemas.microsoft.com/office/powerpoint/2012/main">
         <p15:guide id="1" pos="204">
           <p15:clr>
             <a:srgbClr val="F26B43"/>
@@ -47366,7 +47726,7 @@
   </p:txStyles>
   <p:extLst mod="1">
     <p:ext uri="{27BBF7A9-308A-43DC-89C8-2F10F3537804}">
-      <p15:sldGuideLst xmlns:p15="http://schemas.microsoft.com/office/powerpoint/2012/main" xmlns="">
+      <p15:sldGuideLst xmlns="" xmlns:p15="http://schemas.microsoft.com/office/powerpoint/2012/main">
         <p15:guide id="1" pos="204">
           <p15:clr>
             <a:srgbClr val="F26B43"/>
@@ -48843,7 +49203,7 @@
   </p:txStyles>
   <p:extLst mod="1">
     <p:ext uri="{27BBF7A9-308A-43DC-89C8-2F10F3537804}">
-      <p15:sldGuideLst xmlns:p15="http://schemas.microsoft.com/office/powerpoint/2012/main" xmlns="">
+      <p15:sldGuideLst xmlns="" xmlns:p15="http://schemas.microsoft.com/office/powerpoint/2012/main">
         <p15:guide id="1" pos="204">
           <p15:clr>
             <a:srgbClr val="F26B43"/>
@@ -50330,7 +50690,7 @@
   </p:txStyles>
   <p:extLst mod="1">
     <p:ext uri="{27BBF7A9-308A-43DC-89C8-2F10F3537804}">
-      <p15:sldGuideLst xmlns:p15="http://schemas.microsoft.com/office/powerpoint/2012/main" xmlns="">
+      <p15:sldGuideLst xmlns="" xmlns:p15="http://schemas.microsoft.com/office/powerpoint/2012/main">
         <p15:guide id="1" pos="204">
           <p15:clr>
             <a:srgbClr val="F26B43"/>
@@ -50562,8 +50922,8 @@
           <a:lstStyle/>
           <a:p>
             <a:r>
-              <a:rPr lang="de-DE"/>
-              <a:t>14.3.2016</a:t>
+              <a:rPr lang="de-DE" dirty="0" smtClean="0"/>
+              <a:t>18.4.2016</a:t>
             </a:r>
             <a:endParaRPr lang="en-GB" dirty="0"/>
           </a:p>
@@ -50649,7 +51009,7 @@
           </p:nvPr>
         </p:nvPicPr>
         <p:blipFill>
-          <a:blip r:embed="rId2">
+          <a:blip r:embed="rId3">
             <a:extLst>
               <a:ext uri="{28A0092B-C50C-407E-A947-70E740481C1C}">
                 <a14:useLocalDpi xmlns:a14="http://schemas.microsoft.com/office/drawing/2010/main" val="0"/>
@@ -50726,29 +51086,6 @@
       </p:pic>
       <p:sp>
         <p:nvSpPr>
-          <p:cNvPr id="3" name="Datumsplatzhalter 2"/>
-          <p:cNvSpPr>
-            <a:spLocks noGrp="1"/>
-          </p:cNvSpPr>
-          <p:nvPr>
-            <p:ph type="dt" sz="half" idx="10"/>
-          </p:nvPr>
-        </p:nvSpPr>
-        <p:spPr/>
-        <p:txBody>
-          <a:bodyPr/>
-          <a:lstStyle/>
-          <a:p>
-            <a:r>
-              <a:rPr lang="de-DE"/>
-              <a:t>14.3.2016</a:t>
-            </a:r>
-            <a:endParaRPr lang="en-GB" dirty="0"/>
-          </a:p>
-        </p:txBody>
-      </p:sp>
-      <p:sp>
-        <p:nvSpPr>
           <p:cNvPr id="4" name="Fußzeilenplatzhalter 3"/>
           <p:cNvSpPr>
             <a:spLocks noGrp="1"/>
@@ -50858,6 +51195,34 @@
               <a:rPr lang="de-CH" sz="1000" dirty="0"/>
               <a:t> Learning</a:t>
             </a:r>
+          </a:p>
+        </p:txBody>
+      </p:sp>
+      <p:sp>
+        <p:nvSpPr>
+          <p:cNvPr id="8" name="Datumsplatzhalter 2"/>
+          <p:cNvSpPr>
+            <a:spLocks noGrp="1"/>
+          </p:cNvSpPr>
+          <p:nvPr>
+            <p:ph type="dt" sz="half" idx="10"/>
+          </p:nvPr>
+        </p:nvSpPr>
+        <p:spPr>
+          <a:xfrm>
+            <a:off x="7937624" y="6308726"/>
+            <a:ext cx="612068" cy="468312"/>
+          </a:xfrm>
+        </p:spPr>
+        <p:txBody>
+          <a:bodyPr/>
+          <a:lstStyle/>
+          <a:p>
+            <a:r>
+              <a:rPr lang="de-DE" dirty="0" smtClean="0"/>
+              <a:t>18.4.2016</a:t>
+            </a:r>
+            <a:endParaRPr lang="en-GB" dirty="0"/>
           </a:p>
         </p:txBody>
       </p:sp>
@@ -50894,29 +51259,6 @@
           <a:chExt cx="0" cy="0"/>
         </a:xfrm>
       </p:grpSpPr>
-      <p:sp>
-        <p:nvSpPr>
-          <p:cNvPr id="3" name="Datumsplatzhalter 2"/>
-          <p:cNvSpPr>
-            <a:spLocks noGrp="1"/>
-          </p:cNvSpPr>
-          <p:nvPr>
-            <p:ph type="dt" sz="half" idx="10"/>
-          </p:nvPr>
-        </p:nvSpPr>
-        <p:spPr/>
-        <p:txBody>
-          <a:bodyPr/>
-          <a:lstStyle/>
-          <a:p>
-            <a:r>
-              <a:rPr lang="de-DE"/>
-              <a:t>14.3.2016</a:t>
-            </a:r>
-            <a:endParaRPr lang="en-GB" dirty="0"/>
-          </a:p>
-        </p:txBody>
-      </p:sp>
       <p:sp>
         <p:nvSpPr>
           <p:cNvPr id="4" name="Fußzeilenplatzhalter 3"/>
@@ -51558,6 +51900,34 @@
           </a:p>
         </p:txBody>
       </p:sp>
+      <p:sp>
+        <p:nvSpPr>
+          <p:cNvPr id="25" name="Datumsplatzhalter 2"/>
+          <p:cNvSpPr>
+            <a:spLocks noGrp="1"/>
+          </p:cNvSpPr>
+          <p:nvPr>
+            <p:ph type="dt" sz="half" idx="10"/>
+          </p:nvPr>
+        </p:nvSpPr>
+        <p:spPr>
+          <a:xfrm>
+            <a:off x="7937624" y="6308726"/>
+            <a:ext cx="612068" cy="468312"/>
+          </a:xfrm>
+        </p:spPr>
+        <p:txBody>
+          <a:bodyPr/>
+          <a:lstStyle/>
+          <a:p>
+            <a:r>
+              <a:rPr lang="de-DE" dirty="0" smtClean="0"/>
+              <a:t>18.4.2016</a:t>
+            </a:r>
+            <a:endParaRPr lang="en-GB" dirty="0"/>
+          </a:p>
+        </p:txBody>
+      </p:sp>
     </p:spTree>
     <p:extLst>
       <p:ext uri="{BB962C8B-B14F-4D97-AF65-F5344CB8AC3E}">
@@ -51650,29 +52020,6 @@
       </p:sp>
       <p:sp>
         <p:nvSpPr>
-          <p:cNvPr id="4" name="Datumsplatzhalter 3"/>
-          <p:cNvSpPr>
-            <a:spLocks noGrp="1"/>
-          </p:cNvSpPr>
-          <p:nvPr>
-            <p:ph type="dt" sz="half" idx="10"/>
-          </p:nvPr>
-        </p:nvSpPr>
-        <p:spPr/>
-        <p:txBody>
-          <a:bodyPr/>
-          <a:lstStyle/>
-          <a:p>
-            <a:r>
-              <a:rPr lang="de-DE"/>
-              <a:t>14.3.2016</a:t>
-            </a:r>
-            <a:endParaRPr lang="en-GB" dirty="0"/>
-          </a:p>
-        </p:txBody>
-      </p:sp>
-      <p:sp>
-        <p:nvSpPr>
           <p:cNvPr id="5" name="Fußzeilenplatzhalter 4"/>
           <p:cNvSpPr>
             <a:spLocks noGrp="1"/>
@@ -51892,6 +52239,34 @@
           </a:p>
         </p:txBody>
       </p:sp>
+      <p:sp>
+        <p:nvSpPr>
+          <p:cNvPr id="9" name="Datumsplatzhalter 2"/>
+          <p:cNvSpPr>
+            <a:spLocks noGrp="1"/>
+          </p:cNvSpPr>
+          <p:nvPr>
+            <p:ph type="dt" sz="half" idx="10"/>
+          </p:nvPr>
+        </p:nvSpPr>
+        <p:spPr>
+          <a:xfrm>
+            <a:off x="7937624" y="6308726"/>
+            <a:ext cx="612068" cy="468312"/>
+          </a:xfrm>
+        </p:spPr>
+        <p:txBody>
+          <a:bodyPr/>
+          <a:lstStyle/>
+          <a:p>
+            <a:r>
+              <a:rPr lang="de-DE" dirty="0" smtClean="0"/>
+              <a:t>18.4.2016</a:t>
+            </a:r>
+            <a:endParaRPr lang="en-GB" dirty="0"/>
+          </a:p>
+        </p:txBody>
+      </p:sp>
     </p:spTree>
     <p:extLst>
       <p:ext uri="{BB962C8B-B14F-4D97-AF65-F5344CB8AC3E}">
@@ -51927,29 +52302,6 @@
       </p:grpSpPr>
       <p:sp>
         <p:nvSpPr>
-          <p:cNvPr id="3" name="Datumsplatzhalter 2"/>
-          <p:cNvSpPr>
-            <a:spLocks noGrp="1"/>
-          </p:cNvSpPr>
-          <p:nvPr>
-            <p:ph type="dt" sz="half" idx="10"/>
-          </p:nvPr>
-        </p:nvSpPr>
-        <p:spPr/>
-        <p:txBody>
-          <a:bodyPr/>
-          <a:lstStyle/>
-          <a:p>
-            <a:r>
-              <a:rPr lang="de-DE"/>
-              <a:t>14.3.2016</a:t>
-            </a:r>
-            <a:endParaRPr lang="en-GB" dirty="0"/>
-          </a:p>
-        </p:txBody>
-      </p:sp>
-      <p:sp>
-        <p:nvSpPr>
           <p:cNvPr id="4" name="Fußzeilenplatzhalter 3"/>
           <p:cNvSpPr>
             <a:spLocks noGrp="1"/>
@@ -51964,8 +52316,16 @@
           <a:lstStyle/>
           <a:p>
             <a:r>
-              <a:rPr lang="de-CH"/>
-              <a:t>A. Schnewly, J. Oswald, T. Grundmann</a:t>
+              <a:rPr lang="de-CH" dirty="0"/>
+              <a:t>A. </a:t>
+            </a:r>
+            <a:r>
+              <a:rPr lang="de-CH" dirty="0" err="1"/>
+              <a:t>Schnewly</a:t>
+            </a:r>
+            <a:r>
+              <a:rPr lang="de-CH" dirty="0"/>
+              <a:t>, J. Oswald, T. Grundmann</a:t>
             </a:r>
             <a:endParaRPr lang="en-GB" dirty="0"/>
           </a:p>
@@ -52171,6 +52531,126 @@
           </a:p>
         </p:txBody>
       </p:sp>
+      <p:sp>
+        <p:nvSpPr>
+          <p:cNvPr id="11" name="Textfeld 10"/>
+          <p:cNvSpPr txBox="1"/>
+          <p:nvPr/>
+        </p:nvSpPr>
+        <p:spPr>
+          <a:xfrm>
+            <a:off x="4018161" y="3068960"/>
+            <a:ext cx="1129903" cy="769441"/>
+          </a:xfrm>
+          <a:prstGeom prst="rect">
+            <a:avLst/>
+          </a:prstGeom>
+          <a:noFill/>
+        </p:spPr>
+        <p:txBody>
+          <a:bodyPr wrap="square" rtlCol="0">
+            <a:spAutoFit/>
+          </a:bodyPr>
+          <a:lstStyle/>
+          <a:p>
+            <a:r>
+              <a:rPr lang="de-DE" sz="4400" dirty="0" smtClean="0">
+                <a:solidFill>
+                  <a:srgbClr val="008000"/>
+                </a:solidFill>
+                <a:latin typeface="Zapf Dingbats"/>
+                <a:ea typeface="Zapf Dingbats"/>
+                <a:cs typeface="Zapf Dingbats"/>
+                <a:sym typeface="Zapf Dingbats"/>
+              </a:rPr>
+              <a:t>✔</a:t>
+            </a:r>
+            <a:endParaRPr lang="de-DE" sz="4400" dirty="0">
+              <a:solidFill>
+                <a:srgbClr val="008000"/>
+              </a:solidFill>
+            </a:endParaRPr>
+          </a:p>
+        </p:txBody>
+      </p:sp>
+      <p:sp>
+        <p:nvSpPr>
+          <p:cNvPr id="15" name="Stern mit 5 Zacken 14"/>
+          <p:cNvSpPr/>
+          <p:nvPr/>
+        </p:nvSpPr>
+        <p:spPr>
+          <a:xfrm>
+            <a:off x="5580112" y="4797152"/>
+            <a:ext cx="576064" cy="528135"/>
+          </a:xfrm>
+          <a:prstGeom prst="star5">
+            <a:avLst/>
+          </a:prstGeom>
+          <a:solidFill>
+            <a:srgbClr val="FFFF00"/>
+          </a:solidFill>
+          <a:ln>
+            <a:noFill/>
+          </a:ln>
+        </p:spPr>
+        <p:style>
+          <a:lnRef idx="2">
+            <a:schemeClr val="accent1">
+              <a:shade val="50000"/>
+            </a:schemeClr>
+          </a:lnRef>
+          <a:fillRef idx="1">
+            <a:schemeClr val="accent1"/>
+          </a:fillRef>
+          <a:effectRef idx="0">
+            <a:schemeClr val="accent1"/>
+          </a:effectRef>
+          <a:fontRef idx="minor">
+            <a:schemeClr val="lt1"/>
+          </a:fontRef>
+        </p:style>
+        <p:txBody>
+          <a:bodyPr rtlCol="0" anchor="ctr"/>
+          <a:lstStyle/>
+          <a:p>
+            <a:pPr algn="ctr"/>
+            <a:endParaRPr lang="de-DE">
+              <a:solidFill>
+                <a:srgbClr val="FFFF00"/>
+              </a:solidFill>
+            </a:endParaRPr>
+          </a:p>
+        </p:txBody>
+      </p:sp>
+      <p:sp>
+        <p:nvSpPr>
+          <p:cNvPr id="16" name="Datumsplatzhalter 2"/>
+          <p:cNvSpPr>
+            <a:spLocks noGrp="1"/>
+          </p:cNvSpPr>
+          <p:nvPr>
+            <p:ph type="dt" sz="half" idx="10"/>
+          </p:nvPr>
+        </p:nvSpPr>
+        <p:spPr>
+          <a:xfrm>
+            <a:off x="7937624" y="6308726"/>
+            <a:ext cx="612068" cy="468312"/>
+          </a:xfrm>
+        </p:spPr>
+        <p:txBody>
+          <a:bodyPr/>
+          <a:lstStyle/>
+          <a:p>
+            <a:r>
+              <a:rPr lang="de-DE" dirty="0" smtClean="0"/>
+              <a:t>18.4.2016</a:t>
+            </a:r>
+            <a:endParaRPr lang="en-GB" dirty="0"/>
+          </a:p>
+        </p:txBody>
+      </p:sp>
     </p:spTree>
     <p:extLst>
       <p:ext uri="{BB962C8B-B14F-4D97-AF65-F5344CB8AC3E}">
@@ -52206,29 +52686,6 @@
       </p:grpSpPr>
       <p:sp>
         <p:nvSpPr>
-          <p:cNvPr id="3" name="Datumsplatzhalter 2"/>
-          <p:cNvSpPr>
-            <a:spLocks noGrp="1"/>
-          </p:cNvSpPr>
-          <p:nvPr>
-            <p:ph type="dt" sz="half" idx="10"/>
-          </p:nvPr>
-        </p:nvSpPr>
-        <p:spPr/>
-        <p:txBody>
-          <a:bodyPr/>
-          <a:lstStyle/>
-          <a:p>
-            <a:r>
-              <a:rPr lang="de-DE"/>
-              <a:t>14.3.2016</a:t>
-            </a:r>
-            <a:endParaRPr lang="en-GB" dirty="0"/>
-          </a:p>
-        </p:txBody>
-      </p:sp>
-      <p:sp>
-        <p:nvSpPr>
           <p:cNvPr id="4" name="Fußzeilenplatzhalter 3"/>
           <p:cNvSpPr>
             <a:spLocks noGrp="1"/>
@@ -52296,24 +52753,20 @@
           <a:p>
             <a:pPr lvl="0"/>
             <a:r>
-              <a:rPr lang="en-GB" dirty="0" smtClean="0"/>
-              <a:t>April: </a:t>
+              <a:rPr lang="de-DE" dirty="0" smtClean="0"/>
+              <a:t>Progress </a:t>
             </a:r>
             <a:r>
               <a:rPr lang="de-DE" dirty="0" err="1" smtClean="0"/>
-              <a:t>Implement</a:t>
+              <a:t>and</a:t>
             </a:r>
             <a:r>
               <a:rPr lang="de-DE" dirty="0" smtClean="0"/>
-              <a:t> </a:t>
-            </a:r>
-            <a:r>
-              <a:rPr lang="de-DE" dirty="0" err="1" smtClean="0"/>
-              <a:t>Neural</a:t>
+              <a:t> Outline</a:t>
             </a:r>
             <a:r>
               <a:rPr lang="de-DE" dirty="0" smtClean="0"/>
-              <a:t> Network </a:t>
+              <a:t/>
             </a:r>
             <a:br>
               <a:rPr lang="de-DE" dirty="0" smtClean="0"/>
@@ -52481,7 +52934,7 @@
         <p:spPr>
           <a:xfrm>
             <a:off x="907281" y="2566645"/>
-            <a:ext cx="4960863" cy="3416320"/>
+            <a:ext cx="4960863" cy="3693319"/>
           </a:xfrm>
           <a:prstGeom prst="rect">
             <a:avLst/>
@@ -52496,7 +52949,11 @@
           <a:p>
             <a:r>
               <a:rPr lang="de-DE" dirty="0" smtClean="0"/>
-              <a:t>Second </a:t>
+              <a:t>S</a:t>
+            </a:r>
+            <a:r>
+              <a:rPr lang="de-DE" dirty="0" smtClean="0"/>
+              <a:t>econd </a:t>
             </a:r>
             <a:r>
               <a:rPr lang="de-DE" dirty="0" err="1" smtClean="0"/>
@@ -52507,12 +52964,8 @@
               <a:t>: </a:t>
             </a:r>
             <a:r>
-              <a:rPr lang="de-DE" dirty="0" err="1" smtClean="0"/>
-              <a:t>Implement</a:t>
-            </a:r>
-            <a:r>
               <a:rPr lang="de-DE" dirty="0" smtClean="0"/>
-              <a:t> via </a:t>
+              <a:t>Implementation via </a:t>
             </a:r>
             <a:r>
               <a:rPr lang="de-DE" i="1" dirty="0" err="1" smtClean="0"/>
@@ -52526,8 +52979,12 @@
               <a:buChar char="-"/>
             </a:pPr>
             <a:r>
+              <a:rPr lang="de-DE" dirty="0"/>
+              <a:t>a</a:t>
+            </a:r>
+            <a:r>
               <a:rPr lang="de-DE" dirty="0" smtClean="0"/>
-              <a:t>All </a:t>
+              <a:t>ll </a:t>
             </a:r>
             <a:r>
               <a:rPr lang="de-DE" dirty="0" err="1" smtClean="0"/>
@@ -52557,32 +53014,48 @@
               <a:buChar char="-"/>
             </a:pPr>
             <a:r>
+              <a:rPr lang="de-DE" dirty="0" err="1"/>
+              <a:t>d</a:t>
+            </a:r>
+            <a:r>
+              <a:rPr lang="de-DE" dirty="0" err="1" smtClean="0"/>
+              <a:t>ata</a:t>
+            </a:r>
+            <a:r>
+              <a:rPr lang="de-DE" dirty="0" smtClean="0"/>
+              <a:t> </a:t>
+            </a:r>
+            <a:r>
+              <a:rPr lang="de-DE" dirty="0" err="1" smtClean="0"/>
+              <a:t>preparation</a:t>
+            </a:r>
+            <a:r>
+              <a:rPr lang="de-DE" dirty="0" smtClean="0"/>
+              <a:t> </a:t>
+            </a:r>
+            <a:r>
+              <a:rPr lang="de-DE" dirty="0" err="1" smtClean="0"/>
+              <a:t>done</a:t>
+            </a:r>
+            <a:r>
+              <a:rPr lang="de-DE" dirty="0" smtClean="0"/>
+              <a:t> ( </a:t>
+            </a:r>
+            <a:r>
               <a:rPr lang="de-DE" dirty="0" err="1" smtClean="0"/>
               <a:t>Matlab</a:t>
             </a:r>
             <a:r>
               <a:rPr lang="de-DE" dirty="0" smtClean="0"/>
-              <a:t> </a:t>
+              <a:t> -&gt; </a:t>
             </a:r>
             <a:r>
               <a:rPr lang="de-DE" dirty="0" err="1" smtClean="0"/>
-              <a:t>file</a:t>
+              <a:t>Numpy</a:t>
             </a:r>
             <a:r>
               <a:rPr lang="de-DE" dirty="0" smtClean="0"/>
-              <a:t> </a:t>
-            </a:r>
-            <a:r>
-              <a:rPr lang="de-DE" dirty="0" err="1" smtClean="0"/>
-              <a:t>converted</a:t>
-            </a:r>
-            <a:r>
-              <a:rPr lang="de-DE" dirty="0" smtClean="0"/>
-              <a:t> </a:t>
-            </a:r>
-            <a:r>
-              <a:rPr lang="de-DE" dirty="0" err="1" smtClean="0"/>
-              <a:t>implemented</a:t>
+              <a:t>)</a:t>
             </a:r>
             <a:endParaRPr lang="de-DE" dirty="0" smtClean="0"/>
           </a:p>
@@ -52592,8 +53065,16 @@
               <a:buChar char="-"/>
             </a:pPr>
             <a:r>
+              <a:rPr lang="de-DE" dirty="0" err="1"/>
+              <a:t>d</a:t>
+            </a:r>
+            <a:r>
+              <a:rPr lang="de-DE" dirty="0" err="1" smtClean="0"/>
+              <a:t>ata</a:t>
+            </a:r>
+            <a:r>
               <a:rPr lang="de-DE" dirty="0" smtClean="0"/>
-              <a:t>Data </a:t>
+              <a:t> </a:t>
             </a:r>
             <a:r>
               <a:rPr lang="de-DE" dirty="0" err="1" smtClean="0"/>
@@ -52609,25 +53090,111 @@
             </a:r>
             <a:r>
               <a:rPr lang="de-DE" dirty="0" smtClean="0"/>
-              <a:t> (Batch </a:t>
+              <a:t> </a:t>
+            </a:r>
+            <a:endParaRPr lang="de-DE" dirty="0"/>
+          </a:p>
+          <a:p>
+            <a:pPr marL="742950" lvl="1" indent="-285750">
+              <a:buFont typeface="Symbol" charset="2"/>
+              <a:buChar char="-"/>
+            </a:pPr>
+            <a:r>
+              <a:rPr lang="de-DE" dirty="0" smtClean="0"/>
+              <a:t>super </a:t>
             </a:r>
             <a:r>
               <a:rPr lang="de-DE" dirty="0" err="1" smtClean="0"/>
-              <a:t>input</a:t>
+              <a:t>compressed</a:t>
             </a:r>
             <a:r>
               <a:rPr lang="de-DE" dirty="0" smtClean="0"/>
-              <a:t>)</a:t>
-            </a:r>
-          </a:p>
-          <a:p>
-            <a:endParaRPr lang="de-DE" dirty="0"/>
+              <a:t> hdf5 </a:t>
+            </a:r>
+            <a:r>
+              <a:rPr lang="de-DE" dirty="0" err="1" smtClean="0"/>
+              <a:t>files</a:t>
+            </a:r>
+            <a:r>
+              <a:rPr lang="de-DE" dirty="0" smtClean="0"/>
+              <a:t>  </a:t>
+            </a:r>
+            <a:endParaRPr lang="de-DE" dirty="0" smtClean="0"/>
           </a:p>
           <a:p>
             <a:pPr marL="285750" indent="-285750">
               <a:buFont typeface="Symbol" charset="2"/>
               <a:buChar char="-"/>
             </a:pPr>
+            <a:r>
+              <a:rPr lang="de-DE" dirty="0" err="1" smtClean="0"/>
+              <a:t>Finished</a:t>
+            </a:r>
+            <a:r>
+              <a:rPr lang="de-DE" dirty="0" smtClean="0"/>
+              <a:t> </a:t>
+            </a:r>
+            <a:r>
+              <a:rPr lang="de-DE" dirty="0" err="1" smtClean="0"/>
+              <a:t>training</a:t>
+            </a:r>
+            <a:r>
+              <a:rPr lang="de-DE" dirty="0" smtClean="0"/>
+              <a:t> </a:t>
+            </a:r>
+            <a:r>
+              <a:rPr lang="de-DE" dirty="0" err="1" smtClean="0"/>
+              <a:t>with</a:t>
+            </a:r>
+            <a:r>
+              <a:rPr lang="de-DE" dirty="0" smtClean="0"/>
+              <a:t> </a:t>
+            </a:r>
+            <a:r>
+              <a:rPr lang="de-DE" dirty="0" err="1" smtClean="0"/>
+              <a:t>small</a:t>
+            </a:r>
+            <a:r>
+              <a:rPr lang="de-DE" dirty="0" smtClean="0"/>
+              <a:t> </a:t>
+            </a:r>
+            <a:r>
+              <a:rPr lang="de-DE" dirty="0" err="1"/>
+              <a:t>d</a:t>
+            </a:r>
+            <a:r>
+              <a:rPr lang="de-DE" dirty="0" err="1" smtClean="0"/>
+              <a:t>ata</a:t>
+            </a:r>
+            <a:r>
+              <a:rPr lang="de-DE" dirty="0" smtClean="0"/>
+              <a:t> </a:t>
+            </a:r>
+            <a:r>
+              <a:rPr lang="de-DE" dirty="0" err="1" smtClean="0"/>
+              <a:t>set</a:t>
+            </a:r>
+            <a:endParaRPr lang="de-DE" dirty="0" smtClean="0"/>
+          </a:p>
+          <a:p>
+            <a:pPr marL="742950" lvl="1" indent="-285750">
+              <a:buFont typeface="Symbol" charset="2"/>
+              <a:buChar char="-"/>
+            </a:pPr>
+            <a:r>
+              <a:rPr lang="de-DE" dirty="0" smtClean="0"/>
+              <a:t>2 Models (out </a:t>
+            </a:r>
+            <a:r>
+              <a:rPr lang="de-DE" dirty="0" err="1" smtClean="0"/>
+              <a:t>of</a:t>
+            </a:r>
+            <a:r>
+              <a:rPr lang="de-DE" dirty="0" smtClean="0"/>
+              <a:t> 40)</a:t>
+            </a:r>
+          </a:p>
+          <a:p>
             <a:endParaRPr lang="de-DE" dirty="0" smtClean="0"/>
           </a:p>
           <a:p>
@@ -52675,23 +53242,55 @@
               <a:t> </a:t>
             </a:r>
             <a:r>
+              <a:rPr lang="de-DE" dirty="0" smtClean="0"/>
+              <a:t>on </a:t>
+            </a:r>
+            <a:r>
               <a:rPr lang="de-DE" dirty="0" err="1" smtClean="0"/>
-              <a:t>soon</a:t>
+              <a:t>big</a:t>
+            </a:r>
+            <a:r>
+              <a:rPr lang="de-DE" dirty="0" smtClean="0"/>
+              <a:t> </a:t>
+            </a:r>
+            <a:r>
+              <a:rPr lang="de-DE" dirty="0" err="1" smtClean="0"/>
+              <a:t>data</a:t>
+            </a:r>
+            <a:r>
+              <a:rPr lang="de-DE" dirty="0" smtClean="0"/>
+              <a:t> </a:t>
+            </a:r>
+            <a:r>
+              <a:rPr lang="de-DE" dirty="0" err="1" smtClean="0"/>
+              <a:t>set</a:t>
             </a:r>
             <a:endParaRPr lang="de-DE" dirty="0" smtClean="0"/>
           </a:p>
           <a:p>
-            <a:pPr marL="342900" indent="-342900">
+            <a:pPr marL="800100" lvl="1" indent="-342900">
               <a:buFont typeface="Symbol" charset="2"/>
               <a:buChar char="-"/>
             </a:pPr>
             <a:r>
               <a:rPr lang="de-DE" dirty="0" smtClean="0"/>
-              <a:t>Try </a:t>
+              <a:t>on  </a:t>
+            </a:r>
+            <a:r>
+              <a:rPr lang="de-DE" dirty="0" smtClean="0"/>
+              <a:t>GPU </a:t>
             </a:r>
             <a:r>
               <a:rPr lang="de-DE" dirty="0" err="1" smtClean="0"/>
-              <a:t>with</a:t>
+              <a:t>and</a:t>
+            </a:r>
+            <a:r>
+              <a:rPr lang="de-DE" dirty="0" smtClean="0"/>
+              <a:t>/</a:t>
+            </a:r>
+            <a:r>
+              <a:rPr lang="de-DE" dirty="0" err="1" smtClean="0"/>
+              <a:t>or</a:t>
             </a:r>
             <a:r>
               <a:rPr lang="de-DE" dirty="0" smtClean="0"/>
@@ -52699,81 +53298,7 @@
             </a:r>
             <a:r>
               <a:rPr lang="de-DE" dirty="0" err="1" smtClean="0"/>
-              <a:t>two</a:t>
-            </a:r>
-            <a:r>
-              <a:rPr lang="de-DE" dirty="0" smtClean="0"/>
-              <a:t> </a:t>
-            </a:r>
-            <a:r>
-              <a:rPr lang="de-DE" dirty="0" err="1" smtClean="0"/>
-              <a:t>objects</a:t>
-            </a:r>
-            <a:r>
-              <a:rPr lang="de-DE" dirty="0" smtClean="0"/>
-              <a:t> ( </a:t>
-            </a:r>
-            <a:r>
-              <a:rPr lang="de-DE" dirty="0" err="1" smtClean="0"/>
-              <a:t>little</a:t>
-            </a:r>
-            <a:r>
-              <a:rPr lang="de-DE" dirty="0" smtClean="0"/>
-              <a:t> </a:t>
-            </a:r>
-            <a:r>
-              <a:rPr lang="de-DE" dirty="0" err="1" smtClean="0"/>
-              <a:t>data</a:t>
-            </a:r>
-            <a:r>
-              <a:rPr lang="de-DE" dirty="0" smtClean="0"/>
-              <a:t>)</a:t>
-            </a:r>
-          </a:p>
-          <a:p>
-            <a:pPr marL="342900" indent="-342900">
-              <a:buFont typeface="Symbol" charset="2"/>
-              <a:buChar char="-"/>
-            </a:pPr>
-            <a:r>
-              <a:rPr lang="de-DE" dirty="0" smtClean="0"/>
-              <a:t>Train </a:t>
-            </a:r>
-            <a:r>
-              <a:rPr lang="de-DE" dirty="0" err="1" smtClean="0"/>
-              <a:t>big</a:t>
-            </a:r>
-            <a:r>
-              <a:rPr lang="de-DE" dirty="0" smtClean="0"/>
-              <a:t> </a:t>
-            </a:r>
-            <a:r>
-              <a:rPr lang="de-DE" dirty="0" err="1" smtClean="0"/>
-              <a:t>data</a:t>
-            </a:r>
-            <a:r>
-              <a:rPr lang="de-DE" dirty="0" smtClean="0"/>
-              <a:t> </a:t>
-            </a:r>
-            <a:r>
-              <a:rPr lang="de-DE" dirty="0" err="1" smtClean="0"/>
-              <a:t>set</a:t>
-            </a:r>
-            <a:r>
-              <a:rPr lang="de-DE" dirty="0" smtClean="0"/>
-              <a:t> on ETH </a:t>
-            </a:r>
-            <a:r>
-              <a:rPr lang="de-DE" dirty="0" err="1" smtClean="0"/>
               <a:t>cluster</a:t>
-            </a:r>
-            <a:r>
-              <a:rPr lang="de-DE" dirty="0" smtClean="0"/>
-              <a:t>/ </a:t>
-            </a:r>
-            <a:r>
-              <a:rPr lang="de-DE" dirty="0" err="1" smtClean="0"/>
-              <a:t>similar</a:t>
             </a:r>
             <a:endParaRPr lang="de-DE" dirty="0" smtClean="0"/>
           </a:p>
@@ -52782,6 +53307,14 @@
               <a:buFont typeface="Symbol" charset="2"/>
               <a:buChar char="-"/>
             </a:pPr>
+            <a:r>
+              <a:rPr lang="de-DE" dirty="0" smtClean="0"/>
+              <a:t>Fine </a:t>
+            </a:r>
+            <a:r>
+              <a:rPr lang="de-DE" dirty="0" err="1" smtClean="0"/>
+              <a:t>tuning</a:t>
+            </a:r>
             <a:endParaRPr lang="de-DE" dirty="0" smtClean="0"/>
           </a:p>
           <a:p>
@@ -52789,7 +53322,23 @@
               <a:buFont typeface="Symbol" charset="2"/>
               <a:buChar char="-"/>
             </a:pPr>
-            <a:endParaRPr lang="de-DE" dirty="0"/>
+            <a:r>
+              <a:rPr lang="de-DE" dirty="0" smtClean="0"/>
+              <a:t>Live </a:t>
+            </a:r>
+            <a:r>
+              <a:rPr lang="de-DE" dirty="0" err="1" smtClean="0"/>
+              <a:t>demo</a:t>
+            </a:r>
+            <a:r>
+              <a:rPr lang="de-DE" dirty="0" smtClean="0"/>
+              <a:t> </a:t>
+            </a:r>
+            <a:r>
+              <a:rPr lang="de-DE" dirty="0" err="1" smtClean="0"/>
+              <a:t>application</a:t>
+            </a:r>
+            <a:endParaRPr lang="de-DE" dirty="0" smtClean="0"/>
           </a:p>
         </p:txBody>
       </p:sp>
@@ -52801,7 +53350,7 @@
         </p:nvSpPr>
         <p:spPr>
           <a:xfrm>
-            <a:off x="251520" y="2721114"/>
+            <a:off x="251520" y="2937138"/>
             <a:ext cx="792088" cy="707886"/>
           </a:xfrm>
           <a:prstGeom prst="rect">
@@ -52843,7 +53392,7 @@
         </p:nvSpPr>
         <p:spPr>
           <a:xfrm>
-            <a:off x="251520" y="4509120"/>
+            <a:off x="251520" y="4941168"/>
             <a:ext cx="576064" cy="528135"/>
           </a:xfrm>
           <a:prstGeom prst="star5">
@@ -52882,6 +53431,34 @@
                 <a:srgbClr val="FFFF00"/>
               </a:solidFill>
             </a:endParaRPr>
+          </a:p>
+        </p:txBody>
+      </p:sp>
+      <p:sp>
+        <p:nvSpPr>
+          <p:cNvPr id="12" name="Datumsplatzhalter 2"/>
+          <p:cNvSpPr>
+            <a:spLocks noGrp="1"/>
+          </p:cNvSpPr>
+          <p:nvPr>
+            <p:ph type="dt" sz="half" idx="10"/>
+          </p:nvPr>
+        </p:nvSpPr>
+        <p:spPr>
+          <a:xfrm>
+            <a:off x="7937624" y="6308726"/>
+            <a:ext cx="612068" cy="468312"/>
+          </a:xfrm>
+        </p:spPr>
+        <p:txBody>
+          <a:bodyPr/>
+          <a:lstStyle/>
+          <a:p>
+            <a:r>
+              <a:rPr lang="de-DE" dirty="0" smtClean="0"/>
+              <a:t>18.4.2016</a:t>
+            </a:r>
+            <a:endParaRPr lang="en-GB" dirty="0"/>
           </a:p>
         </p:txBody>
       </p:sp>
@@ -52920,29 +53497,6 @@
       </p:grpSpPr>
       <p:sp>
         <p:nvSpPr>
-          <p:cNvPr id="3" name="Datumsplatzhalter 2"/>
-          <p:cNvSpPr>
-            <a:spLocks noGrp="1"/>
-          </p:cNvSpPr>
-          <p:nvPr>
-            <p:ph type="dt" sz="half" idx="10"/>
-          </p:nvPr>
-        </p:nvSpPr>
-        <p:spPr/>
-        <p:txBody>
-          <a:bodyPr/>
-          <a:lstStyle/>
-          <a:p>
-            <a:r>
-              <a:rPr lang="de-DE"/>
-              <a:t>14.3.2016</a:t>
-            </a:r>
-            <a:endParaRPr lang="en-GB" dirty="0"/>
-          </a:p>
-        </p:txBody>
-      </p:sp>
-      <p:sp>
-        <p:nvSpPr>
           <p:cNvPr id="4" name="Fußzeilenplatzhalter 3"/>
           <p:cNvSpPr>
             <a:spLocks noGrp="1"/>
@@ -53023,7 +53577,7 @@
           <p:nvPr>
             <p:extLst>
               <p:ext uri="{D42A27DB-BD31-4B8C-83A1-F6EECF244321}">
-                <p14:modId xmlns:p14="http://schemas.microsoft.com/office/powerpoint/2010/main" val="2268150581"/>
+                <p14:modId xmlns:p14="http://schemas.microsoft.com/office/powerpoint/2010/main" val="3289990816"/>
               </p:ext>
             </p:extLst>
           </p:nvPr>
@@ -53088,7 +53642,7 @@
         </p:nvSpPr>
         <p:spPr>
           <a:xfrm>
-            <a:off x="6178401" y="1916832"/>
+            <a:off x="5962377" y="1795463"/>
             <a:ext cx="1129903" cy="769441"/>
           </a:xfrm>
           <a:prstGeom prst="rect">
@@ -53130,7 +53684,7 @@
         </p:nvSpPr>
         <p:spPr>
           <a:xfrm>
-            <a:off x="5530329" y="3068960"/>
+            <a:off x="3946153" y="2924944"/>
             <a:ext cx="1129903" cy="769441"/>
           </a:xfrm>
           <a:prstGeom prst="rect">
@@ -53147,7 +53701,7 @@
             <a:r>
               <a:rPr lang="de-DE" sz="4400" dirty="0" smtClean="0">
                 <a:solidFill>
-                  <a:srgbClr val="FFFF00"/>
+                  <a:srgbClr val="008000"/>
                 </a:solidFill>
                 <a:latin typeface="Zapf Dingbats"/>
                 <a:ea typeface="Zapf Dingbats"/>
@@ -53158,7 +53712,7 @@
             </a:r>
             <a:endParaRPr lang="de-DE" sz="4400" dirty="0">
               <a:solidFill>
-                <a:srgbClr val="FFFF00"/>
+                <a:srgbClr val="008000"/>
               </a:solidFill>
             </a:endParaRPr>
           </a:p>
@@ -53172,8 +53726,8 @@
         </p:nvSpPr>
         <p:spPr>
           <a:xfrm flipH="1" flipV="1">
-            <a:off x="4788024" y="2492896"/>
-            <a:ext cx="626169" cy="936103"/>
+            <a:off x="5169967" y="2492896"/>
+            <a:ext cx="626169" cy="864096"/>
           </a:xfrm>
           <a:prstGeom prst="curvedRightArrow">
             <a:avLst/>
@@ -53211,6 +53765,168 @@
                 <a:srgbClr val="008000"/>
               </a:solidFill>
             </a:endParaRPr>
+          </a:p>
+        </p:txBody>
+      </p:sp>
+      <p:sp>
+        <p:nvSpPr>
+          <p:cNvPr id="14" name="Stern mit 5 Zacken 13"/>
+          <p:cNvSpPr/>
+          <p:nvPr/>
+        </p:nvSpPr>
+        <p:spPr>
+          <a:xfrm>
+            <a:off x="5940152" y="3692953"/>
+            <a:ext cx="576064" cy="528135"/>
+          </a:xfrm>
+          <a:prstGeom prst="star5">
+            <a:avLst/>
+          </a:prstGeom>
+          <a:solidFill>
+            <a:srgbClr val="FFFF00"/>
+          </a:solidFill>
+          <a:ln>
+            <a:noFill/>
+          </a:ln>
+        </p:spPr>
+        <p:style>
+          <a:lnRef idx="2">
+            <a:schemeClr val="accent1">
+              <a:shade val="50000"/>
+            </a:schemeClr>
+          </a:lnRef>
+          <a:fillRef idx="1">
+            <a:schemeClr val="accent1"/>
+          </a:fillRef>
+          <a:effectRef idx="0">
+            <a:schemeClr val="accent1"/>
+          </a:effectRef>
+          <a:fontRef idx="minor">
+            <a:schemeClr val="lt1"/>
+          </a:fontRef>
+        </p:style>
+        <p:txBody>
+          <a:bodyPr rtlCol="0" anchor="ctr"/>
+          <a:lstStyle/>
+          <a:p>
+            <a:pPr algn="ctr"/>
+            <a:endParaRPr lang="de-DE">
+              <a:solidFill>
+                <a:srgbClr val="FFFF00"/>
+              </a:solidFill>
+            </a:endParaRPr>
+          </a:p>
+        </p:txBody>
+      </p:sp>
+      <p:sp>
+        <p:nvSpPr>
+          <p:cNvPr id="15" name="Textfeld 14"/>
+          <p:cNvSpPr txBox="1"/>
+          <p:nvPr/>
+        </p:nvSpPr>
+        <p:spPr>
+          <a:xfrm>
+            <a:off x="4788024" y="3212976"/>
+            <a:ext cx="1129903" cy="769441"/>
+          </a:xfrm>
+          <a:prstGeom prst="rect">
+            <a:avLst/>
+          </a:prstGeom>
+          <a:noFill/>
+        </p:spPr>
+        <p:txBody>
+          <a:bodyPr wrap="square" rtlCol="0">
+            <a:spAutoFit/>
+          </a:bodyPr>
+          <a:lstStyle/>
+          <a:p>
+            <a:r>
+              <a:rPr lang="de-DE" sz="4400" dirty="0" smtClean="0">
+                <a:solidFill>
+                  <a:srgbClr val="008000"/>
+                </a:solidFill>
+                <a:latin typeface="Zapf Dingbats"/>
+                <a:ea typeface="Zapf Dingbats"/>
+                <a:cs typeface="Zapf Dingbats"/>
+                <a:sym typeface="Zapf Dingbats"/>
+              </a:rPr>
+              <a:t>✔</a:t>
+            </a:r>
+            <a:endParaRPr lang="de-DE" sz="4400" dirty="0">
+              <a:solidFill>
+                <a:srgbClr val="008000"/>
+              </a:solidFill>
+            </a:endParaRPr>
+          </a:p>
+        </p:txBody>
+      </p:sp>
+      <p:sp>
+        <p:nvSpPr>
+          <p:cNvPr id="16" name="Textfeld 15"/>
+          <p:cNvSpPr txBox="1"/>
+          <p:nvPr/>
+        </p:nvSpPr>
+        <p:spPr>
+          <a:xfrm>
+            <a:off x="5724128" y="2227511"/>
+            <a:ext cx="1129903" cy="769441"/>
+          </a:xfrm>
+          <a:prstGeom prst="rect">
+            <a:avLst/>
+          </a:prstGeom>
+          <a:noFill/>
+        </p:spPr>
+        <p:txBody>
+          <a:bodyPr wrap="square" rtlCol="0">
+            <a:spAutoFit/>
+          </a:bodyPr>
+          <a:lstStyle/>
+          <a:p>
+            <a:r>
+              <a:rPr lang="de-DE" sz="4400" dirty="0" smtClean="0">
+                <a:solidFill>
+                  <a:srgbClr val="008000"/>
+                </a:solidFill>
+                <a:latin typeface="Zapf Dingbats"/>
+                <a:ea typeface="Zapf Dingbats"/>
+                <a:cs typeface="Zapf Dingbats"/>
+                <a:sym typeface="Zapf Dingbats"/>
+              </a:rPr>
+              <a:t>✔</a:t>
+            </a:r>
+            <a:endParaRPr lang="de-DE" sz="4400" dirty="0">
+              <a:solidFill>
+                <a:srgbClr val="008000"/>
+              </a:solidFill>
+            </a:endParaRPr>
+          </a:p>
+        </p:txBody>
+      </p:sp>
+      <p:sp>
+        <p:nvSpPr>
+          <p:cNvPr id="17" name="Datumsplatzhalter 2"/>
+          <p:cNvSpPr>
+            <a:spLocks noGrp="1"/>
+          </p:cNvSpPr>
+          <p:nvPr>
+            <p:ph type="dt" sz="half" idx="10"/>
+          </p:nvPr>
+        </p:nvSpPr>
+        <p:spPr>
+          <a:xfrm>
+            <a:off x="7937624" y="6308726"/>
+            <a:ext cx="612068" cy="468312"/>
+          </a:xfrm>
+        </p:spPr>
+        <p:txBody>
+          <a:bodyPr/>
+          <a:lstStyle/>
+          <a:p>
+            <a:r>
+              <a:rPr lang="de-DE" dirty="0" smtClean="0"/>
+              <a:t>18.4.2016</a:t>
+            </a:r>
+            <a:endParaRPr lang="en-GB" dirty="0"/>
           </a:p>
         </p:txBody>
       </p:sp>
@@ -53640,7 +54356,7 @@
   </a:custClrLst>
   <a:extLst>
     <a:ext uri="{05A4C25C-085E-4340-85A3-A5531E510DB2}">
-      <thm15:themeFamily xmlns:thm15="http://schemas.microsoft.com/office/thememl/2012/main" xmlns="" name="eth_praesentation_4zu3_ETH1_d" id="{13D4407A-1790-4B2E-BB8C-EB574A67D067}" vid="{4BFD40ED-96EC-464F-AA58-D037423ACDB5}"/>
+      <thm15:themeFamily xmlns="" xmlns:thm15="http://schemas.microsoft.com/office/thememl/2012/main" name="eth_praesentation_4zu3_ETH1_d" id="{13D4407A-1790-4B2E-BB8C-EB574A67D067}" vid="{4BFD40ED-96EC-464F-AA58-D037423ACDB5}"/>
     </a:ext>
   </a:extLst>
 </a:theme>
@@ -54661,7 +55377,7 @@
   </a:custClrLst>
   <a:extLst>
     <a:ext uri="{05A4C25C-085E-4340-85A3-A5531E510DB2}">
-      <thm15:themeFamily xmlns:thm15="http://schemas.microsoft.com/office/thememl/2012/main" xmlns="" name="eth_praesentation_4zu3_ETH1_d" id="{13D4407A-1790-4B2E-BB8C-EB574A67D067}" vid="{4BFD40ED-96EC-464F-AA58-D037423ACDB5}"/>
+      <thm15:themeFamily xmlns="" xmlns:thm15="http://schemas.microsoft.com/office/thememl/2012/main" name="eth_praesentation_4zu3_ETH1_d" id="{13D4407A-1790-4B2E-BB8C-EB574A67D067}" vid="{4BFD40ED-96EC-464F-AA58-D037423ACDB5}"/>
     </a:ext>
   </a:extLst>
 </a:theme>
@@ -55077,7 +55793,7 @@
   </a:custClrLst>
   <a:extLst>
     <a:ext uri="{05A4C25C-085E-4340-85A3-A5531E510DB2}">
-      <thm15:themeFamily xmlns:thm15="http://schemas.microsoft.com/office/thememl/2012/main" xmlns="" name="eth_praesentation_4zu3_ETH1_d" id="{13D4407A-1790-4B2E-BB8C-EB574A67D067}" vid="{4BFD40ED-96EC-464F-AA58-D037423ACDB5}"/>
+      <thm15:themeFamily xmlns="" xmlns:thm15="http://schemas.microsoft.com/office/thememl/2012/main" name="eth_praesentation_4zu3_ETH1_d" id="{13D4407A-1790-4B2E-BB8C-EB574A67D067}" vid="{4BFD40ED-96EC-464F-AA58-D037423ACDB5}"/>
     </a:ext>
   </a:extLst>
 </a:theme>
@@ -55493,7 +56209,7 @@
   </a:custClrLst>
   <a:extLst>
     <a:ext uri="{05A4C25C-085E-4340-85A3-A5531E510DB2}">
-      <thm15:themeFamily xmlns:thm15="http://schemas.microsoft.com/office/thememl/2012/main" xmlns="" name="eth_praesentation_4zu3_ETH1_d" id="{13D4407A-1790-4B2E-BB8C-EB574A67D067}" vid="{4BFD40ED-96EC-464F-AA58-D037423ACDB5}"/>
+      <thm15:themeFamily xmlns="" xmlns:thm15="http://schemas.microsoft.com/office/thememl/2012/main" name="eth_praesentation_4zu3_ETH1_d" id="{13D4407A-1790-4B2E-BB8C-EB574A67D067}" vid="{4BFD40ED-96EC-464F-AA58-D037423ACDB5}"/>
     </a:ext>
   </a:extLst>
 </a:theme>
@@ -55909,7 +56625,7 @@
   </a:custClrLst>
   <a:extLst>
     <a:ext uri="{05A4C25C-085E-4340-85A3-A5531E510DB2}">
-      <thm15:themeFamily xmlns:thm15="http://schemas.microsoft.com/office/thememl/2012/main" xmlns="" name="eth_praesentation_4zu3_ETH1_d" id="{13D4407A-1790-4B2E-BB8C-EB574A67D067}" vid="{4BFD40ED-96EC-464F-AA58-D037423ACDB5}"/>
+      <thm15:themeFamily xmlns="" xmlns:thm15="http://schemas.microsoft.com/office/thememl/2012/main" name="eth_praesentation_4zu3_ETH1_d" id="{13D4407A-1790-4B2E-BB8C-EB574A67D067}" vid="{4BFD40ED-96EC-464F-AA58-D037423ACDB5}"/>
     </a:ext>
   </a:extLst>
 </a:theme>
@@ -56325,7 +57041,7 @@
   </a:custClrLst>
   <a:extLst>
     <a:ext uri="{05A4C25C-085E-4340-85A3-A5531E510DB2}">
-      <thm15:themeFamily xmlns:thm15="http://schemas.microsoft.com/office/thememl/2012/main" xmlns="" name="eth_praesentation_4zu3_ETH1_d" id="{13D4407A-1790-4B2E-BB8C-EB574A67D067}" vid="{4BFD40ED-96EC-464F-AA58-D037423ACDB5}"/>
+      <thm15:themeFamily xmlns="" xmlns:thm15="http://schemas.microsoft.com/office/thememl/2012/main" name="eth_praesentation_4zu3_ETH1_d" id="{13D4407A-1790-4B2E-BB8C-EB574A67D067}" vid="{4BFD40ED-96EC-464F-AA58-D037423ACDB5}"/>
     </a:ext>
   </a:extLst>
 </a:theme>
@@ -56741,7 +57457,7 @@
   </a:custClrLst>
   <a:extLst>
     <a:ext uri="{05A4C25C-085E-4340-85A3-A5531E510DB2}">
-      <thm15:themeFamily xmlns:thm15="http://schemas.microsoft.com/office/thememl/2012/main" xmlns="" name="eth_praesentation_4zu3_ETH1_d" id="{13D4407A-1790-4B2E-BB8C-EB574A67D067}" vid="{4BFD40ED-96EC-464F-AA58-D037423ACDB5}"/>
+      <thm15:themeFamily xmlns="" xmlns:thm15="http://schemas.microsoft.com/office/thememl/2012/main" name="eth_praesentation_4zu3_ETH1_d" id="{13D4407A-1790-4B2E-BB8C-EB574A67D067}" vid="{4BFD40ED-96EC-464F-AA58-D037423ACDB5}"/>
     </a:ext>
   </a:extLst>
 </a:theme>
@@ -57157,7 +57873,7 @@
   </a:custClrLst>
   <a:extLst>
     <a:ext uri="{05A4C25C-085E-4340-85A3-A5531E510DB2}">
-      <thm15:themeFamily xmlns:thm15="http://schemas.microsoft.com/office/thememl/2012/main" xmlns="" name="eth_praesentation_4zu3_ETH1_d" id="{13D4407A-1790-4B2E-BB8C-EB574A67D067}" vid="{4BFD40ED-96EC-464F-AA58-D037423ACDB5}"/>
+      <thm15:themeFamily xmlns="" xmlns:thm15="http://schemas.microsoft.com/office/thememl/2012/main" name="eth_praesentation_4zu3_ETH1_d" id="{13D4407A-1790-4B2E-BB8C-EB574A67D067}" vid="{4BFD40ED-96EC-464F-AA58-D037423ACDB5}"/>
     </a:ext>
   </a:extLst>
 </a:theme>
@@ -57573,7 +58289,7 @@
   </a:custClrLst>
   <a:extLst>
     <a:ext uri="{05A4C25C-085E-4340-85A3-A5531E510DB2}">
-      <thm15:themeFamily xmlns:thm15="http://schemas.microsoft.com/office/thememl/2012/main" xmlns="" name="eth_praesentation_4zu3_ETH1_d" id="{13D4407A-1790-4B2E-BB8C-EB574A67D067}" vid="{4BFD40ED-96EC-464F-AA58-D037423ACDB5}"/>
+      <thm15:themeFamily xmlns="" xmlns:thm15="http://schemas.microsoft.com/office/thememl/2012/main" name="eth_praesentation_4zu3_ETH1_d" id="{13D4407A-1790-4B2E-BB8C-EB574A67D067}" vid="{4BFD40ED-96EC-464F-AA58-D037423ACDB5}"/>
     </a:ext>
   </a:extLst>
 </a:theme>

</xml_diff>

<commit_message>
just correcte some language
</commit_message>
<xml_diff>
--- a/Midterm Presentation/präsi.pptx
+++ b/Midterm Presentation/präsi.pptx
@@ -20,8 +20,8 @@
   </p:handoutMasterIdLst>
   <p:sldIdLst>
     <p:sldId id="256" r:id="rId10"/>
-    <p:sldId id="260" r:id="rId11"/>
-    <p:sldId id="263" r:id="rId12"/>
+    <p:sldId id="263" r:id="rId11"/>
+    <p:sldId id="260" r:id="rId12"/>
     <p:sldId id="262" r:id="rId13"/>
     <p:sldId id="264" r:id="rId14"/>
     <p:sldId id="265" r:id="rId15"/>
@@ -126,7 +126,7 @@
   </p:defaultTextStyle>
   <p:extLst>
     <p:ext uri="{EFAFB233-063F-42B5-8137-9DF3F51BA10A}">
-      <p15:sldGuideLst xmlns="" xmlns:p15="http://schemas.microsoft.com/office/powerpoint/2012/main">
+      <p15:sldGuideLst xmlns:p15="http://schemas.microsoft.com/office/powerpoint/2012/main">
         <p15:guide id="3" orient="horz" pos="3929">
           <p15:clr>
             <a:srgbClr val="A4A3A4"/>
@@ -1792,10 +1792,9 @@
         <a:lstStyle/>
         <a:p>
           <a:r>
-            <a:rPr lang="de-DE" dirty="0" smtClean="0"/>
+            <a:rPr lang="de-DE" dirty="0"/>
             <a:t>May</a:t>
           </a:r>
-          <a:endParaRPr lang="de-DE" dirty="0"/>
         </a:p>
       </dgm:t>
     </dgm:pt>
@@ -1893,7 +1892,7 @@
         <a:lstStyle/>
         <a:p>
           <a:r>
-            <a:rPr lang="de-DE" smtClean="0"/>
+            <a:rPr lang="de-DE"/>
             <a:t>Get familiar with Machine Learning, Tensorflow, Papers‘ Approaches</a:t>
           </a:r>
           <a:endParaRPr lang="de-DE" dirty="0"/>
@@ -2180,13 +2179,6 @@
         </dgm:presLayoutVars>
       </dgm:prSet>
       <dgm:spPr/>
-      <dgm:t>
-        <a:bodyPr/>
-        <a:lstStyle/>
-        <a:p>
-          <a:endParaRPr lang="de-DE"/>
-        </a:p>
-      </dgm:t>
     </dgm:pt>
     <dgm:pt modelId="{6D503C82-C8B4-4E6B-A82B-B6545BB130ED}" type="pres">
       <dgm:prSet presAssocID="{C11232B9-768D-43CF-B374-CF90DDC07D78}" presName="dummyMaxCanvas" presStyleCnt="0">
@@ -2201,13 +2193,6 @@
         </dgm:presLayoutVars>
       </dgm:prSet>
       <dgm:spPr/>
-      <dgm:t>
-        <a:bodyPr/>
-        <a:lstStyle/>
-        <a:p>
-          <a:endParaRPr lang="de-DE"/>
-        </a:p>
-      </dgm:t>
     </dgm:pt>
     <dgm:pt modelId="{9B065EF6-1C62-4261-A7F1-CA82309D444B}" type="pres">
       <dgm:prSet presAssocID="{C11232B9-768D-43CF-B374-CF90DDC07D78}" presName="ThreeNodes_2" presStyleLbl="node1" presStyleIdx="1" presStyleCnt="3">
@@ -2216,13 +2201,6 @@
         </dgm:presLayoutVars>
       </dgm:prSet>
       <dgm:spPr/>
-      <dgm:t>
-        <a:bodyPr/>
-        <a:lstStyle/>
-        <a:p>
-          <a:endParaRPr lang="de-DE"/>
-        </a:p>
-      </dgm:t>
     </dgm:pt>
     <dgm:pt modelId="{DB1247AC-8E43-4B42-8A02-9DFEA5D39F1D}" type="pres">
       <dgm:prSet presAssocID="{C11232B9-768D-43CF-B374-CF90DDC07D78}" presName="ThreeNodes_3" presStyleLbl="node1" presStyleIdx="2" presStyleCnt="3">
@@ -2231,13 +2209,6 @@
         </dgm:presLayoutVars>
       </dgm:prSet>
       <dgm:spPr/>
-      <dgm:t>
-        <a:bodyPr/>
-        <a:lstStyle/>
-        <a:p>
-          <a:endParaRPr lang="de-DE"/>
-        </a:p>
-      </dgm:t>
     </dgm:pt>
     <dgm:pt modelId="{7FF2A79E-6BFA-4B97-933F-6469DC672710}" type="pres">
       <dgm:prSet presAssocID="{C11232B9-768D-43CF-B374-CF90DDC07D78}" presName="ThreeConn_1-2" presStyleLbl="fgAccFollowNode1" presStyleIdx="0" presStyleCnt="2">
@@ -2246,13 +2217,6 @@
         </dgm:presLayoutVars>
       </dgm:prSet>
       <dgm:spPr/>
-      <dgm:t>
-        <a:bodyPr/>
-        <a:lstStyle/>
-        <a:p>
-          <a:endParaRPr lang="de-DE"/>
-        </a:p>
-      </dgm:t>
     </dgm:pt>
     <dgm:pt modelId="{FE7C9EB7-B0A3-4533-B39A-C908731017C6}" type="pres">
       <dgm:prSet presAssocID="{C11232B9-768D-43CF-B374-CF90DDC07D78}" presName="ThreeConn_2-3" presStyleLbl="fgAccFollowNode1" presStyleIdx="1" presStyleCnt="2">
@@ -2261,13 +2225,6 @@
         </dgm:presLayoutVars>
       </dgm:prSet>
       <dgm:spPr/>
-      <dgm:t>
-        <a:bodyPr/>
-        <a:lstStyle/>
-        <a:p>
-          <a:endParaRPr lang="de-DE"/>
-        </a:p>
-      </dgm:t>
     </dgm:pt>
     <dgm:pt modelId="{1660B052-0EF1-4E56-9452-340D510374EE}" type="pres">
       <dgm:prSet presAssocID="{C11232B9-768D-43CF-B374-CF90DDC07D78}" presName="ThreeNodes_1_text" presStyleLbl="node1" presStyleIdx="2" presStyleCnt="3">
@@ -2276,13 +2233,6 @@
         </dgm:presLayoutVars>
       </dgm:prSet>
       <dgm:spPr/>
-      <dgm:t>
-        <a:bodyPr/>
-        <a:lstStyle/>
-        <a:p>
-          <a:endParaRPr lang="de-DE"/>
-        </a:p>
-      </dgm:t>
     </dgm:pt>
     <dgm:pt modelId="{36514112-3800-4FE4-B897-0489229987AC}" type="pres">
       <dgm:prSet presAssocID="{C11232B9-768D-43CF-B374-CF90DDC07D78}" presName="ThreeNodes_2_text" presStyleLbl="node1" presStyleIdx="2" presStyleCnt="3">
@@ -2291,13 +2241,6 @@
         </dgm:presLayoutVars>
       </dgm:prSet>
       <dgm:spPr/>
-      <dgm:t>
-        <a:bodyPr/>
-        <a:lstStyle/>
-        <a:p>
-          <a:endParaRPr lang="de-DE"/>
-        </a:p>
-      </dgm:t>
     </dgm:pt>
     <dgm:pt modelId="{B671E5D7-9D13-447B-8BEF-B56EDC0B93B0}" type="pres">
       <dgm:prSet presAssocID="{C11232B9-768D-43CF-B374-CF90DDC07D78}" presName="ThreeNodes_3_text" presStyleLbl="node1" presStyleIdx="2" presStyleCnt="3">
@@ -2306,13 +2249,6 @@
         </dgm:presLayoutVars>
       </dgm:prSet>
       <dgm:spPr/>
-      <dgm:t>
-        <a:bodyPr/>
-        <a:lstStyle/>
-        <a:p>
-          <a:endParaRPr lang="de-DE"/>
-        </a:p>
-      </dgm:t>
     </dgm:pt>
   </dgm:ptLst>
   <dgm:cxnLst>
@@ -2463,10 +2399,9 @@
         <a:lstStyle/>
         <a:p>
           <a:r>
-            <a:rPr lang="de-DE" dirty="0" smtClean="0"/>
+            <a:rPr lang="de-DE" dirty="0"/>
             <a:t>May</a:t>
           </a:r>
-          <a:endParaRPr lang="de-DE" dirty="0"/>
         </a:p>
       </dgm:t>
     </dgm:pt>
@@ -2564,47 +2499,47 @@
         <a:lstStyle/>
         <a:p>
           <a:r>
-            <a:rPr lang="de-DE" dirty="0" err="1" smtClean="0"/>
+            <a:rPr lang="de-DE" dirty="0" err="1"/>
             <a:t>Get</a:t>
           </a:r>
           <a:r>
-            <a:rPr lang="de-DE" dirty="0" smtClean="0"/>
+            <a:rPr lang="de-DE" dirty="0"/>
             <a:t> </a:t>
           </a:r>
           <a:r>
-            <a:rPr lang="de-DE" dirty="0" err="1" smtClean="0"/>
+            <a:rPr lang="de-DE" dirty="0" err="1"/>
             <a:t>familiar</a:t>
           </a:r>
           <a:r>
-            <a:rPr lang="de-DE" dirty="0" smtClean="0"/>
+            <a:rPr lang="de-DE" dirty="0"/>
             <a:t> </a:t>
           </a:r>
           <a:r>
-            <a:rPr lang="de-DE" dirty="0" err="1" smtClean="0"/>
+            <a:rPr lang="de-DE" dirty="0" err="1"/>
             <a:t>with</a:t>
           </a:r>
           <a:r>
-            <a:rPr lang="de-DE" dirty="0" smtClean="0"/>
+            <a:rPr lang="de-DE" dirty="0"/>
             <a:t> </a:t>
           </a:r>
           <a:r>
-            <a:rPr lang="de-DE" dirty="0" err="1" smtClean="0"/>
+            <a:rPr lang="de-DE" dirty="0" err="1"/>
             <a:t>Machine</a:t>
           </a:r>
           <a:r>
-            <a:rPr lang="de-DE" dirty="0" smtClean="0"/>
+            <a:rPr lang="de-DE" dirty="0"/>
             <a:t> Learning, </a:t>
           </a:r>
           <a:r>
-            <a:rPr lang="de-DE" dirty="0" err="1" smtClean="0"/>
+            <a:rPr lang="de-DE" dirty="0" err="1"/>
             <a:t>Tensorflow</a:t>
           </a:r>
           <a:r>
-            <a:rPr lang="de-DE" dirty="0" smtClean="0"/>
+            <a:rPr lang="de-DE" dirty="0"/>
             <a:t>, Papers‘ </a:t>
           </a:r>
           <a:r>
-            <a:rPr lang="de-DE" dirty="0" err="1" smtClean="0"/>
+            <a:rPr lang="de-DE" dirty="0" err="1"/>
             <a:t>Approaches</a:t>
           </a:r>
           <a:endParaRPr lang="de-DE" dirty="0"/>
@@ -2654,13 +2589,8 @@
           </a:r>
           <a:r>
             <a:rPr lang="de-DE" sz="1600" dirty="0"/>
-            <a:t> </a:t>
+            <a:t> Network </a:t>
           </a:r>
-          <a:r>
-            <a:rPr lang="de-DE" sz="1600" dirty="0" smtClean="0"/>
-            <a:t>Network </a:t>
-          </a:r>
-          <a:endParaRPr lang="de-DE" sz="1600" dirty="0"/>
         </a:p>
       </dgm:t>
     </dgm:pt>
@@ -2786,38 +2716,17 @@
         <a:lstStyle/>
         <a:p>
           <a:r>
-            <a:rPr lang="de-DE" dirty="0" smtClean="0"/>
+            <a:rPr lang="de-DE" dirty="0"/>
             <a:t>Turn 2D </a:t>
           </a:r>
           <a:r>
-            <a:rPr lang="de-DE" dirty="0" err="1" smtClean="0"/>
+            <a:rPr lang="de-DE" dirty="0" err="1"/>
             <a:t>into</a:t>
           </a:r>
           <a:r>
-            <a:rPr lang="de-DE" dirty="0" smtClean="0"/>
-            <a:t> 3D, </a:t>
+            <a:rPr lang="de-DE" dirty="0"/>
+            <a:t> 3D,</a:t>
           </a:r>
-          <a:r>
-            <a:rPr lang="de-DE" dirty="0" err="1" smtClean="0"/>
-            <a:t>Achieve</a:t>
-          </a:r>
-          <a:r>
-            <a:rPr lang="de-DE" dirty="0" smtClean="0"/>
-            <a:t> </a:t>
-          </a:r>
-          <a:r>
-            <a:rPr lang="de-DE" dirty="0" err="1" smtClean="0"/>
-            <a:t>Rotational</a:t>
-          </a:r>
-          <a:r>
-            <a:rPr lang="de-DE" dirty="0" smtClean="0"/>
-            <a:t> </a:t>
-          </a:r>
-          <a:r>
-            <a:rPr lang="de-DE" dirty="0" err="1" smtClean="0"/>
-            <a:t>Invariance</a:t>
-          </a:r>
-          <a:endParaRPr lang="de-DE" dirty="0"/>
         </a:p>
       </dgm:t>
     </dgm:pt>
@@ -2851,23 +2760,19 @@
         <a:lstStyle/>
         <a:p>
           <a:r>
-            <a:rPr lang="de-DE" sz="1600" dirty="0" smtClean="0"/>
+            <a:rPr lang="de-DE" sz="1600" dirty="0"/>
             <a:t>Train </a:t>
           </a:r>
           <a:r>
-            <a:rPr lang="de-DE" sz="1600" dirty="0" err="1" smtClean="0"/>
+            <a:rPr lang="de-DE" sz="1600" dirty="0" err="1"/>
             <a:t>Neural</a:t>
           </a:r>
           <a:r>
-            <a:rPr lang="de-DE" sz="1600" dirty="0" smtClean="0"/>
-            <a:t> Network </a:t>
+            <a:rPr lang="de-DE" sz="1600" dirty="0"/>
+            <a:t> Network on </a:t>
           </a:r>
           <a:r>
-            <a:rPr lang="de-DE" sz="1600" dirty="0" smtClean="0"/>
-            <a:t>on </a:t>
-          </a:r>
-          <a:r>
-            <a:rPr lang="de-DE" sz="1600" dirty="0" err="1" smtClean="0">
+            <a:rPr lang="de-DE" sz="1600" dirty="0" err="1">
               <a:solidFill>
                 <a:schemeClr val="bg1"/>
               </a:solidFill>
@@ -2875,7 +2780,7 @@
             <a:t>small</a:t>
           </a:r>
           <a:r>
-            <a:rPr lang="de-DE" sz="1600" dirty="0" smtClean="0">
+            <a:rPr lang="de-DE" sz="1600" dirty="0">
               <a:solidFill>
                 <a:schemeClr val="bg1"/>
               </a:solidFill>
@@ -2883,7 +2788,7 @@
             <a:t> </a:t>
           </a:r>
           <a:r>
-            <a:rPr lang="de-DE" sz="1600" dirty="0" err="1" smtClean="0">
+            <a:rPr lang="de-DE" sz="1600" dirty="0" err="1">
               <a:solidFill>
                 <a:schemeClr val="bg1"/>
               </a:solidFill>
@@ -2957,7 +2862,7 @@
         <a:lstStyle/>
         <a:p>
           <a:r>
-            <a:rPr lang="de-DE" sz="1600" dirty="0" smtClean="0">
+            <a:rPr lang="de-DE" sz="1600" dirty="0">
               <a:solidFill>
                 <a:schemeClr val="bg1"/>
               </a:solidFill>
@@ -2965,7 +2870,7 @@
             <a:t>Begin </a:t>
           </a:r>
           <a:r>
-            <a:rPr lang="de-DE" sz="1600" dirty="0" err="1" smtClean="0">
+            <a:rPr lang="de-DE" sz="1600" dirty="0" err="1">
               <a:solidFill>
                 <a:schemeClr val="bg1"/>
               </a:solidFill>
@@ -2973,7 +2878,7 @@
             <a:t>training</a:t>
           </a:r>
           <a:r>
-            <a:rPr lang="de-DE" sz="1600" dirty="0" smtClean="0">
+            <a:rPr lang="de-DE" sz="1600" dirty="0">
               <a:solidFill>
                 <a:schemeClr val="bg1"/>
               </a:solidFill>
@@ -2981,7 +2886,7 @@
             <a:t> on </a:t>
           </a:r>
           <a:r>
-            <a:rPr lang="de-DE" sz="1600" dirty="0" err="1" smtClean="0">
+            <a:rPr lang="de-DE" sz="1600" dirty="0" err="1">
               <a:solidFill>
                 <a:schemeClr val="bg1"/>
               </a:solidFill>
@@ -2989,7 +2894,7 @@
             <a:t>big</a:t>
           </a:r>
           <a:r>
-            <a:rPr lang="de-DE" sz="1600" dirty="0" smtClean="0">
+            <a:rPr lang="de-DE" sz="1600" dirty="0">
               <a:solidFill>
                 <a:schemeClr val="bg1"/>
               </a:solidFill>
@@ -2997,7 +2902,7 @@
             <a:t> </a:t>
           </a:r>
           <a:r>
-            <a:rPr lang="de-DE" sz="1600" dirty="0" err="1" smtClean="0">
+            <a:rPr lang="de-DE" sz="1600" dirty="0" err="1">
               <a:solidFill>
                 <a:schemeClr val="bg1"/>
               </a:solidFill>
@@ -3005,7 +2910,7 @@
             <a:t>data</a:t>
           </a:r>
           <a:r>
-            <a:rPr lang="de-DE" sz="1600" dirty="0" smtClean="0">
+            <a:rPr lang="de-DE" sz="1600" dirty="0">
               <a:solidFill>
                 <a:schemeClr val="bg1"/>
               </a:solidFill>
@@ -3013,7 +2918,7 @@
             <a:t> </a:t>
           </a:r>
           <a:r>
-            <a:rPr lang="de-DE" sz="1600" dirty="0" err="1" smtClean="0">
+            <a:rPr lang="de-DE" sz="1600" dirty="0" err="1">
               <a:solidFill>
                 <a:schemeClr val="bg1"/>
               </a:solidFill>
@@ -3021,7 +2926,7 @@
             <a:t>set</a:t>
           </a:r>
           <a:r>
-            <a:rPr lang="de-DE" sz="1600" dirty="0" smtClean="0">
+            <a:rPr lang="de-DE" sz="1600" dirty="0">
               <a:solidFill>
                 <a:schemeClr val="bg1"/>
               </a:solidFill>
@@ -3029,7 +2934,7 @@
             <a:t> </a:t>
           </a:r>
           <a:r>
-            <a:rPr lang="de-DE" sz="1600" dirty="0" err="1" smtClean="0">
+            <a:rPr lang="de-DE" sz="1600" dirty="0" err="1">
               <a:solidFill>
                 <a:schemeClr val="bg1"/>
               </a:solidFill>
@@ -3037,7 +2942,7 @@
             <a:t>and</a:t>
           </a:r>
           <a:r>
-            <a:rPr lang="de-DE" sz="1600" dirty="0" smtClean="0">
+            <a:rPr lang="de-DE" sz="1600" dirty="0">
               <a:solidFill>
                 <a:schemeClr val="bg1"/>
               </a:solidFill>
@@ -3045,7 +2950,7 @@
             <a:t> on </a:t>
           </a:r>
           <a:r>
-            <a:rPr lang="de-DE" sz="1600" dirty="0" err="1" smtClean="0">
+            <a:rPr lang="de-DE" sz="1600" dirty="0" err="1">
               <a:solidFill>
                 <a:schemeClr val="bg1"/>
               </a:solidFill>
@@ -3053,20 +2958,124 @@
             <a:t>gpu</a:t>
           </a:r>
           <a:r>
-            <a:rPr lang="de-DE" sz="1600" dirty="0" smtClean="0">
+            <a:rPr lang="de-DE" sz="1600" dirty="0">
               <a:solidFill>
                 <a:schemeClr val="bg1"/>
               </a:solidFill>
             </a:rPr>
-            <a:t> / </a:t>
+            <a:t>  (</a:t>
           </a:r>
           <a:r>
-            <a:rPr lang="de-DE" sz="1600" dirty="0" err="1" smtClean="0">
+            <a:rPr lang="de-DE" sz="1600" dirty="0" err="1">
+              <a:solidFill>
+                <a:schemeClr val="bg1"/>
+              </a:solidFill>
+            </a:rPr>
+            <a:t>eventually</a:t>
+          </a:r>
+          <a:r>
+            <a:rPr lang="de-DE" sz="1600" dirty="0">
+              <a:solidFill>
+                <a:schemeClr val="bg1"/>
+              </a:solidFill>
+            </a:rPr>
+            <a:t> on </a:t>
+          </a:r>
+          <a:r>
+            <a:rPr lang="de-DE" sz="1600" dirty="0" err="1">
               <a:solidFill>
                 <a:schemeClr val="bg1"/>
               </a:solidFill>
             </a:rPr>
             <a:t>cluster</a:t>
+          </a:r>
+          <a:r>
+            <a:rPr lang="de-DE" sz="1600" dirty="0">
+              <a:solidFill>
+                <a:schemeClr val="bg1"/>
+              </a:solidFill>
+            </a:rPr>
+            <a:t> </a:t>
+          </a:r>
+          <a:r>
+            <a:rPr lang="de-DE" sz="1600" dirty="0" err="1">
+              <a:solidFill>
+                <a:schemeClr val="bg1"/>
+              </a:solidFill>
+            </a:rPr>
+            <a:t>with</a:t>
+          </a:r>
+          <a:r>
+            <a:rPr lang="de-DE" sz="1600" dirty="0">
+              <a:solidFill>
+                <a:schemeClr val="bg1"/>
+              </a:solidFill>
+            </a:rPr>
+            <a:t> </a:t>
+          </a:r>
+          <a:r>
+            <a:rPr lang="de-DE" sz="1600" dirty="0" err="1">
+              <a:solidFill>
+                <a:schemeClr val="bg1"/>
+              </a:solidFill>
+            </a:rPr>
+            <a:t>elephas</a:t>
+          </a:r>
+          <a:r>
+            <a:rPr lang="de-DE" sz="1600" dirty="0">
+              <a:solidFill>
+                <a:schemeClr val="bg1"/>
+              </a:solidFill>
+            </a:rPr>
+            <a:t> – </a:t>
+          </a:r>
+          <a:r>
+            <a:rPr lang="de-DE" sz="1600" dirty="0" err="1">
+              <a:solidFill>
+                <a:schemeClr val="bg1"/>
+              </a:solidFill>
+            </a:rPr>
+            <a:t>current</a:t>
+          </a:r>
+          <a:r>
+            <a:rPr lang="de-DE" sz="1600" dirty="0">
+              <a:solidFill>
+                <a:schemeClr val="bg1"/>
+              </a:solidFill>
+            </a:rPr>
+            <a:t> </a:t>
+          </a:r>
+          <a:r>
+            <a:rPr lang="de-DE" sz="1600" dirty="0" err="1">
+              <a:solidFill>
+                <a:schemeClr val="bg1"/>
+              </a:solidFill>
+            </a:rPr>
+            <a:t>build</a:t>
+          </a:r>
+          <a:r>
+            <a:rPr lang="de-DE" sz="1600" dirty="0">
+              <a:solidFill>
+                <a:schemeClr val="bg1"/>
+              </a:solidFill>
+            </a:rPr>
+            <a:t> </a:t>
+          </a:r>
+          <a:r>
+            <a:rPr lang="de-DE" sz="1600" dirty="0" err="1">
+              <a:solidFill>
+                <a:schemeClr val="bg1"/>
+              </a:solidFill>
+            </a:rPr>
+            <a:t>failing</a:t>
+          </a:r>
+          <a:r>
+            <a:rPr lang="de-DE" sz="1600" dirty="0">
+              <a:solidFill>
+                <a:schemeClr val="bg1"/>
+              </a:solidFill>
+            </a:rPr>
+            <a:t>)</a:t>
           </a:r>
           <a:endParaRPr lang="de-DE" sz="1600" dirty="0"/>
         </a:p>
@@ -3103,13 +3112,6 @@
         </dgm:presLayoutVars>
       </dgm:prSet>
       <dgm:spPr/>
-      <dgm:t>
-        <a:bodyPr/>
-        <a:lstStyle/>
-        <a:p>
-          <a:endParaRPr lang="de-DE"/>
-        </a:p>
-      </dgm:t>
     </dgm:pt>
     <dgm:pt modelId="{6D503C82-C8B4-4E6B-A82B-B6545BB130ED}" type="pres">
       <dgm:prSet presAssocID="{C11232B9-768D-43CF-B374-CF90DDC07D78}" presName="dummyMaxCanvas" presStyleCnt="0">
@@ -3124,13 +3126,6 @@
         </dgm:presLayoutVars>
       </dgm:prSet>
       <dgm:spPr/>
-      <dgm:t>
-        <a:bodyPr/>
-        <a:lstStyle/>
-        <a:p>
-          <a:endParaRPr lang="de-DE"/>
-        </a:p>
-      </dgm:t>
     </dgm:pt>
     <dgm:pt modelId="{9B065EF6-1C62-4261-A7F1-CA82309D444B}" type="pres">
       <dgm:prSet presAssocID="{C11232B9-768D-43CF-B374-CF90DDC07D78}" presName="ThreeNodes_2" presStyleLbl="node1" presStyleIdx="1" presStyleCnt="3" custLinFactNeighborY="4986">
@@ -3139,13 +3134,6 @@
         </dgm:presLayoutVars>
       </dgm:prSet>
       <dgm:spPr/>
-      <dgm:t>
-        <a:bodyPr/>
-        <a:lstStyle/>
-        <a:p>
-          <a:endParaRPr lang="de-DE"/>
-        </a:p>
-      </dgm:t>
     </dgm:pt>
     <dgm:pt modelId="{DB1247AC-8E43-4B42-8A02-9DFEA5D39F1D}" type="pres">
       <dgm:prSet presAssocID="{C11232B9-768D-43CF-B374-CF90DDC07D78}" presName="ThreeNodes_3" presStyleLbl="node1" presStyleIdx="2" presStyleCnt="3" custLinFactNeighborY="-766">
@@ -3154,13 +3142,6 @@
         </dgm:presLayoutVars>
       </dgm:prSet>
       <dgm:spPr/>
-      <dgm:t>
-        <a:bodyPr/>
-        <a:lstStyle/>
-        <a:p>
-          <a:endParaRPr lang="de-DE"/>
-        </a:p>
-      </dgm:t>
     </dgm:pt>
     <dgm:pt modelId="{7FF2A79E-6BFA-4B97-933F-6469DC672710}" type="pres">
       <dgm:prSet presAssocID="{C11232B9-768D-43CF-B374-CF90DDC07D78}" presName="ThreeConn_1-2" presStyleLbl="fgAccFollowNode1" presStyleIdx="0" presStyleCnt="2">
@@ -3169,13 +3150,6 @@
         </dgm:presLayoutVars>
       </dgm:prSet>
       <dgm:spPr/>
-      <dgm:t>
-        <a:bodyPr/>
-        <a:lstStyle/>
-        <a:p>
-          <a:endParaRPr lang="de-DE"/>
-        </a:p>
-      </dgm:t>
     </dgm:pt>
     <dgm:pt modelId="{FE7C9EB7-B0A3-4533-B39A-C908731017C6}" type="pres">
       <dgm:prSet presAssocID="{C11232B9-768D-43CF-B374-CF90DDC07D78}" presName="ThreeConn_2-3" presStyleLbl="fgAccFollowNode1" presStyleIdx="1" presStyleCnt="2">
@@ -3184,13 +3158,6 @@
         </dgm:presLayoutVars>
       </dgm:prSet>
       <dgm:spPr/>
-      <dgm:t>
-        <a:bodyPr/>
-        <a:lstStyle/>
-        <a:p>
-          <a:endParaRPr lang="de-DE"/>
-        </a:p>
-      </dgm:t>
     </dgm:pt>
     <dgm:pt modelId="{1660B052-0EF1-4E56-9452-340D510374EE}" type="pres">
       <dgm:prSet presAssocID="{C11232B9-768D-43CF-B374-CF90DDC07D78}" presName="ThreeNodes_1_text" presStyleLbl="node1" presStyleIdx="2" presStyleCnt="3">
@@ -3199,13 +3166,6 @@
         </dgm:presLayoutVars>
       </dgm:prSet>
       <dgm:spPr/>
-      <dgm:t>
-        <a:bodyPr/>
-        <a:lstStyle/>
-        <a:p>
-          <a:endParaRPr lang="de-DE"/>
-        </a:p>
-      </dgm:t>
     </dgm:pt>
     <dgm:pt modelId="{36514112-3800-4FE4-B897-0489229987AC}" type="pres">
       <dgm:prSet presAssocID="{C11232B9-768D-43CF-B374-CF90DDC07D78}" presName="ThreeNodes_2_text" presStyleLbl="node1" presStyleIdx="2" presStyleCnt="3">
@@ -3214,13 +3174,6 @@
         </dgm:presLayoutVars>
       </dgm:prSet>
       <dgm:spPr/>
-      <dgm:t>
-        <a:bodyPr/>
-        <a:lstStyle/>
-        <a:p>
-          <a:endParaRPr lang="de-DE"/>
-        </a:p>
-      </dgm:t>
     </dgm:pt>
     <dgm:pt modelId="{B671E5D7-9D13-447B-8BEF-B56EDC0B93B0}" type="pres">
       <dgm:prSet presAssocID="{C11232B9-768D-43CF-B374-CF90DDC07D78}" presName="ThreeNodes_3_text" presStyleLbl="node1" presStyleIdx="2" presStyleCnt="3">
@@ -3229,13 +3182,6 @@
         </dgm:presLayoutVars>
       </dgm:prSet>
       <dgm:spPr/>
-      <dgm:t>
-        <a:bodyPr/>
-        <a:lstStyle/>
-        <a:p>
-          <a:endParaRPr lang="de-DE"/>
-        </a:p>
-      </dgm:t>
     </dgm:pt>
   </dgm:ptLst>
   <dgm:cxnLst>
@@ -3357,12 +3303,12 @@
         </a:fontRef>
       </dsp:style>
       <dsp:txBody>
-        <a:bodyPr spcFirstLastPara="0" vert="horz" wrap="square" lIns="76200" tIns="76200" rIns="76200" bIns="76200" numCol="1" spcCol="1270" anchor="ctr" anchorCtr="0">
+        <a:bodyPr spcFirstLastPara="0" vert="horz" wrap="square" lIns="80010" tIns="80010" rIns="80010" bIns="80010" numCol="1" spcCol="1270" anchor="ctr" anchorCtr="0">
           <a:noAutofit/>
         </a:bodyPr>
         <a:lstStyle/>
         <a:p>
-          <a:pPr lvl="0" algn="l" defTabSz="889000">
+          <a:pPr marL="0" lvl="0" indent="0" algn="l" defTabSz="933450">
             <a:lnSpc>
               <a:spcPct val="90000"/>
             </a:lnSpc>
@@ -3372,9 +3318,10 @@
             <a:spcAft>
               <a:spcPct val="35000"/>
             </a:spcAft>
+            <a:buNone/>
           </a:pPr>
           <a:r>
-            <a:rPr lang="de-DE" sz="2000" kern="1200" dirty="0"/>
+            <a:rPr lang="de-DE" sz="2100" kern="1200" dirty="0"/>
             <a:t>March</a:t>
           </a:r>
         </a:p>
@@ -3389,7 +3336,7 @@
             <a:spcAft>
               <a:spcPct val="15000"/>
             </a:spcAft>
-            <a:buChar char="••"/>
+            <a:buChar char="•"/>
           </a:pPr>
           <a:r>
             <a:rPr lang="de-DE" sz="1600" kern="1200" dirty="0" err="1"/>
@@ -3435,10 +3382,10 @@
             <a:spcAft>
               <a:spcPct val="15000"/>
             </a:spcAft>
-            <a:buChar char="••"/>
+            <a:buChar char="•"/>
           </a:pPr>
           <a:r>
-            <a:rPr lang="de-DE" sz="1600" kern="1200" smtClean="0"/>
+            <a:rPr lang="de-DE" sz="1600" kern="1200"/>
             <a:t>Get familiar with Machine Learning, Tensorflow, Papers‘ Approaches</a:t>
           </a:r>
           <a:endParaRPr lang="de-DE" sz="1600" kern="1200" dirty="0"/>
@@ -3500,12 +3447,12 @@
         </a:fontRef>
       </dsp:style>
       <dsp:txBody>
-        <a:bodyPr spcFirstLastPara="0" vert="horz" wrap="square" lIns="76200" tIns="76200" rIns="76200" bIns="76200" numCol="1" spcCol="1270" anchor="ctr" anchorCtr="0">
+        <a:bodyPr spcFirstLastPara="0" vert="horz" wrap="square" lIns="80010" tIns="80010" rIns="80010" bIns="80010" numCol="1" spcCol="1270" anchor="ctr" anchorCtr="0">
           <a:noAutofit/>
         </a:bodyPr>
         <a:lstStyle/>
         <a:p>
-          <a:pPr lvl="0" algn="l" defTabSz="889000">
+          <a:pPr marL="0" lvl="0" indent="0" algn="l" defTabSz="933450">
             <a:lnSpc>
               <a:spcPct val="90000"/>
             </a:lnSpc>
@@ -3515,9 +3462,10 @@
             <a:spcAft>
               <a:spcPct val="35000"/>
             </a:spcAft>
+            <a:buNone/>
           </a:pPr>
           <a:r>
-            <a:rPr lang="de-DE" sz="2000" kern="1200" dirty="0"/>
+            <a:rPr lang="de-DE" sz="2100" kern="1200" dirty="0"/>
             <a:t>April</a:t>
           </a:r>
         </a:p>
@@ -3532,7 +3480,7 @@
             <a:spcAft>
               <a:spcPct val="15000"/>
             </a:spcAft>
-            <a:buChar char="••"/>
+            <a:buChar char="•"/>
           </a:pPr>
           <a:r>
             <a:rPr lang="de-DE" sz="1600" kern="1200" dirty="0" err="1"/>
@@ -3562,7 +3510,7 @@
             <a:spcAft>
               <a:spcPct val="15000"/>
             </a:spcAft>
-            <a:buChar char="••"/>
+            <a:buChar char="•"/>
           </a:pPr>
           <a:r>
             <a:rPr lang="de-DE" sz="1600" kern="1200" dirty="0"/>
@@ -3655,12 +3603,12 @@
         </a:fontRef>
       </dsp:style>
       <dsp:txBody>
-        <a:bodyPr spcFirstLastPara="0" vert="horz" wrap="square" lIns="76200" tIns="76200" rIns="76200" bIns="76200" numCol="1" spcCol="1270" anchor="ctr" anchorCtr="0">
+        <a:bodyPr spcFirstLastPara="0" vert="horz" wrap="square" lIns="80010" tIns="80010" rIns="80010" bIns="80010" numCol="1" spcCol="1270" anchor="ctr" anchorCtr="0">
           <a:noAutofit/>
         </a:bodyPr>
         <a:lstStyle/>
         <a:p>
-          <a:pPr lvl="0" algn="l" defTabSz="889000">
+          <a:pPr marL="0" lvl="0" indent="0" algn="l" defTabSz="933450">
             <a:lnSpc>
               <a:spcPct val="90000"/>
             </a:lnSpc>
@@ -3670,12 +3618,12 @@
             <a:spcAft>
               <a:spcPct val="35000"/>
             </a:spcAft>
+            <a:buNone/>
           </a:pPr>
           <a:r>
-            <a:rPr lang="de-DE" sz="2000" kern="1200" dirty="0" smtClean="0"/>
+            <a:rPr lang="de-DE" sz="2100" kern="1200" dirty="0"/>
             <a:t>May</a:t>
           </a:r>
-          <a:endParaRPr lang="de-DE" sz="2000" kern="1200" dirty="0"/>
         </a:p>
         <a:p>
           <a:pPr marL="171450" lvl="1" indent="-171450" algn="l" defTabSz="711200">
@@ -3688,7 +3636,7 @@
             <a:spcAft>
               <a:spcPct val="15000"/>
             </a:spcAft>
-            <a:buChar char="••"/>
+            <a:buChar char="•"/>
           </a:pPr>
           <a:r>
             <a:rPr lang="de-DE" sz="1600" kern="1200" dirty="0"/>
@@ -3714,7 +3662,7 @@
             <a:spcAft>
               <a:spcPct val="15000"/>
             </a:spcAft>
-            <a:buChar char="••"/>
+            <a:buChar char="•"/>
           </a:pPr>
           <a:r>
             <a:rPr lang="de-DE" sz="1600" kern="1200" dirty="0"/>
@@ -3732,7 +3680,7 @@
             <a:spcAft>
               <a:spcPct val="15000"/>
             </a:spcAft>
-            <a:buChar char="••"/>
+            <a:buChar char="•"/>
           </a:pPr>
           <a:r>
             <a:rPr lang="de-DE" sz="1600" kern="1200" dirty="0" err="1"/>
@@ -3824,7 +3772,7 @@
         </a:bodyPr>
         <a:lstStyle/>
         <a:p>
-          <a:pPr lvl="0" algn="ctr" defTabSz="1600200">
+          <a:pPr marL="0" lvl="0" indent="0" algn="ctr" defTabSz="1600200">
             <a:lnSpc>
               <a:spcPct val="90000"/>
             </a:lnSpc>
@@ -3834,6 +3782,7 @@
             <a:spcAft>
               <a:spcPct val="35000"/>
             </a:spcAft>
+            <a:buNone/>
           </a:pPr>
           <a:endParaRPr lang="de-DE" sz="3600" kern="1200"/>
         </a:p>
@@ -3902,7 +3851,7 @@
         </a:bodyPr>
         <a:lstStyle/>
         <a:p>
-          <a:pPr lvl="0" algn="ctr" defTabSz="1600200">
+          <a:pPr marL="0" lvl="0" indent="0" algn="ctr" defTabSz="1600200">
             <a:lnSpc>
               <a:spcPct val="90000"/>
             </a:lnSpc>
@@ -3912,6 +3861,7 @@
             <a:spcAft>
               <a:spcPct val="35000"/>
             </a:spcAft>
+            <a:buNone/>
           </a:pPr>
           <a:endParaRPr lang="de-DE" sz="3600" kern="1200"/>
         </a:p>
@@ -3989,7 +3939,7 @@
         </a:bodyPr>
         <a:lstStyle/>
         <a:p>
-          <a:pPr lvl="0" algn="l" defTabSz="889000">
+          <a:pPr marL="0" lvl="0" indent="0" algn="l" defTabSz="889000">
             <a:lnSpc>
               <a:spcPct val="90000"/>
             </a:lnSpc>
@@ -3999,6 +3949,7 @@
             <a:spcAft>
               <a:spcPct val="35000"/>
             </a:spcAft>
+            <a:buNone/>
           </a:pPr>
           <a:r>
             <a:rPr lang="de-DE" sz="2000" kern="1200" dirty="0"/>
@@ -4016,7 +3967,7 @@
             <a:spcAft>
               <a:spcPct val="15000"/>
             </a:spcAft>
-            <a:buChar char="••"/>
+            <a:buChar char="•"/>
           </a:pPr>
           <a:r>
             <a:rPr lang="de-DE" sz="1600" kern="1200" dirty="0" err="1"/>
@@ -4062,50 +4013,50 @@
             <a:spcAft>
               <a:spcPct val="15000"/>
             </a:spcAft>
-            <a:buChar char="••"/>
+            <a:buChar char="•"/>
           </a:pPr>
           <a:r>
-            <a:rPr lang="de-DE" sz="1600" kern="1200" dirty="0" err="1" smtClean="0"/>
+            <a:rPr lang="de-DE" sz="1600" kern="1200" dirty="0" err="1"/>
             <a:t>Get</a:t>
           </a:r>
           <a:r>
-            <a:rPr lang="de-DE" sz="1600" kern="1200" dirty="0" smtClean="0"/>
+            <a:rPr lang="de-DE" sz="1600" kern="1200" dirty="0"/>
             <a:t> </a:t>
           </a:r>
           <a:r>
-            <a:rPr lang="de-DE" sz="1600" kern="1200" dirty="0" err="1" smtClean="0"/>
+            <a:rPr lang="de-DE" sz="1600" kern="1200" dirty="0" err="1"/>
             <a:t>familiar</a:t>
           </a:r>
           <a:r>
-            <a:rPr lang="de-DE" sz="1600" kern="1200" dirty="0" smtClean="0"/>
+            <a:rPr lang="de-DE" sz="1600" kern="1200" dirty="0"/>
             <a:t> </a:t>
           </a:r>
           <a:r>
-            <a:rPr lang="de-DE" sz="1600" kern="1200" dirty="0" err="1" smtClean="0"/>
+            <a:rPr lang="de-DE" sz="1600" kern="1200" dirty="0" err="1"/>
             <a:t>with</a:t>
           </a:r>
           <a:r>
-            <a:rPr lang="de-DE" sz="1600" kern="1200" dirty="0" smtClean="0"/>
+            <a:rPr lang="de-DE" sz="1600" kern="1200" dirty="0"/>
             <a:t> </a:t>
           </a:r>
           <a:r>
-            <a:rPr lang="de-DE" sz="1600" kern="1200" dirty="0" err="1" smtClean="0"/>
+            <a:rPr lang="de-DE" sz="1600" kern="1200" dirty="0" err="1"/>
             <a:t>Machine</a:t>
           </a:r>
           <a:r>
-            <a:rPr lang="de-DE" sz="1600" kern="1200" dirty="0" smtClean="0"/>
+            <a:rPr lang="de-DE" sz="1600" kern="1200" dirty="0"/>
             <a:t> Learning, </a:t>
           </a:r>
           <a:r>
-            <a:rPr lang="de-DE" sz="1600" kern="1200" dirty="0" err="1" smtClean="0"/>
+            <a:rPr lang="de-DE" sz="1600" kern="1200" dirty="0" err="1"/>
             <a:t>Tensorflow</a:t>
           </a:r>
           <a:r>
-            <a:rPr lang="de-DE" sz="1600" kern="1200" dirty="0" smtClean="0"/>
+            <a:rPr lang="de-DE" sz="1600" kern="1200" dirty="0"/>
             <a:t>, Papers‘ </a:t>
           </a:r>
           <a:r>
-            <a:rPr lang="de-DE" sz="1600" kern="1200" dirty="0" err="1" smtClean="0"/>
+            <a:rPr lang="de-DE" sz="1600" kern="1200" dirty="0" err="1"/>
             <a:t>Approaches</a:t>
           </a:r>
           <a:endParaRPr lang="de-DE" sz="1600" kern="1200" dirty="0"/>
@@ -4121,41 +4072,20 @@
             <a:spcAft>
               <a:spcPct val="15000"/>
             </a:spcAft>
-            <a:buChar char="••"/>
+            <a:buChar char="•"/>
           </a:pPr>
           <a:r>
-            <a:rPr lang="de-DE" sz="1600" kern="1200" dirty="0" smtClean="0"/>
+            <a:rPr lang="de-DE" sz="1600" kern="1200" dirty="0"/>
             <a:t>Turn 2D </a:t>
           </a:r>
           <a:r>
-            <a:rPr lang="de-DE" sz="1600" kern="1200" dirty="0" err="1" smtClean="0"/>
+            <a:rPr lang="de-DE" sz="1600" kern="1200" dirty="0" err="1"/>
             <a:t>into</a:t>
           </a:r>
           <a:r>
-            <a:rPr lang="de-DE" sz="1600" kern="1200" dirty="0" smtClean="0"/>
-            <a:t> 3D, </a:t>
+            <a:rPr lang="de-DE" sz="1600" kern="1200" dirty="0"/>
+            <a:t> 3D,</a:t>
           </a:r>
-          <a:r>
-            <a:rPr lang="de-DE" sz="1600" kern="1200" dirty="0" err="1" smtClean="0"/>
-            <a:t>Achieve</a:t>
-          </a:r>
-          <a:r>
-            <a:rPr lang="de-DE" sz="1600" kern="1200" dirty="0" smtClean="0"/>
-            <a:t> </a:t>
-          </a:r>
-          <a:r>
-            <a:rPr lang="de-DE" sz="1600" kern="1200" dirty="0" err="1" smtClean="0"/>
-            <a:t>Rotational</a:t>
-          </a:r>
-          <a:r>
-            <a:rPr lang="de-DE" sz="1600" kern="1200" dirty="0" smtClean="0"/>
-            <a:t> </a:t>
-          </a:r>
-          <a:r>
-            <a:rPr lang="de-DE" sz="1600" kern="1200" dirty="0" err="1" smtClean="0"/>
-            <a:t>Invariance</a:t>
-          </a:r>
-          <a:endParaRPr lang="de-DE" sz="1600" kern="1200" dirty="0"/>
         </a:p>
       </dsp:txBody>
       <dsp:txXfrm>
@@ -4219,7 +4149,7 @@
         </a:bodyPr>
         <a:lstStyle/>
         <a:p>
-          <a:pPr lvl="0" algn="l" defTabSz="889000">
+          <a:pPr marL="0" lvl="0" indent="0" algn="l" defTabSz="889000">
             <a:lnSpc>
               <a:spcPct val="90000"/>
             </a:lnSpc>
@@ -4229,6 +4159,7 @@
             <a:spcAft>
               <a:spcPct val="35000"/>
             </a:spcAft>
+            <a:buNone/>
           </a:pPr>
           <a:r>
             <a:rPr lang="de-DE" sz="2000" kern="1200" dirty="0"/>
@@ -4246,7 +4177,7 @@
             <a:spcAft>
               <a:spcPct val="15000"/>
             </a:spcAft>
-            <a:buChar char="••"/>
+            <a:buChar char="•"/>
           </a:pPr>
           <a:r>
             <a:rPr lang="de-DE" sz="1600" kern="1200" dirty="0" err="1"/>
@@ -4262,13 +4193,8 @@
           </a:r>
           <a:r>
             <a:rPr lang="de-DE" sz="1600" kern="1200" dirty="0"/>
-            <a:t> </a:t>
+            <a:t> Network </a:t>
           </a:r>
-          <a:r>
-            <a:rPr lang="de-DE" sz="1600" kern="1200" dirty="0" smtClean="0"/>
-            <a:t>Network </a:t>
-          </a:r>
-          <a:endParaRPr lang="de-DE" sz="1600" kern="1200" dirty="0"/>
         </a:p>
         <a:p>
           <a:pPr marL="171450" lvl="1" indent="-171450" algn="l" defTabSz="711200">
@@ -4281,26 +4207,22 @@
             <a:spcAft>
               <a:spcPct val="15000"/>
             </a:spcAft>
-            <a:buChar char="••"/>
+            <a:buChar char="•"/>
           </a:pPr>
           <a:r>
-            <a:rPr lang="de-DE" sz="1600" kern="1200" dirty="0" smtClean="0"/>
+            <a:rPr lang="de-DE" sz="1600" kern="1200" dirty="0"/>
             <a:t>Train </a:t>
           </a:r>
           <a:r>
-            <a:rPr lang="de-DE" sz="1600" kern="1200" dirty="0" err="1" smtClean="0"/>
+            <a:rPr lang="de-DE" sz="1600" kern="1200" dirty="0" err="1"/>
             <a:t>Neural</a:t>
           </a:r>
           <a:r>
-            <a:rPr lang="de-DE" sz="1600" kern="1200" dirty="0" smtClean="0"/>
-            <a:t> Network </a:t>
+            <a:rPr lang="de-DE" sz="1600" kern="1200" dirty="0"/>
+            <a:t> Network on </a:t>
           </a:r>
           <a:r>
-            <a:rPr lang="de-DE" sz="1600" kern="1200" dirty="0" smtClean="0"/>
-            <a:t>on </a:t>
-          </a:r>
-          <a:r>
-            <a:rPr lang="de-DE" sz="1600" kern="1200" dirty="0" err="1" smtClean="0">
+            <a:rPr lang="de-DE" sz="1600" kern="1200" dirty="0" err="1">
               <a:solidFill>
                 <a:schemeClr val="bg1"/>
               </a:solidFill>
@@ -4308,7 +4230,7 @@
             <a:t>small</a:t>
           </a:r>
           <a:r>
-            <a:rPr lang="de-DE" sz="1600" kern="1200" dirty="0" smtClean="0">
+            <a:rPr lang="de-DE" sz="1600" kern="1200" dirty="0">
               <a:solidFill>
                 <a:schemeClr val="bg1"/>
               </a:solidFill>
@@ -4316,7 +4238,7 @@
             <a:t> </a:t>
           </a:r>
           <a:r>
-            <a:rPr lang="de-DE" sz="1600" kern="1200" dirty="0" err="1" smtClean="0">
+            <a:rPr lang="de-DE" sz="1600" kern="1200" dirty="0" err="1">
               <a:solidFill>
                 <a:schemeClr val="bg1"/>
               </a:solidFill>
@@ -4336,10 +4258,10 @@
             <a:spcAft>
               <a:spcPct val="15000"/>
             </a:spcAft>
-            <a:buChar char="••"/>
+            <a:buChar char="•"/>
           </a:pPr>
           <a:r>
-            <a:rPr lang="de-DE" sz="1600" kern="1200" dirty="0" smtClean="0">
+            <a:rPr lang="de-DE" sz="1600" kern="1200" dirty="0">
               <a:solidFill>
                 <a:schemeClr val="bg1"/>
               </a:solidFill>
@@ -4347,7 +4269,7 @@
             <a:t>Begin </a:t>
           </a:r>
           <a:r>
-            <a:rPr lang="de-DE" sz="1600" kern="1200" dirty="0" err="1" smtClean="0">
+            <a:rPr lang="de-DE" sz="1600" kern="1200" dirty="0" err="1">
               <a:solidFill>
                 <a:schemeClr val="bg1"/>
               </a:solidFill>
@@ -4355,7 +4277,7 @@
             <a:t>training</a:t>
           </a:r>
           <a:r>
-            <a:rPr lang="de-DE" sz="1600" kern="1200" dirty="0" smtClean="0">
+            <a:rPr lang="de-DE" sz="1600" kern="1200" dirty="0">
               <a:solidFill>
                 <a:schemeClr val="bg1"/>
               </a:solidFill>
@@ -4363,7 +4285,7 @@
             <a:t> on </a:t>
           </a:r>
           <a:r>
-            <a:rPr lang="de-DE" sz="1600" kern="1200" dirty="0" err="1" smtClean="0">
+            <a:rPr lang="de-DE" sz="1600" kern="1200" dirty="0" err="1">
               <a:solidFill>
                 <a:schemeClr val="bg1"/>
               </a:solidFill>
@@ -4371,7 +4293,7 @@
             <a:t>big</a:t>
           </a:r>
           <a:r>
-            <a:rPr lang="de-DE" sz="1600" kern="1200" dirty="0" smtClean="0">
+            <a:rPr lang="de-DE" sz="1600" kern="1200" dirty="0">
               <a:solidFill>
                 <a:schemeClr val="bg1"/>
               </a:solidFill>
@@ -4379,7 +4301,7 @@
             <a:t> </a:t>
           </a:r>
           <a:r>
-            <a:rPr lang="de-DE" sz="1600" kern="1200" dirty="0" err="1" smtClean="0">
+            <a:rPr lang="de-DE" sz="1600" kern="1200" dirty="0" err="1">
               <a:solidFill>
                 <a:schemeClr val="bg1"/>
               </a:solidFill>
@@ -4387,7 +4309,7 @@
             <a:t>data</a:t>
           </a:r>
           <a:r>
-            <a:rPr lang="de-DE" sz="1600" kern="1200" dirty="0" smtClean="0">
+            <a:rPr lang="de-DE" sz="1600" kern="1200" dirty="0">
               <a:solidFill>
                 <a:schemeClr val="bg1"/>
               </a:solidFill>
@@ -4395,7 +4317,7 @@
             <a:t> </a:t>
           </a:r>
           <a:r>
-            <a:rPr lang="de-DE" sz="1600" kern="1200" dirty="0" err="1" smtClean="0">
+            <a:rPr lang="de-DE" sz="1600" kern="1200" dirty="0" err="1">
               <a:solidFill>
                 <a:schemeClr val="bg1"/>
               </a:solidFill>
@@ -4403,7 +4325,7 @@
             <a:t>set</a:t>
           </a:r>
           <a:r>
-            <a:rPr lang="de-DE" sz="1600" kern="1200" dirty="0" smtClean="0">
+            <a:rPr lang="de-DE" sz="1600" kern="1200" dirty="0">
               <a:solidFill>
                 <a:schemeClr val="bg1"/>
               </a:solidFill>
@@ -4411,7 +4333,7 @@
             <a:t> </a:t>
           </a:r>
           <a:r>
-            <a:rPr lang="de-DE" sz="1600" kern="1200" dirty="0" err="1" smtClean="0">
+            <a:rPr lang="de-DE" sz="1600" kern="1200" dirty="0" err="1">
               <a:solidFill>
                 <a:schemeClr val="bg1"/>
               </a:solidFill>
@@ -4419,7 +4341,7 @@
             <a:t>and</a:t>
           </a:r>
           <a:r>
-            <a:rPr lang="de-DE" sz="1600" kern="1200" dirty="0" smtClean="0">
+            <a:rPr lang="de-DE" sz="1600" kern="1200" dirty="0">
               <a:solidFill>
                 <a:schemeClr val="bg1"/>
               </a:solidFill>
@@ -4427,7 +4349,7 @@
             <a:t> on </a:t>
           </a:r>
           <a:r>
-            <a:rPr lang="de-DE" sz="1600" kern="1200" dirty="0" err="1" smtClean="0">
+            <a:rPr lang="de-DE" sz="1600" kern="1200" dirty="0" err="1">
               <a:solidFill>
                 <a:schemeClr val="bg1"/>
               </a:solidFill>
@@ -4435,20 +4357,124 @@
             <a:t>gpu</a:t>
           </a:r>
           <a:r>
-            <a:rPr lang="de-DE" sz="1600" kern="1200" dirty="0" smtClean="0">
+            <a:rPr lang="de-DE" sz="1600" kern="1200" dirty="0">
               <a:solidFill>
                 <a:schemeClr val="bg1"/>
               </a:solidFill>
             </a:rPr>
-            <a:t> / </a:t>
+            <a:t>  (</a:t>
           </a:r>
           <a:r>
-            <a:rPr lang="de-DE" sz="1600" kern="1200" dirty="0" err="1" smtClean="0">
+            <a:rPr lang="de-DE" sz="1600" kern="1200" dirty="0" err="1">
+              <a:solidFill>
+                <a:schemeClr val="bg1"/>
+              </a:solidFill>
+            </a:rPr>
+            <a:t>eventually</a:t>
+          </a:r>
+          <a:r>
+            <a:rPr lang="de-DE" sz="1600" kern="1200" dirty="0">
+              <a:solidFill>
+                <a:schemeClr val="bg1"/>
+              </a:solidFill>
+            </a:rPr>
+            <a:t> on </a:t>
+          </a:r>
+          <a:r>
+            <a:rPr lang="de-DE" sz="1600" kern="1200" dirty="0" err="1">
               <a:solidFill>
                 <a:schemeClr val="bg1"/>
               </a:solidFill>
             </a:rPr>
             <a:t>cluster</a:t>
+          </a:r>
+          <a:r>
+            <a:rPr lang="de-DE" sz="1600" kern="1200" dirty="0">
+              <a:solidFill>
+                <a:schemeClr val="bg1"/>
+              </a:solidFill>
+            </a:rPr>
+            <a:t> </a:t>
+          </a:r>
+          <a:r>
+            <a:rPr lang="de-DE" sz="1600" kern="1200" dirty="0" err="1">
+              <a:solidFill>
+                <a:schemeClr val="bg1"/>
+              </a:solidFill>
+            </a:rPr>
+            <a:t>with</a:t>
+          </a:r>
+          <a:r>
+            <a:rPr lang="de-DE" sz="1600" kern="1200" dirty="0">
+              <a:solidFill>
+                <a:schemeClr val="bg1"/>
+              </a:solidFill>
+            </a:rPr>
+            <a:t> </a:t>
+          </a:r>
+          <a:r>
+            <a:rPr lang="de-DE" sz="1600" kern="1200" dirty="0" err="1">
+              <a:solidFill>
+                <a:schemeClr val="bg1"/>
+              </a:solidFill>
+            </a:rPr>
+            <a:t>elephas</a:t>
+          </a:r>
+          <a:r>
+            <a:rPr lang="de-DE" sz="1600" kern="1200" dirty="0">
+              <a:solidFill>
+                <a:schemeClr val="bg1"/>
+              </a:solidFill>
+            </a:rPr>
+            <a:t> – </a:t>
+          </a:r>
+          <a:r>
+            <a:rPr lang="de-DE" sz="1600" kern="1200" dirty="0" err="1">
+              <a:solidFill>
+                <a:schemeClr val="bg1"/>
+              </a:solidFill>
+            </a:rPr>
+            <a:t>current</a:t>
+          </a:r>
+          <a:r>
+            <a:rPr lang="de-DE" sz="1600" kern="1200" dirty="0">
+              <a:solidFill>
+                <a:schemeClr val="bg1"/>
+              </a:solidFill>
+            </a:rPr>
+            <a:t> </a:t>
+          </a:r>
+          <a:r>
+            <a:rPr lang="de-DE" sz="1600" kern="1200" dirty="0" err="1">
+              <a:solidFill>
+                <a:schemeClr val="bg1"/>
+              </a:solidFill>
+            </a:rPr>
+            <a:t>build</a:t>
+          </a:r>
+          <a:r>
+            <a:rPr lang="de-DE" sz="1600" kern="1200" dirty="0">
+              <a:solidFill>
+                <a:schemeClr val="bg1"/>
+              </a:solidFill>
+            </a:rPr>
+            <a:t> </a:t>
+          </a:r>
+          <a:r>
+            <a:rPr lang="de-DE" sz="1600" kern="1200" dirty="0" err="1">
+              <a:solidFill>
+                <a:schemeClr val="bg1"/>
+              </a:solidFill>
+            </a:rPr>
+            <a:t>failing</a:t>
+          </a:r>
+          <a:r>
+            <a:rPr lang="de-DE" sz="1600" kern="1200" dirty="0">
+              <a:solidFill>
+                <a:schemeClr val="bg1"/>
+              </a:solidFill>
+            </a:rPr>
+            <a:t>)</a:t>
           </a:r>
           <a:endParaRPr lang="de-DE" sz="1600" kern="1200" dirty="0"/>
         </a:p>
@@ -4463,7 +4489,7 @@
             <a:spcAft>
               <a:spcPct val="15000"/>
             </a:spcAft>
-            <a:buChar char="••"/>
+            <a:buChar char="•"/>
           </a:pPr>
           <a:endParaRPr lang="de-DE" sz="1600" kern="1200" dirty="0"/>
         </a:p>
@@ -4529,7 +4555,7 @@
         </a:bodyPr>
         <a:lstStyle/>
         <a:p>
-          <a:pPr lvl="0" algn="l" defTabSz="889000">
+          <a:pPr marL="0" lvl="0" indent="0" algn="l" defTabSz="889000">
             <a:lnSpc>
               <a:spcPct val="90000"/>
             </a:lnSpc>
@@ -4539,12 +4565,12 @@
             <a:spcAft>
               <a:spcPct val="35000"/>
             </a:spcAft>
+            <a:buNone/>
           </a:pPr>
           <a:r>
-            <a:rPr lang="de-DE" sz="2000" kern="1200" dirty="0" smtClean="0"/>
+            <a:rPr lang="de-DE" sz="2000" kern="1200" dirty="0"/>
             <a:t>May</a:t>
           </a:r>
-          <a:endParaRPr lang="de-DE" sz="2000" kern="1200" dirty="0"/>
         </a:p>
         <a:p>
           <a:pPr marL="171450" lvl="1" indent="-171450" algn="l" defTabSz="711200">
@@ -4557,7 +4583,7 @@
             <a:spcAft>
               <a:spcPct val="15000"/>
             </a:spcAft>
-            <a:buChar char="••"/>
+            <a:buChar char="•"/>
           </a:pPr>
           <a:r>
             <a:rPr lang="de-DE" sz="1600" kern="1200" dirty="0"/>
@@ -4575,7 +4601,7 @@
             <a:spcAft>
               <a:spcPct val="15000"/>
             </a:spcAft>
-            <a:buChar char="••"/>
+            <a:buChar char="•"/>
           </a:pPr>
           <a:r>
             <a:rPr lang="de-DE" sz="1600" kern="1200" dirty="0" err="1"/>
@@ -4667,7 +4693,7 @@
         </a:bodyPr>
         <a:lstStyle/>
         <a:p>
-          <a:pPr lvl="0" algn="ctr" defTabSz="1600200">
+          <a:pPr marL="0" lvl="0" indent="0" algn="ctr" defTabSz="1600200">
             <a:lnSpc>
               <a:spcPct val="90000"/>
             </a:lnSpc>
@@ -4677,6 +4703,7 @@
             <a:spcAft>
               <a:spcPct val="35000"/>
             </a:spcAft>
+            <a:buNone/>
           </a:pPr>
           <a:endParaRPr lang="de-DE" sz="3600" kern="1200"/>
         </a:p>
@@ -4745,7 +4772,7 @@
         </a:bodyPr>
         <a:lstStyle/>
         <a:p>
-          <a:pPr lvl="0" algn="ctr" defTabSz="1600200">
+          <a:pPr marL="0" lvl="0" indent="0" algn="ctr" defTabSz="1600200">
             <a:lnSpc>
               <a:spcPct val="90000"/>
             </a:lnSpc>
@@ -4755,6 +4782,7 @@
             <a:spcAft>
               <a:spcPct val="35000"/>
             </a:spcAft>
+            <a:buNone/>
           </a:pPr>
           <a:endParaRPr lang="de-DE" sz="3600" kern="1200"/>
         </a:p>
@@ -9374,7 +9402,7 @@
               <a:rPr lang="de-DE" smtClean="0">
                 <a:latin typeface="Arial" panose="020B0604020202020204" pitchFamily="34" charset="0"/>
               </a:rPr>
-              <a:t>17/04/16</a:t>
+              <a:t>18.04.2016</a:t>
             </a:fld>
             <a:endParaRPr lang="de-DE" dirty="0">
               <a:latin typeface="Arial" panose="020B0604020202020204" pitchFamily="34" charset="0"/>
@@ -9553,7 +9581,7 @@
             <a:fld id="{BCDB334D-D17F-49C4-91DD-37BB7E818209}" type="datetimeFigureOut">
               <a:rPr lang="de-CH" smtClean="0"/>
               <a:pPr/>
-              <a:t>17/04/16</a:t>
+              <a:t>18.04.2016</a:t>
             </a:fld>
             <a:endParaRPr lang="de-CH" dirty="0"/>
           </a:p>
@@ -9957,27 +9985,27 @@
           <a:lstStyle/>
           <a:p>
             <a:r>
-              <a:rPr lang="de-DE" dirty="0" smtClean="0"/>
+              <a:rPr lang="de-DE" dirty="0"/>
               <a:t>Foto</a:t>
             </a:r>
             <a:r>
-              <a:rPr lang="de-DE" baseline="0" dirty="0" smtClean="0"/>
+              <a:rPr lang="de-DE" baseline="0" dirty="0"/>
               <a:t> ist auf der rechten Seite, damit wir zeigen können wo das Problem bei </a:t>
             </a:r>
             <a:r>
-              <a:rPr lang="de-DE" baseline="0" dirty="0" err="1" smtClean="0"/>
+              <a:rPr lang="de-DE" baseline="0" dirty="0" err="1"/>
               <a:t>Tensorflow</a:t>
             </a:r>
             <a:r>
-              <a:rPr lang="de-DE" baseline="0" dirty="0" smtClean="0"/>
+              <a:rPr lang="de-DE" baseline="0" dirty="0"/>
               <a:t> wo was wir jetzt durch </a:t>
             </a:r>
             <a:r>
-              <a:rPr lang="de-DE" baseline="0" dirty="0" err="1" smtClean="0"/>
+              <a:rPr lang="de-DE" baseline="0" dirty="0" err="1"/>
               <a:t>Keras</a:t>
             </a:r>
             <a:r>
-              <a:rPr lang="de-DE" baseline="0" dirty="0" smtClean="0"/>
+              <a:rPr lang="de-DE" baseline="0" dirty="0"/>
               <a:t> behoben haben. </a:t>
             </a:r>
             <a:endParaRPr lang="de-DE" dirty="0"/>
@@ -10311,12 +10339,12 @@
   <p:clrMapOvr>
     <a:masterClrMapping/>
   </p:clrMapOvr>
-  <p:transition xmlns:p14="http://schemas.microsoft.com/office/powerpoint/2010/main">
+  <p:transition>
     <p:fade/>
   </p:transition>
   <p:extLst mod="1">
     <p:ext uri="{DCECCB84-F9BA-43D5-87BE-67443E8EF086}">
-      <p15:sldGuideLst xmlns="" xmlns:p15="http://schemas.microsoft.com/office/powerpoint/2012/main">
+      <p15:sldGuideLst xmlns:p15="http://schemas.microsoft.com/office/powerpoint/2012/main">
         <p15:guide id="1" orient="horz" pos="2160" userDrawn="1">
           <p15:clr>
             <a:srgbClr val="FBAE40"/>
@@ -10619,12 +10647,12 @@
   <p:clrMapOvr>
     <a:masterClrMapping/>
   </p:clrMapOvr>
-  <p:transition xmlns:p14="http://schemas.microsoft.com/office/powerpoint/2010/main">
+  <p:transition>
     <p:fade/>
   </p:transition>
   <p:extLst mod="1">
     <p:ext uri="{DCECCB84-F9BA-43D5-87BE-67443E8EF086}">
-      <p15:sldGuideLst xmlns="" xmlns:p15="http://schemas.microsoft.com/office/powerpoint/2012/main">
+      <p15:sldGuideLst xmlns:p15="http://schemas.microsoft.com/office/powerpoint/2012/main">
         <p15:guide id="1" orient="horz" pos="2160" userDrawn="1">
           <p15:clr>
             <a:srgbClr val="FBAE40"/>
@@ -10938,7 +10966,7 @@
   <p:clrMapOvr>
     <a:masterClrMapping/>
   </p:clrMapOvr>
-  <p:transition xmlns:p14="http://schemas.microsoft.com/office/powerpoint/2010/main">
+  <p:transition>
     <p:fade/>
   </p:transition>
 </p:sldLayout>
@@ -11237,7 +11265,7 @@
   <p:clrMapOvr>
     <a:masterClrMapping/>
   </p:clrMapOvr>
-  <p:transition xmlns:p14="http://schemas.microsoft.com/office/powerpoint/2010/main">
+  <p:transition>
     <p:fade/>
   </p:transition>
 </p:sldLayout>
@@ -12286,7 +12314,7 @@
   <p:clrMapOvr>
     <a:masterClrMapping/>
   </p:clrMapOvr>
-  <p:transition xmlns:p14="http://schemas.microsoft.com/office/powerpoint/2010/main">
+  <p:transition>
     <p:fade/>
   </p:transition>
 </p:sldLayout>
@@ -12523,7 +12551,7 @@
   <p:clrMapOvr>
     <a:masterClrMapping/>
   </p:clrMapOvr>
-  <p:transition xmlns:p14="http://schemas.microsoft.com/office/powerpoint/2010/main">
+  <p:transition>
     <p:fade/>
   </p:transition>
 </p:sldLayout>
@@ -12929,7 +12957,7 @@
   <p:clrMapOvr>
     <a:masterClrMapping/>
   </p:clrMapOvr>
-  <p:transition xmlns:p14="http://schemas.microsoft.com/office/powerpoint/2010/main">
+  <p:transition>
     <p:fade/>
   </p:transition>
 </p:sldLayout>
@@ -13057,7 +13085,7 @@
   <p:clrMapOvr>
     <a:masterClrMapping/>
   </p:clrMapOvr>
-  <p:transition xmlns:p14="http://schemas.microsoft.com/office/powerpoint/2010/main">
+  <p:transition>
     <p:fade/>
   </p:transition>
 </p:sldLayout>
@@ -13192,7 +13220,7 @@
   <p:clrMapOvr>
     <a:masterClrMapping/>
   </p:clrMapOvr>
-  <p:transition xmlns:p14="http://schemas.microsoft.com/office/powerpoint/2010/main">
+  <p:transition>
     <p:fade/>
   </p:transition>
 </p:sldLayout>
@@ -13370,7 +13398,7 @@
   <p:clrMapOvr>
     <a:masterClrMapping/>
   </p:clrMapOvr>
-  <p:transition xmlns:p14="http://schemas.microsoft.com/office/powerpoint/2010/main">
+  <p:transition>
     <p:fade/>
   </p:transition>
 </p:sldLayout>
@@ -13662,12 +13690,12 @@
   <p:clrMapOvr>
     <a:masterClrMapping/>
   </p:clrMapOvr>
-  <p:transition xmlns:p14="http://schemas.microsoft.com/office/powerpoint/2010/main">
+  <p:transition>
     <p:fade/>
   </p:transition>
   <p:extLst mod="1">
     <p:ext uri="{DCECCB84-F9BA-43D5-87BE-67443E8EF086}">
-      <p15:sldGuideLst xmlns="" xmlns:p15="http://schemas.microsoft.com/office/powerpoint/2012/main">
+      <p15:sldGuideLst xmlns:p15="http://schemas.microsoft.com/office/powerpoint/2012/main">
         <p15:guide id="1" orient="horz" pos="2160" userDrawn="1">
           <p15:clr>
             <a:srgbClr val="FBAE40"/>
@@ -13981,7 +14009,7 @@
   <p:clrMapOvr>
     <a:masterClrMapping/>
   </p:clrMapOvr>
-  <p:transition xmlns:p14="http://schemas.microsoft.com/office/powerpoint/2010/main">
+  <p:transition>
     <p:fade/>
   </p:transition>
 </p:sldLayout>
@@ -14284,7 +14312,7 @@
   <p:clrMapOvr>
     <a:masterClrMapping/>
   </p:clrMapOvr>
-  <p:transition xmlns:p14="http://schemas.microsoft.com/office/powerpoint/2010/main">
+  <p:transition>
     <p:fade/>
   </p:transition>
 </p:sldLayout>
@@ -14583,7 +14611,7 @@
   <p:clrMapOvr>
     <a:masterClrMapping/>
   </p:clrMapOvr>
-  <p:transition xmlns:p14="http://schemas.microsoft.com/office/powerpoint/2010/main">
+  <p:transition>
     <p:fade/>
   </p:transition>
 </p:sldLayout>
@@ -15632,7 +15660,7 @@
   <p:clrMapOvr>
     <a:masterClrMapping/>
   </p:clrMapOvr>
-  <p:transition xmlns:p14="http://schemas.microsoft.com/office/powerpoint/2010/main">
+  <p:transition>
     <p:fade/>
   </p:transition>
 </p:sldLayout>
@@ -15869,7 +15897,7 @@
   <p:clrMapOvr>
     <a:masterClrMapping/>
   </p:clrMapOvr>
-  <p:transition xmlns:p14="http://schemas.microsoft.com/office/powerpoint/2010/main">
+  <p:transition>
     <p:fade/>
   </p:transition>
 </p:sldLayout>
@@ -16275,7 +16303,7 @@
   <p:clrMapOvr>
     <a:masterClrMapping/>
   </p:clrMapOvr>
-  <p:transition xmlns:p14="http://schemas.microsoft.com/office/powerpoint/2010/main">
+  <p:transition>
     <p:fade/>
   </p:transition>
 </p:sldLayout>
@@ -16403,7 +16431,7 @@
   <p:clrMapOvr>
     <a:masterClrMapping/>
   </p:clrMapOvr>
-  <p:transition xmlns:p14="http://schemas.microsoft.com/office/powerpoint/2010/main">
+  <p:transition>
     <p:fade/>
   </p:transition>
 </p:sldLayout>
@@ -16538,7 +16566,7 @@
   <p:clrMapOvr>
     <a:masterClrMapping/>
   </p:clrMapOvr>
-  <p:transition xmlns:p14="http://schemas.microsoft.com/office/powerpoint/2010/main">
+  <p:transition>
     <p:fade/>
   </p:transition>
 </p:sldLayout>
@@ -16716,7 +16744,7 @@
   <p:clrMapOvr>
     <a:masterClrMapping/>
   </p:clrMapOvr>
-  <p:transition xmlns:p14="http://schemas.microsoft.com/office/powerpoint/2010/main">
+  <p:transition>
     <p:fade/>
   </p:transition>
 </p:sldLayout>
@@ -17008,12 +17036,12 @@
   <p:clrMapOvr>
     <a:masterClrMapping/>
   </p:clrMapOvr>
-  <p:transition xmlns:p14="http://schemas.microsoft.com/office/powerpoint/2010/main">
+  <p:transition>
     <p:fade/>
   </p:transition>
   <p:extLst mod="1">
     <p:ext uri="{DCECCB84-F9BA-43D5-87BE-67443E8EF086}">
-      <p15:sldGuideLst xmlns="" xmlns:p15="http://schemas.microsoft.com/office/powerpoint/2012/main">
+      <p15:sldGuideLst xmlns:p15="http://schemas.microsoft.com/office/powerpoint/2012/main">
         <p15:guide id="1" orient="horz" pos="2160" userDrawn="1">
           <p15:clr>
             <a:srgbClr val="FBAE40"/>
@@ -17327,7 +17355,7 @@
   <p:clrMapOvr>
     <a:masterClrMapping/>
   </p:clrMapOvr>
-  <p:transition xmlns:p14="http://schemas.microsoft.com/office/powerpoint/2010/main">
+  <p:transition>
     <p:fade/>
   </p:transition>
 </p:sldLayout>
@@ -17626,7 +17654,7 @@
   <p:clrMapOvr>
     <a:masterClrMapping/>
   </p:clrMapOvr>
-  <p:transition xmlns:p14="http://schemas.microsoft.com/office/powerpoint/2010/main">
+  <p:transition>
     <p:fade/>
   </p:transition>
 </p:sldLayout>
@@ -17925,7 +17953,7 @@
   <p:clrMapOvr>
     <a:masterClrMapping/>
   </p:clrMapOvr>
-  <p:transition xmlns:p14="http://schemas.microsoft.com/office/powerpoint/2010/main">
+  <p:transition>
     <p:fade/>
   </p:transition>
 </p:sldLayout>
@@ -18974,7 +19002,7 @@
   <p:clrMapOvr>
     <a:masterClrMapping/>
   </p:clrMapOvr>
-  <p:transition xmlns:p14="http://schemas.microsoft.com/office/powerpoint/2010/main">
+  <p:transition>
     <p:fade/>
   </p:transition>
 </p:sldLayout>
@@ -19211,7 +19239,7 @@
   <p:clrMapOvr>
     <a:masterClrMapping/>
   </p:clrMapOvr>
-  <p:transition xmlns:p14="http://schemas.microsoft.com/office/powerpoint/2010/main">
+  <p:transition>
     <p:fade/>
   </p:transition>
 </p:sldLayout>
@@ -19617,7 +19645,7 @@
   <p:clrMapOvr>
     <a:masterClrMapping/>
   </p:clrMapOvr>
-  <p:transition xmlns:p14="http://schemas.microsoft.com/office/powerpoint/2010/main">
+  <p:transition>
     <p:fade/>
   </p:transition>
 </p:sldLayout>
@@ -19745,7 +19773,7 @@
   <p:clrMapOvr>
     <a:masterClrMapping/>
   </p:clrMapOvr>
-  <p:transition xmlns:p14="http://schemas.microsoft.com/office/powerpoint/2010/main">
+  <p:transition>
     <p:fade/>
   </p:transition>
 </p:sldLayout>
@@ -19880,7 +19908,7 @@
   <p:clrMapOvr>
     <a:masterClrMapping/>
   </p:clrMapOvr>
-  <p:transition xmlns:p14="http://schemas.microsoft.com/office/powerpoint/2010/main">
+  <p:transition>
     <p:fade/>
   </p:transition>
 </p:sldLayout>
@@ -20058,7 +20086,7 @@
   <p:clrMapOvr>
     <a:masterClrMapping/>
   </p:clrMapOvr>
-  <p:transition xmlns:p14="http://schemas.microsoft.com/office/powerpoint/2010/main">
+  <p:transition>
     <p:fade/>
   </p:transition>
 </p:sldLayout>
@@ -20350,12 +20378,12 @@
   <p:clrMapOvr>
     <a:masterClrMapping/>
   </p:clrMapOvr>
-  <p:transition xmlns:p14="http://schemas.microsoft.com/office/powerpoint/2010/main">
+  <p:transition>
     <p:fade/>
   </p:transition>
   <p:extLst mod="1">
     <p:ext uri="{DCECCB84-F9BA-43D5-87BE-67443E8EF086}">
-      <p15:sldGuideLst xmlns="" xmlns:p15="http://schemas.microsoft.com/office/powerpoint/2012/main">
+      <p15:sldGuideLst xmlns:p15="http://schemas.microsoft.com/office/powerpoint/2012/main">
         <p15:guide id="1" orient="horz" pos="2160" userDrawn="1">
           <p15:clr>
             <a:srgbClr val="FBAE40"/>
@@ -20669,7 +20697,7 @@
   <p:clrMapOvr>
     <a:masterClrMapping/>
   </p:clrMapOvr>
-  <p:transition xmlns:p14="http://schemas.microsoft.com/office/powerpoint/2010/main">
+  <p:transition>
     <p:fade/>
   </p:transition>
 </p:sldLayout>
@@ -20968,7 +20996,7 @@
   <p:clrMapOvr>
     <a:masterClrMapping/>
   </p:clrMapOvr>
-  <p:transition xmlns:p14="http://schemas.microsoft.com/office/powerpoint/2010/main">
+  <p:transition>
     <p:fade/>
   </p:transition>
 </p:sldLayout>
@@ -22009,7 +22037,7 @@
   <p:clrMapOvr>
     <a:masterClrMapping/>
   </p:clrMapOvr>
-  <p:transition xmlns:p14="http://schemas.microsoft.com/office/powerpoint/2010/main">
+  <p:transition>
     <p:fade/>
   </p:transition>
 </p:sldLayout>
@@ -23058,7 +23086,7 @@
   <p:clrMapOvr>
     <a:masterClrMapping/>
   </p:clrMapOvr>
-  <p:transition xmlns:p14="http://schemas.microsoft.com/office/powerpoint/2010/main">
+  <p:transition>
     <p:fade/>
   </p:transition>
 </p:sldLayout>
@@ -23295,7 +23323,7 @@
   <p:clrMapOvr>
     <a:masterClrMapping/>
   </p:clrMapOvr>
-  <p:transition xmlns:p14="http://schemas.microsoft.com/office/powerpoint/2010/main">
+  <p:transition>
     <p:fade/>
   </p:transition>
 </p:sldLayout>
@@ -23701,7 +23729,7 @@
   <p:clrMapOvr>
     <a:masterClrMapping/>
   </p:clrMapOvr>
-  <p:transition xmlns:p14="http://schemas.microsoft.com/office/powerpoint/2010/main">
+  <p:transition>
     <p:fade/>
   </p:transition>
 </p:sldLayout>
@@ -23829,7 +23857,7 @@
   <p:clrMapOvr>
     <a:masterClrMapping/>
   </p:clrMapOvr>
-  <p:transition xmlns:p14="http://schemas.microsoft.com/office/powerpoint/2010/main">
+  <p:transition>
     <p:fade/>
   </p:transition>
 </p:sldLayout>
@@ -23964,7 +23992,7 @@
   <p:clrMapOvr>
     <a:masterClrMapping/>
   </p:clrMapOvr>
-  <p:transition xmlns:p14="http://schemas.microsoft.com/office/powerpoint/2010/main">
+  <p:transition>
     <p:fade/>
   </p:transition>
 </p:sldLayout>
@@ -24142,7 +24170,7 @@
   <p:clrMapOvr>
     <a:masterClrMapping/>
   </p:clrMapOvr>
-  <p:transition xmlns:p14="http://schemas.microsoft.com/office/powerpoint/2010/main">
+  <p:transition>
     <p:fade/>
   </p:transition>
 </p:sldLayout>
@@ -24434,12 +24462,12 @@
   <p:clrMapOvr>
     <a:masterClrMapping/>
   </p:clrMapOvr>
-  <p:transition xmlns:p14="http://schemas.microsoft.com/office/powerpoint/2010/main">
+  <p:transition>
     <p:fade/>
   </p:transition>
   <p:extLst mod="1">
     <p:ext uri="{DCECCB84-F9BA-43D5-87BE-67443E8EF086}">
-      <p15:sldGuideLst xmlns="" xmlns:p15="http://schemas.microsoft.com/office/powerpoint/2012/main">
+      <p15:sldGuideLst xmlns:p15="http://schemas.microsoft.com/office/powerpoint/2012/main">
         <p15:guide id="1" orient="horz" pos="2160" userDrawn="1">
           <p15:clr>
             <a:srgbClr val="FBAE40"/>
@@ -24753,7 +24781,7 @@
   <p:clrMapOvr>
     <a:masterClrMapping/>
   </p:clrMapOvr>
-  <p:transition xmlns:p14="http://schemas.microsoft.com/office/powerpoint/2010/main">
+  <p:transition>
     <p:fade/>
   </p:transition>
 </p:sldLayout>
@@ -25052,7 +25080,7 @@
   <p:clrMapOvr>
     <a:masterClrMapping/>
   </p:clrMapOvr>
-  <p:transition xmlns:p14="http://schemas.microsoft.com/office/powerpoint/2010/main">
+  <p:transition>
     <p:fade/>
   </p:transition>
 </p:sldLayout>
@@ -26101,7 +26129,7 @@
   <p:clrMapOvr>
     <a:masterClrMapping/>
   </p:clrMapOvr>
-  <p:transition xmlns:p14="http://schemas.microsoft.com/office/powerpoint/2010/main">
+  <p:transition>
     <p:fade/>
   </p:transition>
 </p:sldLayout>
@@ -26333,7 +26361,7 @@
   <p:clrMapOvr>
     <a:masterClrMapping/>
   </p:clrMapOvr>
-  <p:transition xmlns:p14="http://schemas.microsoft.com/office/powerpoint/2010/main">
+  <p:transition>
     <p:fade/>
   </p:transition>
 </p:sldLayout>
@@ -26570,7 +26598,7 @@
   <p:clrMapOvr>
     <a:masterClrMapping/>
   </p:clrMapOvr>
-  <p:transition xmlns:p14="http://schemas.microsoft.com/office/powerpoint/2010/main">
+  <p:transition>
     <p:fade/>
   </p:transition>
 </p:sldLayout>
@@ -26976,7 +27004,7 @@
   <p:clrMapOvr>
     <a:masterClrMapping/>
   </p:clrMapOvr>
-  <p:transition xmlns:p14="http://schemas.microsoft.com/office/powerpoint/2010/main">
+  <p:transition>
     <p:fade/>
   </p:transition>
 </p:sldLayout>
@@ -27104,7 +27132,7 @@
   <p:clrMapOvr>
     <a:masterClrMapping/>
   </p:clrMapOvr>
-  <p:transition xmlns:p14="http://schemas.microsoft.com/office/powerpoint/2010/main">
+  <p:transition>
     <p:fade/>
   </p:transition>
 </p:sldLayout>
@@ -27239,7 +27267,7 @@
   <p:clrMapOvr>
     <a:masterClrMapping/>
   </p:clrMapOvr>
-  <p:transition xmlns:p14="http://schemas.microsoft.com/office/powerpoint/2010/main">
+  <p:transition>
     <p:fade/>
   </p:transition>
 </p:sldLayout>
@@ -27417,7 +27445,7 @@
   <p:clrMapOvr>
     <a:masterClrMapping/>
   </p:clrMapOvr>
-  <p:transition xmlns:p14="http://schemas.microsoft.com/office/powerpoint/2010/main">
+  <p:transition>
     <p:fade/>
   </p:transition>
 </p:sldLayout>
@@ -27709,12 +27737,12 @@
   <p:clrMapOvr>
     <a:masterClrMapping/>
   </p:clrMapOvr>
-  <p:transition xmlns:p14="http://schemas.microsoft.com/office/powerpoint/2010/main">
+  <p:transition>
     <p:fade/>
   </p:transition>
   <p:extLst mod="1">
     <p:ext uri="{DCECCB84-F9BA-43D5-87BE-67443E8EF086}">
-      <p15:sldGuideLst xmlns="" xmlns:p15="http://schemas.microsoft.com/office/powerpoint/2012/main">
+      <p15:sldGuideLst xmlns:p15="http://schemas.microsoft.com/office/powerpoint/2012/main">
         <p15:guide id="1" orient="horz" pos="2160" userDrawn="1">
           <p15:clr>
             <a:srgbClr val="FBAE40"/>
@@ -28028,7 +28056,7 @@
   <p:clrMapOvr>
     <a:masterClrMapping/>
   </p:clrMapOvr>
-  <p:transition xmlns:p14="http://schemas.microsoft.com/office/powerpoint/2010/main">
+  <p:transition>
     <p:fade/>
   </p:transition>
 </p:sldLayout>
@@ -28327,7 +28355,7 @@
   <p:clrMapOvr>
     <a:masterClrMapping/>
   </p:clrMapOvr>
-  <p:transition xmlns:p14="http://schemas.microsoft.com/office/powerpoint/2010/main">
+  <p:transition>
     <p:fade/>
   </p:transition>
 </p:sldLayout>
@@ -29376,7 +29404,7 @@
   <p:clrMapOvr>
     <a:masterClrMapping/>
   </p:clrMapOvr>
-  <p:transition xmlns:p14="http://schemas.microsoft.com/office/powerpoint/2010/main">
+  <p:transition>
     <p:fade/>
   </p:transition>
 </p:sldLayout>
@@ -29613,7 +29641,7 @@
   <p:clrMapOvr>
     <a:masterClrMapping/>
   </p:clrMapOvr>
-  <p:transition xmlns:p14="http://schemas.microsoft.com/office/powerpoint/2010/main">
+  <p:transition>
     <p:fade/>
   </p:transition>
 </p:sldLayout>
@@ -30014,7 +30042,7 @@
   <p:clrMapOvr>
     <a:masterClrMapping/>
   </p:clrMapOvr>
-  <p:transition xmlns:p14="http://schemas.microsoft.com/office/powerpoint/2010/main">
+  <p:transition>
     <p:fade/>
   </p:transition>
 </p:sldLayout>
@@ -30420,7 +30448,7 @@
   <p:clrMapOvr>
     <a:masterClrMapping/>
   </p:clrMapOvr>
-  <p:transition xmlns:p14="http://schemas.microsoft.com/office/powerpoint/2010/main">
+  <p:transition>
     <p:fade/>
   </p:transition>
 </p:sldLayout>
@@ -30548,7 +30576,7 @@
   <p:clrMapOvr>
     <a:masterClrMapping/>
   </p:clrMapOvr>
-  <p:transition xmlns:p14="http://schemas.microsoft.com/office/powerpoint/2010/main">
+  <p:transition>
     <p:fade/>
   </p:transition>
 </p:sldLayout>
@@ -30683,7 +30711,7 @@
   <p:clrMapOvr>
     <a:masterClrMapping/>
   </p:clrMapOvr>
-  <p:transition xmlns:p14="http://schemas.microsoft.com/office/powerpoint/2010/main">
+  <p:transition>
     <p:fade/>
   </p:transition>
 </p:sldLayout>
@@ -30861,7 +30889,7 @@
   <p:clrMapOvr>
     <a:masterClrMapping/>
   </p:clrMapOvr>
-  <p:transition xmlns:p14="http://schemas.microsoft.com/office/powerpoint/2010/main">
+  <p:transition>
     <p:fade/>
   </p:transition>
 </p:sldLayout>
@@ -31153,12 +31181,12 @@
   <p:clrMapOvr>
     <a:masterClrMapping/>
   </p:clrMapOvr>
-  <p:transition xmlns:p14="http://schemas.microsoft.com/office/powerpoint/2010/main">
+  <p:transition>
     <p:fade/>
   </p:transition>
   <p:extLst mod="1">
     <p:ext uri="{DCECCB84-F9BA-43D5-87BE-67443E8EF086}">
-      <p15:sldGuideLst xmlns="" xmlns:p15="http://schemas.microsoft.com/office/powerpoint/2012/main">
+      <p15:sldGuideLst xmlns:p15="http://schemas.microsoft.com/office/powerpoint/2012/main">
         <p15:guide id="1" orient="horz" pos="2160" userDrawn="1">
           <p15:clr>
             <a:srgbClr val="FBAE40"/>
@@ -31472,7 +31500,7 @@
   <p:clrMapOvr>
     <a:masterClrMapping/>
   </p:clrMapOvr>
-  <p:transition xmlns:p14="http://schemas.microsoft.com/office/powerpoint/2010/main">
+  <p:transition>
     <p:fade/>
   </p:transition>
 </p:sldLayout>
@@ -31771,7 +31799,7 @@
   <p:clrMapOvr>
     <a:masterClrMapping/>
   </p:clrMapOvr>
-  <p:transition xmlns:p14="http://schemas.microsoft.com/office/powerpoint/2010/main">
+  <p:transition>
     <p:fade/>
   </p:transition>
 </p:sldLayout>
@@ -32820,7 +32848,7 @@
   <p:clrMapOvr>
     <a:masterClrMapping/>
   </p:clrMapOvr>
-  <p:transition xmlns:p14="http://schemas.microsoft.com/office/powerpoint/2010/main">
+  <p:transition>
     <p:fade/>
   </p:transition>
 </p:sldLayout>
@@ -33057,7 +33085,7 @@
   <p:clrMapOvr>
     <a:masterClrMapping/>
   </p:clrMapOvr>
-  <p:transition xmlns:p14="http://schemas.microsoft.com/office/powerpoint/2010/main">
+  <p:transition>
     <p:fade/>
   </p:transition>
 </p:sldLayout>
@@ -33463,7 +33491,7 @@
   <p:clrMapOvr>
     <a:masterClrMapping/>
   </p:clrMapOvr>
-  <p:transition xmlns:p14="http://schemas.microsoft.com/office/powerpoint/2010/main">
+  <p:transition>
     <p:fade/>
   </p:transition>
 </p:sldLayout>
@@ -33586,7 +33614,7 @@
   <p:clrMapOvr>
     <a:masterClrMapping/>
   </p:clrMapOvr>
-  <p:transition xmlns:p14="http://schemas.microsoft.com/office/powerpoint/2010/main">
+  <p:transition>
     <p:fade/>
   </p:transition>
 </p:sldLayout>
@@ -33714,7 +33742,7 @@
   <p:clrMapOvr>
     <a:masterClrMapping/>
   </p:clrMapOvr>
-  <p:transition xmlns:p14="http://schemas.microsoft.com/office/powerpoint/2010/main">
+  <p:transition>
     <p:fade/>
   </p:transition>
 </p:sldLayout>
@@ -33849,7 +33877,7 @@
   <p:clrMapOvr>
     <a:masterClrMapping/>
   </p:clrMapOvr>
-  <p:transition xmlns:p14="http://schemas.microsoft.com/office/powerpoint/2010/main">
+  <p:transition>
     <p:fade/>
   </p:transition>
 </p:sldLayout>
@@ -34027,7 +34055,7 @@
   <p:clrMapOvr>
     <a:masterClrMapping/>
   </p:clrMapOvr>
-  <p:transition xmlns:p14="http://schemas.microsoft.com/office/powerpoint/2010/main">
+  <p:transition>
     <p:fade/>
   </p:transition>
 </p:sldLayout>
@@ -34319,12 +34347,12 @@
   <p:clrMapOvr>
     <a:masterClrMapping/>
   </p:clrMapOvr>
-  <p:transition xmlns:p14="http://schemas.microsoft.com/office/powerpoint/2010/main">
+  <p:transition>
     <p:fade/>
   </p:transition>
   <p:extLst mod="1">
     <p:ext uri="{DCECCB84-F9BA-43D5-87BE-67443E8EF086}">
-      <p15:sldGuideLst xmlns="" xmlns:p15="http://schemas.microsoft.com/office/powerpoint/2012/main">
+      <p15:sldGuideLst xmlns:p15="http://schemas.microsoft.com/office/powerpoint/2012/main">
         <p15:guide id="1" orient="horz" pos="2160" userDrawn="1">
           <p15:clr>
             <a:srgbClr val="FBAE40"/>
@@ -34638,7 +34666,7 @@
   <p:clrMapOvr>
     <a:masterClrMapping/>
   </p:clrMapOvr>
-  <p:transition xmlns:p14="http://schemas.microsoft.com/office/powerpoint/2010/main">
+  <p:transition>
     <p:fade/>
   </p:transition>
 </p:sldLayout>
@@ -34937,7 +34965,7 @@
   <p:clrMapOvr>
     <a:masterClrMapping/>
   </p:clrMapOvr>
-  <p:transition xmlns:p14="http://schemas.microsoft.com/office/powerpoint/2010/main">
+  <p:transition>
     <p:fade/>
   </p:transition>
 </p:sldLayout>
@@ -35986,7 +36014,7 @@
   <p:clrMapOvr>
     <a:masterClrMapping/>
   </p:clrMapOvr>
-  <p:transition xmlns:p14="http://schemas.microsoft.com/office/powerpoint/2010/main">
+  <p:transition>
     <p:fade/>
   </p:transition>
 </p:sldLayout>
@@ -36223,7 +36251,7 @@
   <p:clrMapOvr>
     <a:masterClrMapping/>
   </p:clrMapOvr>
-  <p:transition xmlns:p14="http://schemas.microsoft.com/office/powerpoint/2010/main">
+  <p:transition>
     <p:fade/>
   </p:transition>
 </p:sldLayout>
@@ -36629,7 +36657,7 @@
   <p:clrMapOvr>
     <a:masterClrMapping/>
   </p:clrMapOvr>
-  <p:transition xmlns:p14="http://schemas.microsoft.com/office/powerpoint/2010/main">
+  <p:transition>
     <p:fade/>
   </p:transition>
 </p:sldLayout>
@@ -36757,7 +36785,7 @@
   <p:clrMapOvr>
     <a:masterClrMapping/>
   </p:clrMapOvr>
-  <p:transition xmlns:p14="http://schemas.microsoft.com/office/powerpoint/2010/main">
+  <p:transition>
     <p:fade/>
   </p:transition>
 </p:sldLayout>
@@ -36892,7 +36920,7 @@
   <p:clrMapOvr>
     <a:masterClrMapping/>
   </p:clrMapOvr>
-  <p:transition xmlns:p14="http://schemas.microsoft.com/office/powerpoint/2010/main">
+  <p:transition>
     <p:fade/>
   </p:transition>
 </p:sldLayout>
@@ -37027,7 +37055,7 @@
   <p:clrMapOvr>
     <a:masterClrMapping/>
   </p:clrMapOvr>
-  <p:transition xmlns:p14="http://schemas.microsoft.com/office/powerpoint/2010/main">
+  <p:transition>
     <p:fade/>
   </p:transition>
 </p:sldLayout>
@@ -37205,7 +37233,7 @@
   <p:clrMapOvr>
     <a:masterClrMapping/>
   </p:clrMapOvr>
-  <p:transition xmlns:p14="http://schemas.microsoft.com/office/powerpoint/2010/main">
+  <p:transition>
     <p:fade/>
   </p:transition>
 </p:sldLayout>
@@ -37383,7 +37411,7 @@
   <p:clrMapOvr>
     <a:masterClrMapping/>
   </p:clrMapOvr>
-  <p:transition xmlns:p14="http://schemas.microsoft.com/office/powerpoint/2010/main">
+  <p:transition>
     <p:fade/>
   </p:transition>
 </p:sldLayout>
@@ -38515,7 +38543,7 @@
     <p:sldLayoutId id="2147483665" r:id="rId8"/>
     <p:sldLayoutId id="2147483668" r:id="rId9"/>
   </p:sldLayoutIdLst>
-  <p:transition xmlns:p14="http://schemas.microsoft.com/office/powerpoint/2010/main">
+  <p:transition>
     <p:fade/>
   </p:transition>
   <p:hf hdr="0"/>
@@ -38804,7 +38832,7 @@
   </p:txStyles>
   <p:extLst mod="1">
     <p:ext uri="{27BBF7A9-308A-43DC-89C8-2F10F3537804}">
-      <p15:sldGuideLst xmlns="" xmlns:p15="http://schemas.microsoft.com/office/powerpoint/2012/main">
+      <p15:sldGuideLst xmlns:p15="http://schemas.microsoft.com/office/powerpoint/2012/main">
         <p15:guide id="1" pos="204">
           <p15:clr>
             <a:srgbClr val="F26B43"/>
@@ -39969,10 +39997,6 @@
               <a:rPr lang="en-GB" sz="800" b="1" dirty="0"/>
               <a:t>Placeholder for organisational unit name / logo</a:t>
             </a:r>
-            <a:r>
-              <a:rPr lang="en-GB" sz="800" baseline="0" dirty="0"/>
-              <a:t/>
-            </a:r>
             <a:br>
               <a:rPr lang="en-GB" sz="800" baseline="0" dirty="0"/>
             </a:br>
@@ -40002,7 +40026,7 @@
     <p:sldLayoutId id="2147483773" r:id="rId8"/>
     <p:sldLayoutId id="2147483776" r:id="rId9"/>
   </p:sldLayoutIdLst>
-  <p:transition xmlns:p14="http://schemas.microsoft.com/office/powerpoint/2010/main">
+  <p:transition>
     <p:fade/>
   </p:transition>
   <p:hf hdr="0"/>
@@ -40291,7 +40315,7 @@
   </p:txStyles>
   <p:extLst mod="1">
     <p:ext uri="{27BBF7A9-308A-43DC-89C8-2F10F3537804}">
-      <p15:sldGuideLst xmlns="" xmlns:p15="http://schemas.microsoft.com/office/powerpoint/2012/main">
+      <p15:sldGuideLst xmlns:p15="http://schemas.microsoft.com/office/powerpoint/2012/main">
         <p15:guide id="1" pos="204">
           <p15:clr>
             <a:srgbClr val="F26B43"/>
@@ -41456,10 +41480,6 @@
               <a:rPr lang="en-GB" sz="800" b="1" dirty="0"/>
               <a:t>Placeholder for organisational unit name / logo</a:t>
             </a:r>
-            <a:r>
-              <a:rPr lang="en-GB" sz="800" baseline="0" dirty="0"/>
-              <a:t/>
-            </a:r>
             <a:br>
               <a:rPr lang="en-GB" sz="800" baseline="0" dirty="0"/>
             </a:br>
@@ -41489,7 +41509,7 @@
     <p:sldLayoutId id="2147483785" r:id="rId8"/>
     <p:sldLayoutId id="2147483788" r:id="rId9"/>
   </p:sldLayoutIdLst>
-  <p:transition xmlns:p14="http://schemas.microsoft.com/office/powerpoint/2010/main">
+  <p:transition>
     <p:fade/>
   </p:transition>
   <p:hf hdr="0"/>
@@ -41778,7 +41798,7 @@
   </p:txStyles>
   <p:extLst mod="1">
     <p:ext uri="{27BBF7A9-308A-43DC-89C8-2F10F3537804}">
-      <p15:sldGuideLst xmlns="" xmlns:p15="http://schemas.microsoft.com/office/powerpoint/2012/main">
+      <p15:sldGuideLst xmlns:p15="http://schemas.microsoft.com/office/powerpoint/2012/main">
         <p15:guide id="1" pos="204">
           <p15:clr>
             <a:srgbClr val="F26B43"/>
@@ -42943,10 +42963,6 @@
               <a:rPr lang="en-GB" sz="800" b="1" dirty="0"/>
               <a:t>Placeholder for organisational unit name / logo</a:t>
             </a:r>
-            <a:r>
-              <a:rPr lang="en-GB" sz="800" baseline="0" dirty="0"/>
-              <a:t/>
-            </a:r>
             <a:br>
               <a:rPr lang="en-GB" sz="800" baseline="0" dirty="0"/>
             </a:br>
@@ -42976,7 +42992,7 @@
     <p:sldLayoutId id="2147483797" r:id="rId8"/>
     <p:sldLayoutId id="2147483800" r:id="rId9"/>
   </p:sldLayoutIdLst>
-  <p:transition xmlns:p14="http://schemas.microsoft.com/office/powerpoint/2010/main">
+  <p:transition>
     <p:fade/>
   </p:transition>
   <p:hf hdr="0"/>
@@ -43265,7 +43281,7 @@
   </p:txStyles>
   <p:extLst mod="1">
     <p:ext uri="{27BBF7A9-308A-43DC-89C8-2F10F3537804}">
-      <p15:sldGuideLst xmlns="" xmlns:p15="http://schemas.microsoft.com/office/powerpoint/2012/main">
+      <p15:sldGuideLst xmlns:p15="http://schemas.microsoft.com/office/powerpoint/2012/main">
         <p15:guide id="1" pos="204">
           <p15:clr>
             <a:srgbClr val="F26B43"/>
@@ -44430,10 +44446,6 @@
               <a:rPr lang="en-GB" sz="800" b="1" dirty="0"/>
               <a:t>Placeholder for organisational unit name / logo</a:t>
             </a:r>
-            <a:r>
-              <a:rPr lang="en-GB" sz="800" baseline="0" dirty="0"/>
-              <a:t/>
-            </a:r>
             <a:br>
               <a:rPr lang="en-GB" sz="800" baseline="0" dirty="0"/>
             </a:br>
@@ -44463,7 +44475,7 @@
     <p:sldLayoutId id="2147483809" r:id="rId8"/>
     <p:sldLayoutId id="2147483812" r:id="rId9"/>
   </p:sldLayoutIdLst>
-  <p:transition xmlns:p14="http://schemas.microsoft.com/office/powerpoint/2010/main">
+  <p:transition>
     <p:fade/>
   </p:transition>
   <p:hf hdr="0"/>
@@ -44752,7 +44764,7 @@
   </p:txStyles>
   <p:extLst mod="1">
     <p:ext uri="{27BBF7A9-308A-43DC-89C8-2F10F3537804}">
-      <p15:sldGuideLst xmlns="" xmlns:p15="http://schemas.microsoft.com/office/powerpoint/2012/main">
+      <p15:sldGuideLst xmlns:p15="http://schemas.microsoft.com/office/powerpoint/2012/main">
         <p15:guide id="1" pos="204">
           <p15:clr>
             <a:srgbClr val="F26B43"/>
@@ -45917,10 +45929,6 @@
               <a:rPr lang="en-GB" sz="800" b="1" dirty="0"/>
               <a:t>Placeholder for organisational unit name / logo</a:t>
             </a:r>
-            <a:r>
-              <a:rPr lang="en-GB" sz="800" baseline="0" dirty="0"/>
-              <a:t/>
-            </a:r>
             <a:br>
               <a:rPr lang="en-GB" sz="800" baseline="0" dirty="0"/>
             </a:br>
@@ -45950,7 +45958,7 @@
     <p:sldLayoutId id="2147483821" r:id="rId8"/>
     <p:sldLayoutId id="2147483824" r:id="rId9"/>
   </p:sldLayoutIdLst>
-  <p:transition xmlns:p14="http://schemas.microsoft.com/office/powerpoint/2010/main">
+  <p:transition>
     <p:fade/>
   </p:transition>
   <p:hf hdr="0"/>
@@ -46239,7 +46247,7 @@
   </p:txStyles>
   <p:extLst mod="1">
     <p:ext uri="{27BBF7A9-308A-43DC-89C8-2F10F3537804}">
-      <p15:sldGuideLst xmlns="" xmlns:p15="http://schemas.microsoft.com/office/powerpoint/2012/main">
+      <p15:sldGuideLst xmlns:p15="http://schemas.microsoft.com/office/powerpoint/2012/main">
         <p15:guide id="1" pos="204">
           <p15:clr>
             <a:srgbClr val="F26B43"/>
@@ -47404,10 +47412,6 @@
               <a:rPr lang="en-GB" sz="800" b="1" dirty="0"/>
               <a:t>Placeholder for organisational unit name / logo</a:t>
             </a:r>
-            <a:r>
-              <a:rPr lang="en-GB" sz="800" baseline="0" dirty="0"/>
-              <a:t/>
-            </a:r>
             <a:br>
               <a:rPr lang="en-GB" sz="800" baseline="0" dirty="0"/>
             </a:br>
@@ -47437,7 +47441,7 @@
     <p:sldLayoutId id="2147483833" r:id="rId8"/>
     <p:sldLayoutId id="2147483836" r:id="rId9"/>
   </p:sldLayoutIdLst>
-  <p:transition xmlns:p14="http://schemas.microsoft.com/office/powerpoint/2010/main">
+  <p:transition>
     <p:fade/>
   </p:transition>
   <p:hf hdr="0"/>
@@ -47726,7 +47730,7 @@
   </p:txStyles>
   <p:extLst mod="1">
     <p:ext uri="{27BBF7A9-308A-43DC-89C8-2F10F3537804}">
-      <p15:sldGuideLst xmlns="" xmlns:p15="http://schemas.microsoft.com/office/powerpoint/2012/main">
+      <p15:sldGuideLst xmlns:p15="http://schemas.microsoft.com/office/powerpoint/2012/main">
         <p15:guide id="1" pos="204">
           <p15:clr>
             <a:srgbClr val="F26B43"/>
@@ -48914,7 +48918,7 @@
     <p:sldLayoutId id="2147483845" r:id="rId8"/>
     <p:sldLayoutId id="2147483848" r:id="rId9"/>
   </p:sldLayoutIdLst>
-  <p:transition xmlns:p14="http://schemas.microsoft.com/office/powerpoint/2010/main">
+  <p:transition>
     <p:fade/>
   </p:transition>
   <p:hf hdr="0"/>
@@ -49203,7 +49207,7 @@
   </p:txStyles>
   <p:extLst mod="1">
     <p:ext uri="{27BBF7A9-308A-43DC-89C8-2F10F3537804}">
-      <p15:sldGuideLst xmlns="" xmlns:p15="http://schemas.microsoft.com/office/powerpoint/2012/main">
+      <p15:sldGuideLst xmlns:p15="http://schemas.microsoft.com/office/powerpoint/2012/main">
         <p15:guide id="1" pos="204">
           <p15:clr>
             <a:srgbClr val="F26B43"/>
@@ -50368,10 +50372,6 @@
               <a:rPr lang="en-GB" sz="800" b="1" dirty="0"/>
               <a:t>Placeholder for organisational unit name / logo</a:t>
             </a:r>
-            <a:r>
-              <a:rPr lang="en-GB" sz="800" baseline="0" dirty="0"/>
-              <a:t/>
-            </a:r>
             <a:br>
               <a:rPr lang="en-GB" sz="800" baseline="0" dirty="0"/>
             </a:br>
@@ -50401,7 +50401,7 @@
     <p:sldLayoutId id="2147483857" r:id="rId8"/>
     <p:sldLayoutId id="2147483860" r:id="rId9"/>
   </p:sldLayoutIdLst>
-  <p:transition xmlns:p14="http://schemas.microsoft.com/office/powerpoint/2010/main">
+  <p:transition>
     <p:fade/>
   </p:transition>
   <p:hf hdr="0"/>
@@ -50690,7 +50690,7 @@
   </p:txStyles>
   <p:extLst mod="1">
     <p:ext uri="{27BBF7A9-308A-43DC-89C8-2F10F3537804}">
-      <p15:sldGuideLst xmlns="" xmlns:p15="http://schemas.microsoft.com/office/powerpoint/2012/main">
+      <p15:sldGuideLst xmlns:p15="http://schemas.microsoft.com/office/powerpoint/2012/main">
         <p15:guide id="1" pos="204">
           <p15:clr>
             <a:srgbClr val="F26B43"/>
@@ -50922,7 +50922,7 @@
           <a:lstStyle/>
           <a:p>
             <a:r>
-              <a:rPr lang="de-DE" dirty="0" smtClean="0"/>
+              <a:rPr lang="de-DE" dirty="0"/>
               <a:t>18.4.2016</a:t>
             </a:r>
             <a:endParaRPr lang="en-GB" dirty="0"/>
@@ -51033,216 +51033,13 @@
   <p:clrMapOvr>
     <a:masterClrMapping/>
   </p:clrMapOvr>
-  <p:transition xmlns:p14="http://schemas.microsoft.com/office/powerpoint/2010/main">
+  <p:transition>
     <p:fade/>
   </p:transition>
 </p:sld>
 </file>
 
 <file path=ppt/slides/slide2.xml><?xml version="1.0" encoding="utf-8"?>
-<p:sld xmlns:a="http://schemas.openxmlformats.org/drawingml/2006/main" xmlns:r="http://schemas.openxmlformats.org/officeDocument/2006/relationships" xmlns:p="http://schemas.openxmlformats.org/presentationml/2006/main">
-  <p:cSld>
-    <p:spTree>
-      <p:nvGrpSpPr>
-        <p:cNvPr id="1" name=""/>
-        <p:cNvGrpSpPr/>
-        <p:nvPr/>
-      </p:nvGrpSpPr>
-      <p:grpSpPr>
-        <a:xfrm>
-          <a:off x="0" y="0"/>
-          <a:ext cx="0" cy="0"/>
-          <a:chOff x="0" y="0"/>
-          <a:chExt cx="0" cy="0"/>
-        </a:xfrm>
-      </p:grpSpPr>
-      <p:pic>
-        <p:nvPicPr>
-          <p:cNvPr id="2" name="Inhaltsplatzhalter 1"/>
-          <p:cNvPicPr>
-            <a:picLocks noGrp="1" noChangeAspect="1"/>
-          </p:cNvPicPr>
-          <p:nvPr>
-            <p:ph idx="1"/>
-          </p:nvPr>
-        </p:nvPicPr>
-        <p:blipFill rotWithShape="1">
-          <a:blip r:embed="rId2">
-            <a:extLst>
-              <a:ext uri="{28A0092B-C50C-407E-A947-70E740481C1C}">
-                <a14:useLocalDpi xmlns:a14="http://schemas.microsoft.com/office/drawing/2010/main" val="0"/>
-              </a:ext>
-            </a:extLst>
-          </a:blip>
-          <a:srcRect l="19490" r="19489"/>
-          <a:stretch/>
-        </p:blipFill>
-        <p:spPr>
-          <a:xfrm>
-            <a:off x="1619672" y="1844824"/>
-            <a:ext cx="5969286" cy="3286589"/>
-          </a:xfrm>
-        </p:spPr>
-      </p:pic>
-      <p:sp>
-        <p:nvSpPr>
-          <p:cNvPr id="4" name="Fußzeilenplatzhalter 3"/>
-          <p:cNvSpPr>
-            <a:spLocks noGrp="1"/>
-          </p:cNvSpPr>
-          <p:nvPr>
-            <p:ph type="ftr" sz="quarter" idx="11"/>
-          </p:nvPr>
-        </p:nvSpPr>
-        <p:spPr/>
-        <p:txBody>
-          <a:bodyPr/>
-          <a:lstStyle/>
-          <a:p>
-            <a:r>
-              <a:rPr lang="de-CH"/>
-              <a:t>A. Schnewly, J. Oswald, T. Grundmann</a:t>
-            </a:r>
-            <a:endParaRPr lang="en-GB" dirty="0"/>
-          </a:p>
-        </p:txBody>
-      </p:sp>
-      <p:sp>
-        <p:nvSpPr>
-          <p:cNvPr id="5" name="Foliennummernplatzhalter 4"/>
-          <p:cNvSpPr>
-            <a:spLocks noGrp="1"/>
-          </p:cNvSpPr>
-          <p:nvPr>
-            <p:ph type="sldNum" sz="quarter" idx="12"/>
-          </p:nvPr>
-        </p:nvSpPr>
-        <p:spPr/>
-        <p:txBody>
-          <a:bodyPr/>
-          <a:lstStyle/>
-          <a:p>
-            <a:fld id="{6C6AE60A-B69C-4790-82F7-3882EDF23186}" type="slidenum">
-              <a:rPr lang="en-GB" smtClean="0"/>
-              <a:pPr/>
-              <a:t>2</a:t>
-            </a:fld>
-            <a:endParaRPr lang="en-GB" dirty="0"/>
-          </a:p>
-        </p:txBody>
-      </p:sp>
-      <p:sp>
-        <p:nvSpPr>
-          <p:cNvPr id="10" name="Titel 9"/>
-          <p:cNvSpPr>
-            <a:spLocks noGrp="1"/>
-          </p:cNvSpPr>
-          <p:nvPr>
-            <p:ph type="title"/>
-          </p:nvPr>
-        </p:nvSpPr>
-        <p:spPr/>
-        <p:txBody>
-          <a:bodyPr/>
-          <a:lstStyle/>
-          <a:p>
-            <a:r>
-              <a:rPr lang="en-GB" dirty="0"/>
-              <a:t>Object Recognition as a Classification Problem</a:t>
-            </a:r>
-          </a:p>
-        </p:txBody>
-      </p:sp>
-      <p:sp>
-        <p:nvSpPr>
-          <p:cNvPr id="6" name="Textfeld 5"/>
-          <p:cNvSpPr txBox="1"/>
-          <p:nvPr/>
-        </p:nvSpPr>
-        <p:spPr>
-          <a:xfrm>
-            <a:off x="323850" y="5775067"/>
-            <a:ext cx="2519958" cy="246221"/>
-          </a:xfrm>
-          <a:prstGeom prst="rect">
-            <a:avLst/>
-          </a:prstGeom>
-          <a:noFill/>
-        </p:spPr>
-        <p:txBody>
-          <a:bodyPr wrap="square" rtlCol="0">
-            <a:spAutoFit/>
-          </a:bodyPr>
-          <a:lstStyle/>
-          <a:p>
-            <a:r>
-              <a:rPr lang="de-CH" sz="1000" dirty="0"/>
-              <a:t>Source: </a:t>
-            </a:r>
-            <a:r>
-              <a:rPr lang="de-CH" sz="1000" dirty="0" err="1"/>
-              <a:t>Udacity</a:t>
-            </a:r>
-            <a:r>
-              <a:rPr lang="de-CH" sz="1000" dirty="0"/>
-              <a:t> – </a:t>
-            </a:r>
-            <a:r>
-              <a:rPr lang="de-CH" sz="1000" dirty="0" err="1"/>
-              <a:t>Deep</a:t>
-            </a:r>
-            <a:r>
-              <a:rPr lang="de-CH" sz="1000" dirty="0"/>
-              <a:t> Learning</a:t>
-            </a:r>
-          </a:p>
-        </p:txBody>
-      </p:sp>
-      <p:sp>
-        <p:nvSpPr>
-          <p:cNvPr id="8" name="Datumsplatzhalter 2"/>
-          <p:cNvSpPr>
-            <a:spLocks noGrp="1"/>
-          </p:cNvSpPr>
-          <p:nvPr>
-            <p:ph type="dt" sz="half" idx="10"/>
-          </p:nvPr>
-        </p:nvSpPr>
-        <p:spPr>
-          <a:xfrm>
-            <a:off x="7937624" y="6308726"/>
-            <a:ext cx="612068" cy="468312"/>
-          </a:xfrm>
-        </p:spPr>
-        <p:txBody>
-          <a:bodyPr/>
-          <a:lstStyle/>
-          <a:p>
-            <a:r>
-              <a:rPr lang="de-DE" dirty="0" smtClean="0"/>
-              <a:t>18.4.2016</a:t>
-            </a:r>
-            <a:endParaRPr lang="en-GB" dirty="0"/>
-          </a:p>
-        </p:txBody>
-      </p:sp>
-    </p:spTree>
-    <p:extLst>
-      <p:ext uri="{BB962C8B-B14F-4D97-AF65-F5344CB8AC3E}">
-        <p14:creationId xmlns:p14="http://schemas.microsoft.com/office/powerpoint/2010/main" val="2470698625"/>
-      </p:ext>
-    </p:extLst>
-  </p:cSld>
-  <p:clrMapOvr>
-    <a:masterClrMapping/>
-  </p:clrMapOvr>
-  <p:transition xmlns:p14="http://schemas.microsoft.com/office/powerpoint/2010/main">
-    <p:fade/>
-  </p:transition>
-</p:sld>
-</file>
-
-<file path=ppt/slides/slide3.xml><?xml version="1.0" encoding="utf-8"?>
 <p:sld xmlns:a="http://schemas.openxmlformats.org/drawingml/2006/main" xmlns:r="http://schemas.openxmlformats.org/officeDocument/2006/relationships" xmlns:p="http://schemas.openxmlformats.org/presentationml/2006/main">
   <p:cSld>
     <p:spTree>
@@ -51300,7 +51097,7 @@
             <a:fld id="{6C6AE60A-B69C-4790-82F7-3882EDF23186}" type="slidenum">
               <a:rPr lang="en-GB" smtClean="0"/>
               <a:pPr/>
-              <a:t>3</a:t>
+              <a:t>2</a:t>
             </a:fld>
             <a:endParaRPr lang="en-GB" dirty="0"/>
           </a:p>
@@ -51322,18 +51119,17 @@
           <a:lstStyle/>
           <a:p>
             <a:r>
-              <a:rPr lang="en-GB" dirty="0" smtClean="0"/>
+              <a:rPr lang="en-GB" dirty="0"/>
               <a:t>3D Objects in </a:t>
             </a:r>
             <a:r>
-              <a:rPr lang="en-GB" dirty="0" err="1" smtClean="0"/>
+              <a:rPr lang="en-GB" dirty="0" err="1"/>
               <a:t>Voxilized</a:t>
             </a:r>
             <a:r>
-              <a:rPr lang="en-GB" dirty="0" smtClean="0"/>
+              <a:rPr lang="en-GB" dirty="0"/>
               <a:t> Format (32x32x32)</a:t>
             </a:r>
-            <a:endParaRPr lang="en-GB" dirty="0"/>
           </a:p>
         </p:txBody>
       </p:sp>
@@ -51470,7 +51266,7 @@
               </a:ln>
               <a:extLst>
                 <a:ext uri="{C572A759-6A51-4108-AA02-DFA0A04FC94B}">
-                  <ma14:wrappingTextBoxFlag xmlns:ma14="http://schemas.microsoft.com/office/mac/drawingml/2011/main" val="1"/>
+                  <ma14:wrappingTextBoxFlag xmlns:ma14="http://schemas.microsoft.com/office/mac/drawingml/2011/main" xmlns="" val="1"/>
                 </a:ext>
               </a:extLst>
             </p:spPr>
@@ -51492,14 +51288,13 @@
                   </a:defRPr>
                 </a:pPr>
                 <a:r>
-                  <a:rPr lang="de-CH" sz="2000" dirty="0" smtClean="0"/>
+                  <a:rPr lang="de-CH" sz="2000" dirty="0"/>
                   <a:t>O</a:t>
                 </a:r>
                 <a:r>
-                  <a:rPr sz="2000" dirty="0" smtClean="0"/>
+                  <a:rPr sz="2000" dirty="0"/>
                   <a:t>bject</a:t>
                 </a:r>
-                <a:endParaRPr sz="2000" dirty="0"/>
               </a:p>
             </p:txBody>
           </p:sp>
@@ -51522,7 +51317,7 @@
               </a:ln>
               <a:extLst>
                 <a:ext uri="{C572A759-6A51-4108-AA02-DFA0A04FC94B}">
-                  <ma14:wrappingTextBoxFlag xmlns:ma14="http://schemas.microsoft.com/office/mac/drawingml/2011/main" val="1"/>
+                  <ma14:wrappingTextBoxFlag xmlns:ma14="http://schemas.microsoft.com/office/mac/drawingml/2011/main" xmlns="" val="1"/>
                 </a:ext>
               </a:extLst>
             </p:spPr>
@@ -51569,7 +51364,7 @@
               </a:ln>
               <a:extLst>
                 <a:ext uri="{C572A759-6A51-4108-AA02-DFA0A04FC94B}">
-                  <ma14:wrappingTextBoxFlag xmlns:ma14="http://schemas.microsoft.com/office/mac/drawingml/2011/main" val="1"/>
+                  <ma14:wrappingTextBoxFlag xmlns:ma14="http://schemas.microsoft.com/office/mac/drawingml/2011/main" xmlns="" val="1"/>
                 </a:ext>
               </a:extLst>
             </p:spPr>
@@ -51620,7 +51415,7 @@
               </a:ln>
               <a:extLst>
                 <a:ext uri="{C572A759-6A51-4108-AA02-DFA0A04FC94B}">
-                  <ma14:wrappingTextBoxFlag xmlns:ma14="http://schemas.microsoft.com/office/mac/drawingml/2011/main" val="1"/>
+                  <ma14:wrappingTextBoxFlag xmlns:ma14="http://schemas.microsoft.com/office/mac/drawingml/2011/main" xmlns="" val="1"/>
                 </a:ext>
               </a:extLst>
             </p:spPr>
@@ -51921,7 +51716,7 @@
           <a:lstStyle/>
           <a:p>
             <a:r>
-              <a:rPr lang="de-DE" dirty="0" smtClean="0"/>
+              <a:rPr lang="de-DE" dirty="0"/>
               <a:t>18.4.2016</a:t>
             </a:r>
             <a:endParaRPr lang="en-GB" dirty="0"/>
@@ -51938,7 +51733,210 @@
   <p:clrMapOvr>
     <a:masterClrMapping/>
   </p:clrMapOvr>
-  <p:transition xmlns:p14="http://schemas.microsoft.com/office/powerpoint/2010/main">
+  <p:transition>
+    <p:fade/>
+  </p:transition>
+</p:sld>
+</file>
+
+<file path=ppt/slides/slide3.xml><?xml version="1.0" encoding="utf-8"?>
+<p:sld xmlns:a="http://schemas.openxmlformats.org/drawingml/2006/main" xmlns:r="http://schemas.openxmlformats.org/officeDocument/2006/relationships" xmlns:p="http://schemas.openxmlformats.org/presentationml/2006/main">
+  <p:cSld>
+    <p:spTree>
+      <p:nvGrpSpPr>
+        <p:cNvPr id="1" name=""/>
+        <p:cNvGrpSpPr/>
+        <p:nvPr/>
+      </p:nvGrpSpPr>
+      <p:grpSpPr>
+        <a:xfrm>
+          <a:off x="0" y="0"/>
+          <a:ext cx="0" cy="0"/>
+          <a:chOff x="0" y="0"/>
+          <a:chExt cx="0" cy="0"/>
+        </a:xfrm>
+      </p:grpSpPr>
+      <p:pic>
+        <p:nvPicPr>
+          <p:cNvPr id="2" name="Inhaltsplatzhalter 1"/>
+          <p:cNvPicPr>
+            <a:picLocks noGrp="1" noChangeAspect="1"/>
+          </p:cNvPicPr>
+          <p:nvPr>
+            <p:ph idx="1"/>
+          </p:nvPr>
+        </p:nvPicPr>
+        <p:blipFill rotWithShape="1">
+          <a:blip r:embed="rId2">
+            <a:extLst>
+              <a:ext uri="{28A0092B-C50C-407E-A947-70E740481C1C}">
+                <a14:useLocalDpi xmlns:a14="http://schemas.microsoft.com/office/drawing/2010/main" val="0"/>
+              </a:ext>
+            </a:extLst>
+          </a:blip>
+          <a:srcRect l="19490" r="19489"/>
+          <a:stretch/>
+        </p:blipFill>
+        <p:spPr>
+          <a:xfrm>
+            <a:off x="1619672" y="1844824"/>
+            <a:ext cx="5969286" cy="3286589"/>
+          </a:xfrm>
+        </p:spPr>
+      </p:pic>
+      <p:sp>
+        <p:nvSpPr>
+          <p:cNvPr id="4" name="Fußzeilenplatzhalter 3"/>
+          <p:cNvSpPr>
+            <a:spLocks noGrp="1"/>
+          </p:cNvSpPr>
+          <p:nvPr>
+            <p:ph type="ftr" sz="quarter" idx="11"/>
+          </p:nvPr>
+        </p:nvSpPr>
+        <p:spPr/>
+        <p:txBody>
+          <a:bodyPr/>
+          <a:lstStyle/>
+          <a:p>
+            <a:r>
+              <a:rPr lang="de-CH"/>
+              <a:t>A. Schnewly, J. Oswald, T. Grundmann</a:t>
+            </a:r>
+            <a:endParaRPr lang="en-GB" dirty="0"/>
+          </a:p>
+        </p:txBody>
+      </p:sp>
+      <p:sp>
+        <p:nvSpPr>
+          <p:cNvPr id="5" name="Foliennummernplatzhalter 4"/>
+          <p:cNvSpPr>
+            <a:spLocks noGrp="1"/>
+          </p:cNvSpPr>
+          <p:nvPr>
+            <p:ph type="sldNum" sz="quarter" idx="12"/>
+          </p:nvPr>
+        </p:nvSpPr>
+        <p:spPr/>
+        <p:txBody>
+          <a:bodyPr/>
+          <a:lstStyle/>
+          <a:p>
+            <a:fld id="{6C6AE60A-B69C-4790-82F7-3882EDF23186}" type="slidenum">
+              <a:rPr lang="en-GB" smtClean="0"/>
+              <a:pPr/>
+              <a:t>3</a:t>
+            </a:fld>
+            <a:endParaRPr lang="en-GB" dirty="0"/>
+          </a:p>
+        </p:txBody>
+      </p:sp>
+      <p:sp>
+        <p:nvSpPr>
+          <p:cNvPr id="10" name="Titel 9"/>
+          <p:cNvSpPr>
+            <a:spLocks noGrp="1"/>
+          </p:cNvSpPr>
+          <p:nvPr>
+            <p:ph type="title"/>
+          </p:nvPr>
+        </p:nvSpPr>
+        <p:spPr/>
+        <p:txBody>
+          <a:bodyPr/>
+          <a:lstStyle/>
+          <a:p>
+            <a:r>
+              <a:rPr lang="en-GB" dirty="0"/>
+              <a:t>Object Recognition as a Classification Problem</a:t>
+            </a:r>
+          </a:p>
+        </p:txBody>
+      </p:sp>
+      <p:sp>
+        <p:nvSpPr>
+          <p:cNvPr id="6" name="Textfeld 5"/>
+          <p:cNvSpPr txBox="1"/>
+          <p:nvPr/>
+        </p:nvSpPr>
+        <p:spPr>
+          <a:xfrm>
+            <a:off x="323850" y="5775067"/>
+            <a:ext cx="2519958" cy="246221"/>
+          </a:xfrm>
+          <a:prstGeom prst="rect">
+            <a:avLst/>
+          </a:prstGeom>
+          <a:noFill/>
+        </p:spPr>
+        <p:txBody>
+          <a:bodyPr wrap="square" rtlCol="0">
+            <a:spAutoFit/>
+          </a:bodyPr>
+          <a:lstStyle/>
+          <a:p>
+            <a:r>
+              <a:rPr lang="de-CH" sz="1000" dirty="0"/>
+              <a:t>Source: </a:t>
+            </a:r>
+            <a:r>
+              <a:rPr lang="de-CH" sz="1000" dirty="0" err="1"/>
+              <a:t>Udacity</a:t>
+            </a:r>
+            <a:r>
+              <a:rPr lang="de-CH" sz="1000" dirty="0"/>
+              <a:t> – </a:t>
+            </a:r>
+            <a:r>
+              <a:rPr lang="de-CH" sz="1000" dirty="0" err="1"/>
+              <a:t>Deep</a:t>
+            </a:r>
+            <a:r>
+              <a:rPr lang="de-CH" sz="1000" dirty="0"/>
+              <a:t> Learning</a:t>
+            </a:r>
+          </a:p>
+        </p:txBody>
+      </p:sp>
+      <p:sp>
+        <p:nvSpPr>
+          <p:cNvPr id="8" name="Datumsplatzhalter 2"/>
+          <p:cNvSpPr>
+            <a:spLocks noGrp="1"/>
+          </p:cNvSpPr>
+          <p:nvPr>
+            <p:ph type="dt" sz="half" idx="10"/>
+          </p:nvPr>
+        </p:nvSpPr>
+        <p:spPr>
+          <a:xfrm>
+            <a:off x="7937624" y="6308726"/>
+            <a:ext cx="612068" cy="468312"/>
+          </a:xfrm>
+        </p:spPr>
+        <p:txBody>
+          <a:bodyPr/>
+          <a:lstStyle/>
+          <a:p>
+            <a:r>
+              <a:rPr lang="de-DE" dirty="0"/>
+              <a:t>18.4.2016</a:t>
+            </a:r>
+            <a:endParaRPr lang="en-GB" dirty="0"/>
+          </a:p>
+        </p:txBody>
+      </p:sp>
+    </p:spTree>
+    <p:extLst>
+      <p:ext uri="{BB962C8B-B14F-4D97-AF65-F5344CB8AC3E}">
+        <p14:creationId xmlns:p14="http://schemas.microsoft.com/office/powerpoint/2010/main" val="2470698625"/>
+      </p:ext>
+    </p:extLst>
+  </p:cSld>
+  <p:clrMapOvr>
+    <a:masterClrMapping/>
+  </p:clrMapOvr>
+  <p:transition>
     <p:fade/>
   </p:transition>
 </p:sld>
@@ -51982,10 +51980,9 @@
           <a:lstStyle/>
           <a:p>
             <a:r>
-              <a:rPr lang="en-GB" sz="1800" dirty="0" smtClean="0"/>
+              <a:rPr lang="en-GB" sz="1800" dirty="0"/>
               <a:t>ModelNet40</a:t>
             </a:r>
-            <a:endParaRPr lang="en-GB" sz="1800" dirty="0"/>
           </a:p>
           <a:p>
             <a:pPr lvl="1"/>
@@ -52260,7 +52257,7 @@
           <a:lstStyle/>
           <a:p>
             <a:r>
-              <a:rPr lang="de-DE" dirty="0" smtClean="0"/>
+              <a:rPr lang="de-DE" dirty="0"/>
               <a:t>18.4.2016</a:t>
             </a:r>
             <a:endParaRPr lang="en-GB" dirty="0"/>
@@ -52277,7 +52274,7 @@
   <p:clrMapOvr>
     <a:masterClrMapping/>
   </p:clrMapOvr>
-  <p:transition xmlns:p14="http://schemas.microsoft.com/office/powerpoint/2010/main">
+  <p:transition>
     <p:fade/>
   </p:transition>
 </p:sld>
@@ -52376,10 +52373,9 @@
           <a:lstStyle/>
           <a:p>
             <a:r>
-              <a:rPr lang="en-GB" dirty="0" smtClean="0"/>
+              <a:rPr lang="en-GB" dirty="0"/>
               <a:t>First Timeline</a:t>
             </a:r>
-            <a:endParaRPr lang="en-GB" dirty="0"/>
           </a:p>
         </p:txBody>
       </p:sp>
@@ -52428,7 +52424,7 @@
           <a:lstStyle/>
           <a:p>
             <a:r>
-              <a:rPr lang="de-DE" sz="4400" dirty="0" smtClean="0">
+              <a:rPr lang="de-DE" sz="4400" dirty="0">
                 <a:solidFill>
                   <a:srgbClr val="008000"/>
                 </a:solidFill>
@@ -52470,7 +52466,7 @@
           <a:lstStyle/>
           <a:p>
             <a:r>
-              <a:rPr lang="de-DE" sz="4400" dirty="0" smtClean="0">
+              <a:rPr lang="de-DE" sz="4400" dirty="0">
                 <a:solidFill>
                   <a:srgbClr val="008000"/>
                 </a:solidFill>
@@ -52512,7 +52508,7 @@
           <a:lstStyle/>
           <a:p>
             <a:r>
-              <a:rPr lang="de-DE" sz="4400" dirty="0" smtClean="0">
+              <a:rPr lang="de-DE" sz="4400" dirty="0">
                 <a:solidFill>
                   <a:srgbClr val="008000"/>
                 </a:solidFill>
@@ -52554,7 +52550,7 @@
           <a:lstStyle/>
           <a:p>
             <a:r>
-              <a:rPr lang="de-DE" sz="4400" dirty="0" smtClean="0">
+              <a:rPr lang="de-DE" sz="4400" dirty="0">
                 <a:solidFill>
                   <a:srgbClr val="008000"/>
                 </a:solidFill>
@@ -52644,7 +52640,7 @@
           <a:lstStyle/>
           <a:p>
             <a:r>
-              <a:rPr lang="de-DE" dirty="0" smtClean="0"/>
+              <a:rPr lang="de-DE" dirty="0"/>
               <a:t>18.4.2016</a:t>
             </a:r>
             <a:endParaRPr lang="en-GB" dirty="0"/>
@@ -52661,7 +52657,7 @@
   <p:clrMapOvr>
     <a:masterClrMapping/>
   </p:clrMapOvr>
-  <p:transition xmlns:p14="http://schemas.microsoft.com/office/powerpoint/2010/main">
+  <p:transition>
     <p:fade/>
   </p:transition>
 </p:sld>
@@ -52753,30 +52749,22 @@
           <a:p>
             <a:pPr lvl="0"/>
             <a:r>
-              <a:rPr lang="de-DE" dirty="0" smtClean="0"/>
+              <a:rPr lang="de-DE" dirty="0"/>
               <a:t>Progress </a:t>
             </a:r>
             <a:r>
-              <a:rPr lang="de-DE" dirty="0" err="1" smtClean="0"/>
+              <a:rPr lang="de-DE" dirty="0" err="1"/>
               <a:t>and</a:t>
             </a:r>
             <a:r>
-              <a:rPr lang="de-DE" dirty="0" smtClean="0"/>
+              <a:rPr lang="de-DE" dirty="0"/>
               <a:t> Outline</a:t>
             </a:r>
-            <a:r>
-              <a:rPr lang="de-DE" dirty="0" smtClean="0"/>
-              <a:t/>
-            </a:r>
             <a:br>
-              <a:rPr lang="de-DE" dirty="0" smtClean="0"/>
+              <a:rPr lang="de-DE" dirty="0"/>
             </a:br>
-            <a:r>
-              <a:rPr lang="en-GB" dirty="0" smtClean="0"/>
-              <a:t/>
-            </a:r>
             <a:br>
-              <a:rPr lang="en-GB" dirty="0" smtClean="0"/>
+              <a:rPr lang="en-GB" dirty="0"/>
             </a:br>
             <a:endParaRPr lang="en-GB" dirty="0"/>
           </a:p>
@@ -52834,31 +52822,31 @@
           <a:lstStyle/>
           <a:p>
             <a:r>
-              <a:rPr lang="de-DE" dirty="0" smtClean="0"/>
+              <a:rPr lang="de-DE" dirty="0"/>
               <a:t>First </a:t>
             </a:r>
             <a:r>
-              <a:rPr lang="de-DE" dirty="0" err="1" smtClean="0"/>
+              <a:rPr lang="de-DE" dirty="0" err="1"/>
               <a:t>attempt</a:t>
             </a:r>
             <a:r>
-              <a:rPr lang="de-DE" dirty="0" smtClean="0"/>
+              <a:rPr lang="de-DE" dirty="0"/>
               <a:t>: </a:t>
             </a:r>
             <a:r>
-              <a:rPr lang="de-DE" dirty="0" err="1" smtClean="0"/>
+              <a:rPr lang="de-DE" dirty="0" err="1"/>
               <a:t>Implement</a:t>
             </a:r>
             <a:r>
-              <a:rPr lang="de-DE" dirty="0" smtClean="0"/>
+              <a:rPr lang="de-DE" dirty="0"/>
               <a:t> via </a:t>
             </a:r>
             <a:r>
-              <a:rPr lang="de-DE" i="1" dirty="0" err="1" smtClean="0"/>
+              <a:rPr lang="de-DE" i="1" dirty="0" err="1"/>
               <a:t>Tensorflow</a:t>
             </a:r>
             <a:r>
-              <a:rPr lang="de-DE" i="1" dirty="0" smtClean="0"/>
+              <a:rPr lang="de-DE" i="1" dirty="0"/>
               <a:t> </a:t>
             </a:r>
           </a:p>
@@ -52868,15 +52856,15 @@
               <a:buChar char="-"/>
             </a:pPr>
             <a:r>
-              <a:rPr lang="de-DE" dirty="0" err="1" smtClean="0"/>
+              <a:rPr lang="de-DE" dirty="0" err="1"/>
               <a:t>No</a:t>
             </a:r>
             <a:r>
-              <a:rPr lang="de-DE" dirty="0" smtClean="0"/>
+              <a:rPr lang="de-DE" dirty="0"/>
               <a:t> 3D </a:t>
             </a:r>
             <a:r>
-              <a:rPr lang="de-DE" dirty="0" err="1" smtClean="0"/>
+              <a:rPr lang="de-DE" dirty="0" err="1"/>
               <a:t>layers</a:t>
             </a:r>
             <a:endParaRPr lang="de-DE" dirty="0"/>
@@ -52906,7 +52894,7 @@
           <a:lstStyle/>
           <a:p>
             <a:r>
-              <a:rPr lang="de-DE" sz="4500" dirty="0" smtClean="0">
+              <a:rPr lang="de-DE" sz="4500" dirty="0">
                 <a:solidFill>
                   <a:srgbClr val="FF0000"/>
                 </a:solidFill>
@@ -52948,30 +52936,22 @@
           <a:lstStyle/>
           <a:p>
             <a:r>
-              <a:rPr lang="de-DE" dirty="0" smtClean="0"/>
-              <a:t>S</a:t>
-            </a:r>
-            <a:r>
-              <a:rPr lang="de-DE" dirty="0" smtClean="0"/>
-              <a:t>econd </a:t>
-            </a:r>
-            <a:r>
-              <a:rPr lang="de-DE" dirty="0" err="1" smtClean="0"/>
+              <a:rPr lang="de-DE" dirty="0"/>
+              <a:t>Second </a:t>
+            </a:r>
+            <a:r>
+              <a:rPr lang="de-DE" dirty="0" err="1"/>
               <a:t>attempt</a:t>
             </a:r>
             <a:r>
-              <a:rPr lang="de-DE" dirty="0" smtClean="0"/>
-              <a:t>: </a:t>
-            </a:r>
-            <a:r>
-              <a:rPr lang="de-DE" dirty="0" smtClean="0"/>
-              <a:t>Implementation via </a:t>
-            </a:r>
-            <a:r>
-              <a:rPr lang="de-DE" i="1" dirty="0" err="1" smtClean="0"/>
+              <a:rPr lang="de-DE" dirty="0"/>
+              <a:t>: Implementation via </a:t>
+            </a:r>
+            <a:r>
+              <a:rPr lang="de-DE" i="1" dirty="0" err="1"/>
               <a:t>Keras</a:t>
             </a:r>
-            <a:endParaRPr lang="de-DE" i="1" dirty="0" smtClean="0"/>
+            <a:endParaRPr lang="de-DE" i="1" dirty="0"/>
           </a:p>
           <a:p>
             <a:pPr marL="285750" indent="-285750">
@@ -52980,33 +52960,29 @@
             </a:pPr>
             <a:r>
               <a:rPr lang="de-DE" dirty="0"/>
-              <a:t>a</a:t>
-            </a:r>
-            <a:r>
-              <a:rPr lang="de-DE" dirty="0" smtClean="0"/>
-              <a:t>ll </a:t>
-            </a:r>
-            <a:r>
-              <a:rPr lang="de-DE" dirty="0" err="1" smtClean="0"/>
+              <a:t>all </a:t>
+            </a:r>
+            <a:r>
+              <a:rPr lang="de-DE" dirty="0" err="1"/>
               <a:t>needed</a:t>
             </a:r>
             <a:r>
-              <a:rPr lang="de-DE" dirty="0" smtClean="0"/>
+              <a:rPr lang="de-DE" dirty="0"/>
               <a:t> </a:t>
             </a:r>
             <a:r>
-              <a:rPr lang="de-DE" dirty="0" err="1" smtClean="0"/>
+              <a:rPr lang="de-DE" dirty="0" err="1"/>
               <a:t>layers</a:t>
             </a:r>
             <a:r>
-              <a:rPr lang="de-DE" dirty="0" smtClean="0"/>
+              <a:rPr lang="de-DE" dirty="0"/>
               <a:t> </a:t>
             </a:r>
             <a:r>
-              <a:rPr lang="de-DE" dirty="0" err="1" smtClean="0"/>
+              <a:rPr lang="de-DE" dirty="0" err="1"/>
               <a:t>construced</a:t>
             </a:r>
-            <a:endParaRPr lang="de-DE" dirty="0" smtClean="0"/>
+            <a:endParaRPr lang="de-DE" dirty="0"/>
           </a:p>
           <a:p>
             <a:pPr marL="285750" indent="-285750">
@@ -53015,49 +52991,44 @@
             </a:pPr>
             <a:r>
               <a:rPr lang="de-DE" dirty="0" err="1"/>
-              <a:t>d</a:t>
-            </a:r>
-            <a:r>
-              <a:rPr lang="de-DE" dirty="0" err="1" smtClean="0"/>
-              <a:t>ata</a:t>
-            </a:r>
-            <a:r>
-              <a:rPr lang="de-DE" dirty="0" smtClean="0"/>
+              <a:t>data</a:t>
+            </a:r>
+            <a:r>
+              <a:rPr lang="de-DE" dirty="0"/>
               <a:t> </a:t>
             </a:r>
             <a:r>
-              <a:rPr lang="de-DE" dirty="0" err="1" smtClean="0"/>
+              <a:rPr lang="de-DE" dirty="0" err="1"/>
               <a:t>preparation</a:t>
             </a:r>
             <a:r>
-              <a:rPr lang="de-DE" dirty="0" smtClean="0"/>
+              <a:rPr lang="de-DE" dirty="0"/>
               <a:t> </a:t>
             </a:r>
             <a:r>
-              <a:rPr lang="de-DE" dirty="0" err="1" smtClean="0"/>
+              <a:rPr lang="de-DE" dirty="0" err="1"/>
               <a:t>done</a:t>
             </a:r>
             <a:r>
-              <a:rPr lang="de-DE" dirty="0" smtClean="0"/>
+              <a:rPr lang="de-DE" dirty="0"/>
               <a:t> ( </a:t>
             </a:r>
             <a:r>
-              <a:rPr lang="de-DE" dirty="0" err="1" smtClean="0"/>
+              <a:rPr lang="de-DE" dirty="0" err="1"/>
               <a:t>Matlab</a:t>
             </a:r>
             <a:r>
-              <a:rPr lang="de-DE" dirty="0" smtClean="0"/>
+              <a:rPr lang="de-DE" dirty="0"/>
               <a:t> -&gt; </a:t>
             </a:r>
             <a:r>
-              <a:rPr lang="de-DE" dirty="0" err="1" smtClean="0"/>
+              <a:rPr lang="de-DE" dirty="0" err="1"/>
               <a:t>Numpy</a:t>
             </a:r>
             <a:r>
-              <a:rPr lang="de-DE" dirty="0" smtClean="0"/>
+              <a:rPr lang="de-DE" dirty="0"/>
               <a:t>)</a:t>
             </a:r>
-            <a:endParaRPr lang="de-DE" dirty="0" smtClean="0"/>
           </a:p>
           <a:p>
             <a:pPr marL="285750" indent="-285750">
@@ -53066,33 +53037,28 @@
             </a:pPr>
             <a:r>
               <a:rPr lang="de-DE" dirty="0" err="1"/>
-              <a:t>d</a:t>
-            </a:r>
-            <a:r>
-              <a:rPr lang="de-DE" dirty="0" err="1" smtClean="0"/>
-              <a:t>ata</a:t>
-            </a:r>
-            <a:r>
-              <a:rPr lang="de-DE" dirty="0" smtClean="0"/>
+              <a:t>data</a:t>
+            </a:r>
+            <a:r>
+              <a:rPr lang="de-DE" dirty="0"/>
               <a:t> </a:t>
             </a:r>
             <a:r>
-              <a:rPr lang="de-DE" dirty="0" err="1" smtClean="0"/>
+              <a:rPr lang="de-DE" dirty="0" err="1"/>
               <a:t>loader</a:t>
             </a:r>
             <a:r>
-              <a:rPr lang="de-DE" dirty="0" smtClean="0"/>
+              <a:rPr lang="de-DE" dirty="0"/>
               <a:t> </a:t>
             </a:r>
             <a:r>
-              <a:rPr lang="de-DE" dirty="0" err="1" smtClean="0"/>
+              <a:rPr lang="de-DE" dirty="0" err="1"/>
               <a:t>implemented</a:t>
             </a:r>
             <a:r>
-              <a:rPr lang="de-DE" dirty="0" smtClean="0"/>
+              <a:rPr lang="de-DE" dirty="0"/>
               <a:t> </a:t>
             </a:r>
-            <a:endParaRPr lang="de-DE" dirty="0"/>
           </a:p>
           <a:p>
             <a:pPr marL="742950" lvl="1" indent="-285750">
@@ -53100,26 +53066,33 @@
               <a:buChar char="-"/>
             </a:pPr>
             <a:r>
-              <a:rPr lang="de-DE" dirty="0" smtClean="0"/>
-              <a:t>super </a:t>
-            </a:r>
-            <a:r>
-              <a:rPr lang="de-DE" dirty="0" err="1" smtClean="0"/>
-              <a:t>compressed</a:t>
-            </a:r>
-            <a:r>
-              <a:rPr lang="de-DE" dirty="0" smtClean="0"/>
-              <a:t> hdf5 </a:t>
-            </a:r>
-            <a:r>
-              <a:rPr lang="de-DE" dirty="0" err="1" smtClean="0"/>
+              <a:rPr lang="de-DE" dirty="0"/>
+              <a:t>hdf5 </a:t>
+            </a:r>
+            <a:r>
+              <a:rPr lang="de-DE" dirty="0" err="1"/>
               <a:t>files</a:t>
             </a:r>
             <a:r>
-              <a:rPr lang="de-DE" dirty="0" smtClean="0"/>
+              <a:rPr lang="de-DE" dirty="0"/>
+              <a:t> </a:t>
+            </a:r>
+            <a:r>
+              <a:rPr lang="de-DE" dirty="0" err="1"/>
+              <a:t>for</a:t>
+            </a:r>
+            <a:r>
+              <a:rPr lang="de-DE" dirty="0"/>
+              <a:t> </a:t>
+            </a:r>
+            <a:r>
+              <a:rPr lang="de-DE" dirty="0" err="1"/>
+              <a:t>compression</a:t>
+            </a:r>
+            <a:r>
+              <a:rPr lang="de-DE" dirty="0"/>
               <a:t>  </a:t>
             </a:r>
-            <a:endParaRPr lang="de-DE" dirty="0" smtClean="0"/>
           </a:p>
           <a:p>
             <a:pPr marL="285750" indent="-285750">
@@ -53127,54 +53100,50 @@
               <a:buChar char="-"/>
             </a:pPr>
             <a:r>
-              <a:rPr lang="de-DE" dirty="0" err="1" smtClean="0"/>
+              <a:rPr lang="de-DE" dirty="0" err="1"/>
               <a:t>Finished</a:t>
             </a:r>
             <a:r>
-              <a:rPr lang="de-DE" dirty="0" smtClean="0"/>
+              <a:rPr lang="de-DE" dirty="0"/>
               <a:t> </a:t>
             </a:r>
             <a:r>
-              <a:rPr lang="de-DE" dirty="0" err="1" smtClean="0"/>
+              <a:rPr lang="de-DE" dirty="0" err="1"/>
               <a:t>training</a:t>
             </a:r>
             <a:r>
-              <a:rPr lang="de-DE" dirty="0" smtClean="0"/>
+              <a:rPr lang="de-DE" dirty="0"/>
               <a:t> </a:t>
             </a:r>
             <a:r>
-              <a:rPr lang="de-DE" dirty="0" err="1" smtClean="0"/>
+              <a:rPr lang="de-DE" dirty="0" err="1"/>
               <a:t>with</a:t>
             </a:r>
             <a:r>
-              <a:rPr lang="de-DE" dirty="0" smtClean="0"/>
+              <a:rPr lang="de-DE" dirty="0"/>
               <a:t> </a:t>
             </a:r>
             <a:r>
-              <a:rPr lang="de-DE" dirty="0" err="1" smtClean="0"/>
+              <a:rPr lang="de-DE" dirty="0" err="1"/>
               <a:t>small</a:t>
             </a:r>
             <a:r>
-              <a:rPr lang="de-DE" dirty="0" smtClean="0"/>
+              <a:rPr lang="de-DE" dirty="0"/>
               <a:t> </a:t>
             </a:r>
             <a:r>
               <a:rPr lang="de-DE" dirty="0" err="1"/>
-              <a:t>d</a:t>
-            </a:r>
-            <a:r>
-              <a:rPr lang="de-DE" dirty="0" err="1" smtClean="0"/>
-              <a:t>ata</a:t>
-            </a:r>
-            <a:r>
-              <a:rPr lang="de-DE" dirty="0" smtClean="0"/>
+              <a:t>data</a:t>
+            </a:r>
+            <a:r>
+              <a:rPr lang="de-DE" dirty="0"/>
               <a:t> </a:t>
             </a:r>
             <a:r>
-              <a:rPr lang="de-DE" dirty="0" err="1" smtClean="0"/>
+              <a:rPr lang="de-DE" dirty="0" err="1"/>
               <a:t>set</a:t>
             </a:r>
-            <a:endParaRPr lang="de-DE" dirty="0" smtClean="0"/>
+            <a:endParaRPr lang="de-DE" dirty="0"/>
           </a:p>
           <a:p>
             <a:pPr marL="742950" lvl="1" indent="-285750">
@@ -53182,36 +53151,44 @@
               <a:buChar char="-"/>
             </a:pPr>
             <a:r>
-              <a:rPr lang="de-DE" dirty="0" smtClean="0"/>
-              <a:t>2 Models (out </a:t>
-            </a:r>
-            <a:r>
-              <a:rPr lang="de-DE" dirty="0" err="1" smtClean="0"/>
+              <a:rPr lang="de-DE" dirty="0"/>
+              <a:t>2 </a:t>
+            </a:r>
+            <a:r>
+              <a:rPr lang="de-DE" dirty="0" err="1"/>
+              <a:t>Classes</a:t>
+            </a:r>
+            <a:r>
+              <a:rPr lang="de-DE" dirty="0"/>
+              <a:t> (out </a:t>
+            </a:r>
+            <a:r>
+              <a:rPr lang="de-DE" dirty="0" err="1"/>
               <a:t>of</a:t>
             </a:r>
             <a:r>
-              <a:rPr lang="de-DE" dirty="0" smtClean="0"/>
-              <a:t> 40)</a:t>
-            </a:r>
-          </a:p>
-          <a:p>
-            <a:endParaRPr lang="de-DE" dirty="0" smtClean="0"/>
-          </a:p>
-          <a:p>
-            <a:r>
-              <a:rPr lang="de-DE" dirty="0" smtClean="0"/>
+              <a:rPr lang="de-DE" dirty="0"/>
+              <a:t> 40) </a:t>
+            </a:r>
+          </a:p>
+          <a:p>
+            <a:endParaRPr lang="de-DE" dirty="0"/>
+          </a:p>
+          <a:p>
+            <a:r>
+              <a:rPr lang="de-DE" dirty="0"/>
               <a:t>Next </a:t>
             </a:r>
             <a:r>
-              <a:rPr lang="de-DE" dirty="0" err="1" smtClean="0"/>
+              <a:rPr lang="de-DE" dirty="0" err="1"/>
               <a:t>Steps</a:t>
             </a:r>
             <a:r>
-              <a:rPr lang="de-DE" dirty="0" smtClean="0"/>
+              <a:rPr lang="de-DE" dirty="0"/>
               <a:t> / </a:t>
             </a:r>
             <a:r>
-              <a:rPr lang="de-DE" dirty="0" err="1" smtClean="0"/>
+              <a:rPr lang="de-DE" dirty="0" err="1"/>
               <a:t>Challanges</a:t>
             </a:r>
             <a:endParaRPr lang="de-DE" dirty="0"/>
@@ -53222,50 +53199,46 @@
               <a:buChar char="-"/>
             </a:pPr>
             <a:r>
-              <a:rPr lang="de-DE" dirty="0" smtClean="0"/>
+              <a:rPr lang="de-DE" dirty="0"/>
               <a:t>Start Training </a:t>
             </a:r>
             <a:r>
-              <a:rPr lang="de-DE" dirty="0" err="1" smtClean="0"/>
+              <a:rPr lang="de-DE" dirty="0" err="1"/>
               <a:t>and</a:t>
-            </a:r>
-            <a:r>
-              <a:rPr lang="de-DE" dirty="0" smtClean="0"/>
-              <a:t> </a:t>
-            </a:r>
-            <a:r>
-              <a:rPr lang="de-DE" dirty="0" err="1" smtClean="0"/>
-              <a:t>Testing</a:t>
             </a:r>
             <a:r>
               <a:rPr lang="de-DE" dirty="0"/>
               <a:t> </a:t>
             </a:r>
             <a:r>
-              <a:rPr lang="de-DE" dirty="0" smtClean="0"/>
-              <a:t>on </a:t>
-            </a:r>
-            <a:r>
-              <a:rPr lang="de-DE" dirty="0" err="1" smtClean="0"/>
+              <a:rPr lang="de-DE" dirty="0" err="1"/>
+              <a:t>Testing</a:t>
+            </a:r>
+            <a:r>
+              <a:rPr lang="de-DE" dirty="0"/>
+              <a:t> on </a:t>
+            </a:r>
+            <a:r>
+              <a:rPr lang="de-DE" dirty="0" err="1"/>
               <a:t>big</a:t>
             </a:r>
             <a:r>
-              <a:rPr lang="de-DE" dirty="0" smtClean="0"/>
+              <a:rPr lang="de-DE" dirty="0"/>
               <a:t> </a:t>
             </a:r>
             <a:r>
-              <a:rPr lang="de-DE" dirty="0" err="1" smtClean="0"/>
+              <a:rPr lang="de-DE" dirty="0" err="1"/>
               <a:t>data</a:t>
             </a:r>
             <a:r>
-              <a:rPr lang="de-DE" dirty="0" smtClean="0"/>
+              <a:rPr lang="de-DE" dirty="0"/>
               <a:t> </a:t>
             </a:r>
             <a:r>
-              <a:rPr lang="de-DE" dirty="0" err="1" smtClean="0"/>
+              <a:rPr lang="de-DE" dirty="0" err="1"/>
               <a:t>set</a:t>
             </a:r>
-            <a:endParaRPr lang="de-DE" dirty="0" smtClean="0"/>
+            <a:endParaRPr lang="de-DE" dirty="0"/>
           </a:p>
           <a:p>
             <a:pPr marL="800100" lvl="1" indent="-342900">
@@ -53273,34 +53246,41 @@
               <a:buChar char="-"/>
             </a:pPr>
             <a:r>
-              <a:rPr lang="de-DE" dirty="0" smtClean="0"/>
-              <a:t>on  </a:t>
-            </a:r>
-            <a:r>
-              <a:rPr lang="de-DE" dirty="0" smtClean="0"/>
-              <a:t>GPU </a:t>
-            </a:r>
-            <a:r>
-              <a:rPr lang="de-DE" dirty="0" err="1" smtClean="0"/>
+              <a:rPr lang="de-DE" dirty="0"/>
+              <a:t>on  GPU (</a:t>
+            </a:r>
+            <a:r>
+              <a:rPr lang="de-DE" dirty="0" err="1"/>
               <a:t>and</a:t>
             </a:r>
             <a:r>
-              <a:rPr lang="de-DE" dirty="0" smtClean="0"/>
-              <a:t>/</a:t>
-            </a:r>
-            <a:r>
-              <a:rPr lang="de-DE" dirty="0" err="1" smtClean="0"/>
-              <a:t>or</a:t>
-            </a:r>
-            <a:r>
-              <a:rPr lang="de-DE" dirty="0" smtClean="0"/>
+              <a:rPr lang="de-DE" dirty="0"/>
+              <a:t>/ </a:t>
+            </a:r>
+            <a:r>
+              <a:rPr lang="de-DE" dirty="0" err="1"/>
+              <a:t>cluster</a:t>
+            </a:r>
+            <a:r>
+              <a:rPr lang="de-DE" dirty="0"/>
               <a:t> </a:t>
             </a:r>
             <a:r>
-              <a:rPr lang="de-DE" dirty="0" err="1" smtClean="0"/>
-              <a:t>cluster</a:t>
-            </a:r>
-            <a:endParaRPr lang="de-DE" dirty="0" smtClean="0"/>
+              <a:rPr lang="de-DE" dirty="0" err="1"/>
+              <a:t>with</a:t>
+            </a:r>
+            <a:r>
+              <a:rPr lang="de-DE" dirty="0"/>
+              <a:t> </a:t>
+            </a:r>
+            <a:r>
+              <a:rPr lang="de-DE" dirty="0" err="1"/>
+              <a:t>elephas</a:t>
+            </a:r>
+            <a:r>
+              <a:rPr lang="de-DE" dirty="0"/>
+              <a:t>)</a:t>
+            </a:r>
           </a:p>
           <a:p>
             <a:pPr marL="285750" indent="-285750">
@@ -53308,14 +53288,14 @@
               <a:buChar char="-"/>
             </a:pPr>
             <a:r>
-              <a:rPr lang="de-DE" dirty="0" smtClean="0"/>
+              <a:rPr lang="de-DE" dirty="0"/>
               <a:t>Fine </a:t>
             </a:r>
             <a:r>
-              <a:rPr lang="de-DE" dirty="0" err="1" smtClean="0"/>
+              <a:rPr lang="de-DE" dirty="0" err="1"/>
               <a:t>tuning</a:t>
             </a:r>
-            <a:endParaRPr lang="de-DE" dirty="0" smtClean="0"/>
+            <a:endParaRPr lang="de-DE" dirty="0"/>
           </a:p>
           <a:p>
             <a:pPr marL="285750" indent="-285750">
@@ -53323,22 +53303,22 @@
               <a:buChar char="-"/>
             </a:pPr>
             <a:r>
-              <a:rPr lang="de-DE" dirty="0" smtClean="0"/>
+              <a:rPr lang="de-DE" dirty="0"/>
               <a:t>Live </a:t>
             </a:r>
             <a:r>
-              <a:rPr lang="de-DE" dirty="0" err="1" smtClean="0"/>
+              <a:rPr lang="de-DE" dirty="0" err="1"/>
               <a:t>demo</a:t>
             </a:r>
             <a:r>
-              <a:rPr lang="de-DE" dirty="0" smtClean="0"/>
+              <a:rPr lang="de-DE" dirty="0"/>
               <a:t> </a:t>
             </a:r>
             <a:r>
-              <a:rPr lang="de-DE" dirty="0" err="1" smtClean="0"/>
+              <a:rPr lang="de-DE" dirty="0" err="1"/>
               <a:t>application</a:t>
             </a:r>
-            <a:endParaRPr lang="de-DE" dirty="0" smtClean="0"/>
+            <a:endParaRPr lang="de-DE" dirty="0"/>
           </a:p>
         </p:txBody>
       </p:sp>
@@ -53365,7 +53345,7 @@
           <a:lstStyle/>
           <a:p>
             <a:r>
-              <a:rPr lang="de-DE" sz="4000" dirty="0" smtClean="0">
+              <a:rPr lang="de-DE" sz="4000" dirty="0">
                 <a:solidFill>
                   <a:srgbClr val="008000"/>
                 </a:solidFill>
@@ -53455,7 +53435,7 @@
           <a:lstStyle/>
           <a:p>
             <a:r>
-              <a:rPr lang="de-DE" dirty="0" smtClean="0"/>
+              <a:rPr lang="de-DE" dirty="0"/>
               <a:t>18.4.2016</a:t>
             </a:r>
             <a:endParaRPr lang="en-GB" dirty="0"/>
@@ -53472,7 +53452,7 @@
   <p:clrMapOvr>
     <a:masterClrMapping/>
   </p:clrMapOvr>
-  <p:transition xmlns:p14="http://schemas.microsoft.com/office/powerpoint/2010/main">
+  <p:transition>
     <p:fade/>
   </p:transition>
 </p:sld>
@@ -53563,10 +53543,9 @@
           <a:lstStyle/>
           <a:p>
             <a:r>
-              <a:rPr lang="en-GB" dirty="0" smtClean="0"/>
+              <a:rPr lang="en-GB" dirty="0"/>
               <a:t>Current Timeline</a:t>
             </a:r>
-            <a:endParaRPr lang="en-GB" dirty="0"/>
           </a:p>
         </p:txBody>
       </p:sp>
@@ -53577,7 +53556,7 @@
           <p:nvPr>
             <p:extLst>
               <p:ext uri="{D42A27DB-BD31-4B8C-83A1-F6EECF244321}">
-                <p14:modId xmlns:p14="http://schemas.microsoft.com/office/powerpoint/2010/main" val="3289990816"/>
+                <p14:modId xmlns:p14="http://schemas.microsoft.com/office/powerpoint/2010/main" val="355383754"/>
               </p:ext>
             </p:extLst>
           </p:nvPr>
@@ -53615,7 +53594,7 @@
           <a:lstStyle/>
           <a:p>
             <a:r>
-              <a:rPr lang="de-DE" sz="4400" dirty="0" smtClean="0">
+              <a:rPr lang="de-DE" sz="4400" dirty="0">
                 <a:solidFill>
                   <a:srgbClr val="008000"/>
                 </a:solidFill>
@@ -53657,7 +53636,7 @@
           <a:lstStyle/>
           <a:p>
             <a:r>
-              <a:rPr lang="de-DE" sz="4400" dirty="0" smtClean="0">
+              <a:rPr lang="de-DE" sz="4400" dirty="0">
                 <a:solidFill>
                   <a:srgbClr val="008000"/>
                 </a:solidFill>
@@ -53699,7 +53678,7 @@
           <a:lstStyle/>
           <a:p>
             <a:r>
-              <a:rPr lang="de-DE" sz="4400" dirty="0" smtClean="0">
+              <a:rPr lang="de-DE" sz="4400" dirty="0">
                 <a:solidFill>
                   <a:srgbClr val="008000"/>
                 </a:solidFill>
@@ -53711,56 +53690,6 @@
               <a:t>✔</a:t>
             </a:r>
             <a:endParaRPr lang="de-DE" sz="4400" dirty="0">
-              <a:solidFill>
-                <a:srgbClr val="008000"/>
-              </a:solidFill>
-            </a:endParaRPr>
-          </a:p>
-        </p:txBody>
-      </p:sp>
-      <p:sp>
-        <p:nvSpPr>
-          <p:cNvPr id="2" name="Nach rechts gekrümmter Pfeil 1"/>
-          <p:cNvSpPr/>
-          <p:nvPr/>
-        </p:nvSpPr>
-        <p:spPr>
-          <a:xfrm flipH="1" flipV="1">
-            <a:off x="5169967" y="2492896"/>
-            <a:ext cx="626169" cy="864096"/>
-          </a:xfrm>
-          <a:prstGeom prst="curvedRightArrow">
-            <a:avLst/>
-          </a:prstGeom>
-          <a:solidFill>
-            <a:srgbClr val="008000"/>
-          </a:solidFill>
-          <a:ln>
-            <a:noFill/>
-          </a:ln>
-        </p:spPr>
-        <p:style>
-          <a:lnRef idx="2">
-            <a:schemeClr val="accent1">
-              <a:shade val="50000"/>
-            </a:schemeClr>
-          </a:lnRef>
-          <a:fillRef idx="1">
-            <a:schemeClr val="accent1"/>
-          </a:fillRef>
-          <a:effectRef idx="0">
-            <a:schemeClr val="accent1"/>
-          </a:effectRef>
-          <a:fontRef idx="minor">
-            <a:schemeClr val="lt1"/>
-          </a:fontRef>
-        </p:style>
-        <p:txBody>
-          <a:bodyPr rtlCol="0" anchor="ctr"/>
-          <a:lstStyle/>
-          <a:p>
-            <a:pPr algn="ctr"/>
-            <a:endParaRPr lang="de-DE">
               <a:solidFill>
                 <a:srgbClr val="008000"/>
               </a:solidFill>
@@ -53776,7 +53705,7 @@
         </p:nvSpPr>
         <p:spPr>
           <a:xfrm>
-            <a:off x="5940152" y="3692953"/>
+            <a:off x="6641613" y="3675916"/>
             <a:ext cx="576064" cy="528135"/>
           </a:xfrm>
           <a:prstGeom prst="star5">
@@ -53841,7 +53770,7 @@
           <a:lstStyle/>
           <a:p>
             <a:r>
-              <a:rPr lang="de-DE" sz="4400" dirty="0" smtClean="0">
+              <a:rPr lang="de-DE" sz="4400" dirty="0">
                 <a:solidFill>
                   <a:srgbClr val="008000"/>
                 </a:solidFill>
@@ -53883,7 +53812,7 @@
           <a:lstStyle/>
           <a:p>
             <a:r>
-              <a:rPr lang="de-DE" sz="4400" dirty="0" smtClean="0">
+              <a:rPr lang="de-DE" sz="4400" dirty="0">
                 <a:solidFill>
                   <a:srgbClr val="008000"/>
                 </a:solidFill>
@@ -53923,7 +53852,7 @@
           <a:lstStyle/>
           <a:p>
             <a:r>
-              <a:rPr lang="de-DE" dirty="0" smtClean="0"/>
+              <a:rPr lang="de-DE" dirty="0"/>
               <a:t>18.4.2016</a:t>
             </a:r>
             <a:endParaRPr lang="en-GB" dirty="0"/>
@@ -53940,7 +53869,7 @@
   <p:clrMapOvr>
     <a:masterClrMapping/>
   </p:clrMapOvr>
-  <p:transition xmlns:p14="http://schemas.microsoft.com/office/powerpoint/2010/main">
+  <p:transition>
     <p:fade/>
   </p:transition>
 </p:sld>
@@ -54356,7 +54285,7 @@
   </a:custClrLst>
   <a:extLst>
     <a:ext uri="{05A4C25C-085E-4340-85A3-A5531E510DB2}">
-      <thm15:themeFamily xmlns="" xmlns:thm15="http://schemas.microsoft.com/office/thememl/2012/main" name="eth_praesentation_4zu3_ETH1_d" id="{13D4407A-1790-4B2E-BB8C-EB574A67D067}" vid="{4BFD40ED-96EC-464F-AA58-D037423ACDB5}"/>
+      <thm15:themeFamily xmlns:thm15="http://schemas.microsoft.com/office/thememl/2012/main" name="eth_praesentation_4zu3_ETH1_d" id="{13D4407A-1790-4B2E-BB8C-EB574A67D067}" vid="{4BFD40ED-96EC-464F-AA58-D037423ACDB5}"/>
     </a:ext>
   </a:extLst>
 </a:theme>
@@ -55377,7 +55306,7 @@
   </a:custClrLst>
   <a:extLst>
     <a:ext uri="{05A4C25C-085E-4340-85A3-A5531E510DB2}">
-      <thm15:themeFamily xmlns="" xmlns:thm15="http://schemas.microsoft.com/office/thememl/2012/main" name="eth_praesentation_4zu3_ETH1_d" id="{13D4407A-1790-4B2E-BB8C-EB574A67D067}" vid="{4BFD40ED-96EC-464F-AA58-D037423ACDB5}"/>
+      <thm15:themeFamily xmlns:thm15="http://schemas.microsoft.com/office/thememl/2012/main" name="eth_praesentation_4zu3_ETH1_d" id="{13D4407A-1790-4B2E-BB8C-EB574A67D067}" vid="{4BFD40ED-96EC-464F-AA58-D037423ACDB5}"/>
     </a:ext>
   </a:extLst>
 </a:theme>
@@ -55793,7 +55722,7 @@
   </a:custClrLst>
   <a:extLst>
     <a:ext uri="{05A4C25C-085E-4340-85A3-A5531E510DB2}">
-      <thm15:themeFamily xmlns="" xmlns:thm15="http://schemas.microsoft.com/office/thememl/2012/main" name="eth_praesentation_4zu3_ETH1_d" id="{13D4407A-1790-4B2E-BB8C-EB574A67D067}" vid="{4BFD40ED-96EC-464F-AA58-D037423ACDB5}"/>
+      <thm15:themeFamily xmlns:thm15="http://schemas.microsoft.com/office/thememl/2012/main" name="eth_praesentation_4zu3_ETH1_d" id="{13D4407A-1790-4B2E-BB8C-EB574A67D067}" vid="{4BFD40ED-96EC-464F-AA58-D037423ACDB5}"/>
     </a:ext>
   </a:extLst>
 </a:theme>
@@ -56209,7 +56138,7 @@
   </a:custClrLst>
   <a:extLst>
     <a:ext uri="{05A4C25C-085E-4340-85A3-A5531E510DB2}">
-      <thm15:themeFamily xmlns="" xmlns:thm15="http://schemas.microsoft.com/office/thememl/2012/main" name="eth_praesentation_4zu3_ETH1_d" id="{13D4407A-1790-4B2E-BB8C-EB574A67D067}" vid="{4BFD40ED-96EC-464F-AA58-D037423ACDB5}"/>
+      <thm15:themeFamily xmlns:thm15="http://schemas.microsoft.com/office/thememl/2012/main" name="eth_praesentation_4zu3_ETH1_d" id="{13D4407A-1790-4B2E-BB8C-EB574A67D067}" vid="{4BFD40ED-96EC-464F-AA58-D037423ACDB5}"/>
     </a:ext>
   </a:extLst>
 </a:theme>
@@ -56625,7 +56554,7 @@
   </a:custClrLst>
   <a:extLst>
     <a:ext uri="{05A4C25C-085E-4340-85A3-A5531E510DB2}">
-      <thm15:themeFamily xmlns="" xmlns:thm15="http://schemas.microsoft.com/office/thememl/2012/main" name="eth_praesentation_4zu3_ETH1_d" id="{13D4407A-1790-4B2E-BB8C-EB574A67D067}" vid="{4BFD40ED-96EC-464F-AA58-D037423ACDB5}"/>
+      <thm15:themeFamily xmlns:thm15="http://schemas.microsoft.com/office/thememl/2012/main" name="eth_praesentation_4zu3_ETH1_d" id="{13D4407A-1790-4B2E-BB8C-EB574A67D067}" vid="{4BFD40ED-96EC-464F-AA58-D037423ACDB5}"/>
     </a:ext>
   </a:extLst>
 </a:theme>
@@ -57041,7 +56970,7 @@
   </a:custClrLst>
   <a:extLst>
     <a:ext uri="{05A4C25C-085E-4340-85A3-A5531E510DB2}">
-      <thm15:themeFamily xmlns="" xmlns:thm15="http://schemas.microsoft.com/office/thememl/2012/main" name="eth_praesentation_4zu3_ETH1_d" id="{13D4407A-1790-4B2E-BB8C-EB574A67D067}" vid="{4BFD40ED-96EC-464F-AA58-D037423ACDB5}"/>
+      <thm15:themeFamily xmlns:thm15="http://schemas.microsoft.com/office/thememl/2012/main" name="eth_praesentation_4zu3_ETH1_d" id="{13D4407A-1790-4B2E-BB8C-EB574A67D067}" vid="{4BFD40ED-96EC-464F-AA58-D037423ACDB5}"/>
     </a:ext>
   </a:extLst>
 </a:theme>
@@ -57457,7 +57386,7 @@
   </a:custClrLst>
   <a:extLst>
     <a:ext uri="{05A4C25C-085E-4340-85A3-A5531E510DB2}">
-      <thm15:themeFamily xmlns="" xmlns:thm15="http://schemas.microsoft.com/office/thememl/2012/main" name="eth_praesentation_4zu3_ETH1_d" id="{13D4407A-1790-4B2E-BB8C-EB574A67D067}" vid="{4BFD40ED-96EC-464F-AA58-D037423ACDB5}"/>
+      <thm15:themeFamily xmlns:thm15="http://schemas.microsoft.com/office/thememl/2012/main" name="eth_praesentation_4zu3_ETH1_d" id="{13D4407A-1790-4B2E-BB8C-EB574A67D067}" vid="{4BFD40ED-96EC-464F-AA58-D037423ACDB5}"/>
     </a:ext>
   </a:extLst>
 </a:theme>
@@ -57873,7 +57802,7 @@
   </a:custClrLst>
   <a:extLst>
     <a:ext uri="{05A4C25C-085E-4340-85A3-A5531E510DB2}">
-      <thm15:themeFamily xmlns="" xmlns:thm15="http://schemas.microsoft.com/office/thememl/2012/main" name="eth_praesentation_4zu3_ETH1_d" id="{13D4407A-1790-4B2E-BB8C-EB574A67D067}" vid="{4BFD40ED-96EC-464F-AA58-D037423ACDB5}"/>
+      <thm15:themeFamily xmlns:thm15="http://schemas.microsoft.com/office/thememl/2012/main" name="eth_praesentation_4zu3_ETH1_d" id="{13D4407A-1790-4B2E-BB8C-EB574A67D067}" vid="{4BFD40ED-96EC-464F-AA58-D037423ACDB5}"/>
     </a:ext>
   </a:extLst>
 </a:theme>
@@ -58289,7 +58218,7 @@
   </a:custClrLst>
   <a:extLst>
     <a:ext uri="{05A4C25C-085E-4340-85A3-A5531E510DB2}">
-      <thm15:themeFamily xmlns="" xmlns:thm15="http://schemas.microsoft.com/office/thememl/2012/main" name="eth_praesentation_4zu3_ETH1_d" id="{13D4407A-1790-4B2E-BB8C-EB574A67D067}" vid="{4BFD40ED-96EC-464F-AA58-D037423ACDB5}"/>
+      <thm15:themeFamily xmlns:thm15="http://schemas.microsoft.com/office/thememl/2012/main" name="eth_praesentation_4zu3_ETH1_d" id="{13D4407A-1790-4B2E-BB8C-EB574A67D067}" vid="{4BFD40ED-96EC-464F-AA58-D037423ACDB5}"/>
     </a:ext>
   </a:extLst>
 </a:theme>

</xml_diff>